<commit_message>
update logboek Week 8 en correcties tussentijdse presentatie
</commit_message>
<xml_diff>
--- a/Presentaties/Chris_Jansen_Digipolis_Antwerpen_Tussentijdsepresentatie.pptx
+++ b/Presentaties/Chris_Jansen_Digipolis_Antwerpen_Tussentijdsepresentatie.pptx
@@ -3201,7 +3201,16 @@
     </dgm:pt>
     <dgm:pt modelId="{0D60A79F-D087-4E7B-AB21-F9228FBDF5E1}">
       <dgm:prSet phldrT="[Text]" custT="1"/>
-      <dgm:spPr/>
+      <dgm:spPr>
+        <a:solidFill>
+          <a:schemeClr val="lt1">
+            <a:hueOff val="0"/>
+            <a:satOff val="0"/>
+            <a:lumOff val="0"/>
+            <a:alpha val="50000"/>
+          </a:schemeClr>
+        </a:solidFill>
+      </dgm:spPr>
       <dgm:t>
         <a:bodyPr/>
         <a:lstStyle/>
@@ -3339,7 +3348,16 @@
     </dgm:pt>
     <dgm:pt modelId="{044687B0-0E7C-4DB2-B65B-3468F60F1E16}">
       <dgm:prSet phldrT="[Text]" custT="1"/>
-      <dgm:spPr/>
+      <dgm:spPr>
+        <a:solidFill>
+          <a:schemeClr val="lt1">
+            <a:hueOff val="0"/>
+            <a:satOff val="0"/>
+            <a:lumOff val="0"/>
+            <a:alpha val="50000"/>
+          </a:schemeClr>
+        </a:solidFill>
+      </dgm:spPr>
       <dgm:t>
         <a:bodyPr/>
         <a:lstStyle/>
@@ -3459,7 +3477,16 @@
     </dgm:pt>
     <dgm:pt modelId="{D85F8E37-EEA7-4166-AD9B-3717F5E631D4}">
       <dgm:prSet phldrT="[Text]" custT="1"/>
-      <dgm:spPr/>
+      <dgm:spPr>
+        <a:solidFill>
+          <a:schemeClr val="lt1">
+            <a:hueOff val="0"/>
+            <a:satOff val="0"/>
+            <a:lumOff val="0"/>
+            <a:alpha val="50000"/>
+          </a:schemeClr>
+        </a:solidFill>
+      </dgm:spPr>
       <dgm:t>
         <a:bodyPr/>
         <a:lstStyle/>
@@ -3512,7 +3539,16 @@
     </dgm:pt>
     <dgm:pt modelId="{8D3680CB-C0C5-41DF-AC12-5182053E419F}">
       <dgm:prSet phldrT="[Text]" custT="1"/>
-      <dgm:spPr/>
+      <dgm:spPr>
+        <a:solidFill>
+          <a:schemeClr val="lt1">
+            <a:hueOff val="0"/>
+            <a:satOff val="0"/>
+            <a:lumOff val="0"/>
+            <a:alpha val="50000"/>
+          </a:schemeClr>
+        </a:solidFill>
+      </dgm:spPr>
       <dgm:t>
         <a:bodyPr/>
         <a:lstStyle/>
@@ -3583,7 +3619,16 @@
     </dgm:pt>
     <dgm:pt modelId="{684D6ED0-8E55-42FF-A7D9-EFE85D2FDFDA}">
       <dgm:prSet phldrT="[Text]" custT="1"/>
-      <dgm:spPr/>
+      <dgm:spPr>
+        <a:solidFill>
+          <a:schemeClr val="lt1">
+            <a:hueOff val="0"/>
+            <a:satOff val="0"/>
+            <a:lumOff val="0"/>
+            <a:alpha val="50000"/>
+          </a:schemeClr>
+        </a:solidFill>
+      </dgm:spPr>
       <dgm:t>
         <a:bodyPr/>
         <a:lstStyle/>
@@ -3624,7 +3669,16 @@
     </dgm:pt>
     <dgm:pt modelId="{8E629556-C4D1-4372-ACB3-03466462232D}">
       <dgm:prSet phldrT="[Text]" custT="1"/>
-      <dgm:spPr/>
+      <dgm:spPr>
+        <a:solidFill>
+          <a:schemeClr val="lt1">
+            <a:hueOff val="0"/>
+            <a:satOff val="0"/>
+            <a:lumOff val="0"/>
+            <a:alpha val="50000"/>
+          </a:schemeClr>
+        </a:solidFill>
+      </dgm:spPr>
       <dgm:t>
         <a:bodyPr/>
         <a:lstStyle/>
@@ -3665,7 +3719,16 @@
     </dgm:pt>
     <dgm:pt modelId="{248171A0-3DE6-4F29-9786-FE6A642A0D3E}">
       <dgm:prSet phldrT="[Text]" custT="1"/>
-      <dgm:spPr/>
+      <dgm:spPr>
+        <a:solidFill>
+          <a:schemeClr val="lt1">
+            <a:hueOff val="0"/>
+            <a:satOff val="0"/>
+            <a:lumOff val="0"/>
+            <a:alpha val="50000"/>
+          </a:schemeClr>
+        </a:solidFill>
+      </dgm:spPr>
       <dgm:t>
         <a:bodyPr/>
         <a:lstStyle/>
@@ -3706,7 +3769,16 @@
     </dgm:pt>
     <dgm:pt modelId="{527C105E-9B44-4BB3-93CE-93D1FBBBC0C9}">
       <dgm:prSet phldrT="[Text]" custT="1"/>
-      <dgm:spPr/>
+      <dgm:spPr>
+        <a:solidFill>
+          <a:schemeClr val="lt1">
+            <a:hueOff val="0"/>
+            <a:satOff val="0"/>
+            <a:lumOff val="0"/>
+            <a:alpha val="50000"/>
+          </a:schemeClr>
+        </a:solidFill>
+      </dgm:spPr>
       <dgm:t>
         <a:bodyPr/>
         <a:lstStyle/>
@@ -3944,29 +4016,29 @@
     </dgm:pt>
   </dgm:ptLst>
   <dgm:cxnLst>
+    <dgm:cxn modelId="{E1A07F51-3414-4E01-A7BF-AEBCE1CEEC8D}" type="presOf" srcId="{0680C520-FB2A-45B0-AFE7-D11C917B37C6}" destId="{9B8C863D-DF9D-4CFA-B61B-6F247896E42A}" srcOrd="0" destOrd="0" presId="urn:microsoft.com/office/officeart/2008/layout/TitledPictureBlocks"/>
+    <dgm:cxn modelId="{BBA201A3-E41F-469B-B585-39BAC5EA8803}" type="presOf" srcId="{220401E9-CAAE-41D1-97A8-C7D3BF4942B8}" destId="{CD87F514-864C-41C3-9AFC-D92A7DB97FD6}" srcOrd="0" destOrd="0" presId="urn:microsoft.com/office/officeart/2008/layout/TitledPictureBlocks"/>
+    <dgm:cxn modelId="{C3DCE642-70C6-46BB-B41F-8003F8A924E3}" type="presOf" srcId="{D85F8E37-EEA7-4166-AD9B-3717F5E631D4}" destId="{A0339C7A-5257-4817-A26F-A0B5DB6A8B1B}" srcOrd="0" destOrd="0" presId="urn:microsoft.com/office/officeart/2008/layout/TitledPictureBlocks"/>
+    <dgm:cxn modelId="{33A59F9B-EB70-4E69-867B-B40BE94AF155}" srcId="{220401E9-CAAE-41D1-97A8-C7D3BF4942B8}" destId="{8D3680CB-C0C5-41DF-AC12-5182053E419F}" srcOrd="1" destOrd="0" parTransId="{DCBCED26-661D-45A1-93D9-1FC27D44EC0C}" sibTransId="{FCC50743-7F46-4E2E-95DC-F69BA9E84981}"/>
+    <dgm:cxn modelId="{A1D4A125-95DC-48BF-A323-945903209D6E}" type="presOf" srcId="{9A46A8B4-7C05-40D5-93B1-5A2D70A77B57}" destId="{3C25A451-661C-4CBA-87A2-C6F25AA8060B}" srcOrd="0" destOrd="0" presId="urn:microsoft.com/office/officeart/2008/layout/TitledPictureBlocks"/>
+    <dgm:cxn modelId="{37E13C36-EE0D-43D1-A747-7E6B1DBAB3B0}" type="presOf" srcId="{8E629556-C4D1-4372-ACB3-03466462232D}" destId="{A0339C7A-5257-4817-A26F-A0B5DB6A8B1B}" srcOrd="0" destOrd="3" presId="urn:microsoft.com/office/officeart/2008/layout/TitledPictureBlocks"/>
+    <dgm:cxn modelId="{02F41EE3-9A26-49BA-9D62-B5104FAEF9C4}" srcId="{220401E9-CAAE-41D1-97A8-C7D3BF4942B8}" destId="{684D6ED0-8E55-42FF-A7D9-EFE85D2FDFDA}" srcOrd="2" destOrd="0" parTransId="{5988B990-1C5E-4A0C-8F63-32AC8C9EBD0F}" sibTransId="{CC0C8442-BF9D-42E7-8EC7-A9E83CFF4EE7}"/>
     <dgm:cxn modelId="{AF98A814-5073-4AC0-8275-4BC70A0FE1D1}" srcId="{9A46A8B4-7C05-40D5-93B1-5A2D70A77B57}" destId="{220401E9-CAAE-41D1-97A8-C7D3BF4942B8}" srcOrd="2" destOrd="0" parTransId="{FFDA8410-A4A7-475E-9972-8FC41587AE36}" sibTransId="{0FF7F761-2EA0-43DA-9831-B26F6F825DC0}"/>
+    <dgm:cxn modelId="{BBC2A36E-0D65-4E5A-86AD-50A18E028A8F}" srcId="{0680C520-FB2A-45B0-AFE7-D11C917B37C6}" destId="{527C105E-9B44-4BB3-93CE-93D1FBBBC0C9}" srcOrd="1" destOrd="0" parTransId="{3DB7E844-C804-43DC-A72F-335A4DCCC049}" sibTransId="{683A2490-1693-48B1-B233-9271773761EE}"/>
+    <dgm:cxn modelId="{41965BF1-0F31-4043-B9D4-3821050D06FC}" type="presOf" srcId="{248171A0-3DE6-4F29-9786-FE6A642A0D3E}" destId="{A0339C7A-5257-4817-A26F-A0B5DB6A8B1B}" srcOrd="0" destOrd="4" presId="urn:microsoft.com/office/officeart/2008/layout/TitledPictureBlocks"/>
+    <dgm:cxn modelId="{13F2C265-F366-4C13-AC3C-2BB3F5E4F6A1}" type="presOf" srcId="{8D3680CB-C0C5-41DF-AC12-5182053E419F}" destId="{A0339C7A-5257-4817-A26F-A0B5DB6A8B1B}" srcOrd="0" destOrd="1" presId="urn:microsoft.com/office/officeart/2008/layout/TitledPictureBlocks"/>
+    <dgm:cxn modelId="{D0294C23-71A2-4E0F-B20F-5CF7188E8310}" type="presOf" srcId="{684D6ED0-8E55-42FF-A7D9-EFE85D2FDFDA}" destId="{A0339C7A-5257-4817-A26F-A0B5DB6A8B1B}" srcOrd="0" destOrd="2" presId="urn:microsoft.com/office/officeart/2008/layout/TitledPictureBlocks"/>
+    <dgm:cxn modelId="{C8F1EA85-0842-4981-BB39-569FFF66FDF6}" type="presOf" srcId="{527C105E-9B44-4BB3-93CE-93D1FBBBC0C9}" destId="{88D2212D-9375-4CB9-8D9A-BD247BC93241}" srcOrd="0" destOrd="1" presId="urn:microsoft.com/office/officeart/2008/layout/TitledPictureBlocks"/>
+    <dgm:cxn modelId="{7FFC3506-D7B8-4E3F-A81D-C41B23D1E542}" type="presOf" srcId="{04E13C12-98F7-458D-B19B-5DA3612592F5}" destId="{A61D3707-F3D1-49FA-B15D-ECBC6724D5E9}" srcOrd="0" destOrd="0" presId="urn:microsoft.com/office/officeart/2008/layout/TitledPictureBlocks"/>
     <dgm:cxn modelId="{24D2EFCE-645B-4C5F-88D5-AC079D4B9C1A}" srcId="{220401E9-CAAE-41D1-97A8-C7D3BF4942B8}" destId="{8E629556-C4D1-4372-ACB3-03466462232D}" srcOrd="3" destOrd="0" parTransId="{79BEE84E-74F8-49FF-8D11-2BEB20BB2B50}" sibTransId="{B884EB5A-471A-4818-8D44-9BB292B34EFF}"/>
+    <dgm:cxn modelId="{53B3F9AA-5A38-4E54-94F7-DD5B13C530D0}" srcId="{220401E9-CAAE-41D1-97A8-C7D3BF4942B8}" destId="{248171A0-3DE6-4F29-9786-FE6A642A0D3E}" srcOrd="4" destOrd="0" parTransId="{0C5FFD97-E80D-428A-9D88-CFE6F77110D9}" sibTransId="{0F9CA049-C172-418F-A6E1-6FCD339280BF}"/>
     <dgm:cxn modelId="{378C86B3-82ED-4786-864D-C77D25AA87FF}" srcId="{220401E9-CAAE-41D1-97A8-C7D3BF4942B8}" destId="{D85F8E37-EEA7-4166-AD9B-3717F5E631D4}" srcOrd="0" destOrd="0" parTransId="{C0EF4D1F-4923-4A94-8E20-DC139EF86730}" sibTransId="{A5242A99-4F3B-45F4-9ECF-A221FCAB664B}"/>
-    <dgm:cxn modelId="{C8F1EA85-0842-4981-BB39-569FFF66FDF6}" type="presOf" srcId="{527C105E-9B44-4BB3-93CE-93D1FBBBC0C9}" destId="{88D2212D-9375-4CB9-8D9A-BD247BC93241}" srcOrd="0" destOrd="1" presId="urn:microsoft.com/office/officeart/2008/layout/TitledPictureBlocks"/>
-    <dgm:cxn modelId="{37E13C36-EE0D-43D1-A747-7E6B1DBAB3B0}" type="presOf" srcId="{8E629556-C4D1-4372-ACB3-03466462232D}" destId="{A0339C7A-5257-4817-A26F-A0B5DB6A8B1B}" srcOrd="0" destOrd="3" presId="urn:microsoft.com/office/officeart/2008/layout/TitledPictureBlocks"/>
-    <dgm:cxn modelId="{C3DCE642-70C6-46BB-B41F-8003F8A924E3}" type="presOf" srcId="{D85F8E37-EEA7-4166-AD9B-3717F5E631D4}" destId="{A0339C7A-5257-4817-A26F-A0B5DB6A8B1B}" srcOrd="0" destOrd="0" presId="urn:microsoft.com/office/officeart/2008/layout/TitledPictureBlocks"/>
+    <dgm:cxn modelId="{5E150BF8-1A83-40D2-94D8-13B31565072D}" srcId="{0680C520-FB2A-45B0-AFE7-D11C917B37C6}" destId="{044687B0-0E7C-4DB2-B65B-3468F60F1E16}" srcOrd="0" destOrd="0" parTransId="{E4D3823F-138C-403C-B8CB-D26027FF5718}" sibTransId="{361BCA6D-C8F2-4D05-89A8-707DBFE20A77}"/>
+    <dgm:cxn modelId="{143E4AB5-FB9A-4F5E-8BD0-EA5937AA594F}" type="presOf" srcId="{044687B0-0E7C-4DB2-B65B-3468F60F1E16}" destId="{88D2212D-9375-4CB9-8D9A-BD247BC93241}" srcOrd="0" destOrd="0" presId="urn:microsoft.com/office/officeart/2008/layout/TitledPictureBlocks"/>
+    <dgm:cxn modelId="{3B1DA41F-2DB4-41CF-A05C-F229466483C4}" type="presOf" srcId="{0D60A79F-D087-4E7B-AB21-F9228FBDF5E1}" destId="{3A9870CF-6CA6-4AC6-A0F9-91A898CB8EBF}" srcOrd="0" destOrd="0" presId="urn:microsoft.com/office/officeart/2008/layout/TitledPictureBlocks"/>
     <dgm:cxn modelId="{35370B04-BB65-48E2-9B7A-A181C43E1985}" srcId="{04E13C12-98F7-458D-B19B-5DA3612592F5}" destId="{0D60A79F-D087-4E7B-AB21-F9228FBDF5E1}" srcOrd="0" destOrd="0" parTransId="{87B73BBD-0167-4D9B-A632-87674B7C6E22}" sibTransId="{42BFD4D6-39C7-4782-B626-456AE045A680}"/>
     <dgm:cxn modelId="{95089FB9-9C1E-4145-9B61-E340AC180CF7}" srcId="{9A46A8B4-7C05-40D5-93B1-5A2D70A77B57}" destId="{04E13C12-98F7-458D-B19B-5DA3612592F5}" srcOrd="0" destOrd="0" parTransId="{4A1F724E-E114-47BA-B824-F308F6B34A23}" sibTransId="{D37529D6-4A13-4EF5-9174-143ABBF3C160}"/>
-    <dgm:cxn modelId="{41965BF1-0F31-4043-B9D4-3821050D06FC}" type="presOf" srcId="{248171A0-3DE6-4F29-9786-FE6A642A0D3E}" destId="{A0339C7A-5257-4817-A26F-A0B5DB6A8B1B}" srcOrd="0" destOrd="4" presId="urn:microsoft.com/office/officeart/2008/layout/TitledPictureBlocks"/>
-    <dgm:cxn modelId="{BBA201A3-E41F-469B-B585-39BAC5EA8803}" type="presOf" srcId="{220401E9-CAAE-41D1-97A8-C7D3BF4942B8}" destId="{CD87F514-864C-41C3-9AFC-D92A7DB97FD6}" srcOrd="0" destOrd="0" presId="urn:microsoft.com/office/officeart/2008/layout/TitledPictureBlocks"/>
-    <dgm:cxn modelId="{7FFC3506-D7B8-4E3F-A81D-C41B23D1E542}" type="presOf" srcId="{04E13C12-98F7-458D-B19B-5DA3612592F5}" destId="{A61D3707-F3D1-49FA-B15D-ECBC6724D5E9}" srcOrd="0" destOrd="0" presId="urn:microsoft.com/office/officeart/2008/layout/TitledPictureBlocks"/>
-    <dgm:cxn modelId="{D0294C23-71A2-4E0F-B20F-5CF7188E8310}" type="presOf" srcId="{684D6ED0-8E55-42FF-A7D9-EFE85D2FDFDA}" destId="{A0339C7A-5257-4817-A26F-A0B5DB6A8B1B}" srcOrd="0" destOrd="2" presId="urn:microsoft.com/office/officeart/2008/layout/TitledPictureBlocks"/>
-    <dgm:cxn modelId="{13F2C265-F366-4C13-AC3C-2BB3F5E4F6A1}" type="presOf" srcId="{8D3680CB-C0C5-41DF-AC12-5182053E419F}" destId="{A0339C7A-5257-4817-A26F-A0B5DB6A8B1B}" srcOrd="0" destOrd="1" presId="urn:microsoft.com/office/officeart/2008/layout/TitledPictureBlocks"/>
-    <dgm:cxn modelId="{143E4AB5-FB9A-4F5E-8BD0-EA5937AA594F}" type="presOf" srcId="{044687B0-0E7C-4DB2-B65B-3468F60F1E16}" destId="{88D2212D-9375-4CB9-8D9A-BD247BC93241}" srcOrd="0" destOrd="0" presId="urn:microsoft.com/office/officeart/2008/layout/TitledPictureBlocks"/>
-    <dgm:cxn modelId="{3B1DA41F-2DB4-41CF-A05C-F229466483C4}" type="presOf" srcId="{0D60A79F-D087-4E7B-AB21-F9228FBDF5E1}" destId="{3A9870CF-6CA6-4AC6-A0F9-91A898CB8EBF}" srcOrd="0" destOrd="0" presId="urn:microsoft.com/office/officeart/2008/layout/TitledPictureBlocks"/>
-    <dgm:cxn modelId="{02F41EE3-9A26-49BA-9D62-B5104FAEF9C4}" srcId="{220401E9-CAAE-41D1-97A8-C7D3BF4942B8}" destId="{684D6ED0-8E55-42FF-A7D9-EFE85D2FDFDA}" srcOrd="2" destOrd="0" parTransId="{5988B990-1C5E-4A0C-8F63-32AC8C9EBD0F}" sibTransId="{CC0C8442-BF9D-42E7-8EC7-A9E83CFF4EE7}"/>
-    <dgm:cxn modelId="{33A59F9B-EB70-4E69-867B-B40BE94AF155}" srcId="{220401E9-CAAE-41D1-97A8-C7D3BF4942B8}" destId="{8D3680CB-C0C5-41DF-AC12-5182053E419F}" srcOrd="1" destOrd="0" parTransId="{DCBCED26-661D-45A1-93D9-1FC27D44EC0C}" sibTransId="{FCC50743-7F46-4E2E-95DC-F69BA9E84981}"/>
-    <dgm:cxn modelId="{E1A07F51-3414-4E01-A7BF-AEBCE1CEEC8D}" type="presOf" srcId="{0680C520-FB2A-45B0-AFE7-D11C917B37C6}" destId="{9B8C863D-DF9D-4CFA-B61B-6F247896E42A}" srcOrd="0" destOrd="0" presId="urn:microsoft.com/office/officeart/2008/layout/TitledPictureBlocks"/>
-    <dgm:cxn modelId="{BBC2A36E-0D65-4E5A-86AD-50A18E028A8F}" srcId="{0680C520-FB2A-45B0-AFE7-D11C917B37C6}" destId="{527C105E-9B44-4BB3-93CE-93D1FBBBC0C9}" srcOrd="1" destOrd="0" parTransId="{3DB7E844-C804-43DC-A72F-335A4DCCC049}" sibTransId="{683A2490-1693-48B1-B233-9271773761EE}"/>
     <dgm:cxn modelId="{FF400D57-5050-4E90-B1C9-16E3202735A2}" srcId="{9A46A8B4-7C05-40D5-93B1-5A2D70A77B57}" destId="{0680C520-FB2A-45B0-AFE7-D11C917B37C6}" srcOrd="1" destOrd="0" parTransId="{EBAE5E48-5EC1-4BEB-959B-2FCA46D4D595}" sibTransId="{A0C1E282-586A-4972-A6AD-EE4514C19733}"/>
-    <dgm:cxn modelId="{A1D4A125-95DC-48BF-A323-945903209D6E}" type="presOf" srcId="{9A46A8B4-7C05-40D5-93B1-5A2D70A77B57}" destId="{3C25A451-661C-4CBA-87A2-C6F25AA8060B}" srcOrd="0" destOrd="0" presId="urn:microsoft.com/office/officeart/2008/layout/TitledPictureBlocks"/>
-    <dgm:cxn modelId="{53B3F9AA-5A38-4E54-94F7-DD5B13C530D0}" srcId="{220401E9-CAAE-41D1-97A8-C7D3BF4942B8}" destId="{248171A0-3DE6-4F29-9786-FE6A642A0D3E}" srcOrd="4" destOrd="0" parTransId="{0C5FFD97-E80D-428A-9D88-CFE6F77110D9}" sibTransId="{0F9CA049-C172-418F-A6E1-6FCD339280BF}"/>
-    <dgm:cxn modelId="{5E150BF8-1A83-40D2-94D8-13B31565072D}" srcId="{0680C520-FB2A-45B0-AFE7-D11C917B37C6}" destId="{044687B0-0E7C-4DB2-B65B-3468F60F1E16}" srcOrd="0" destOrd="0" parTransId="{E4D3823F-138C-403C-B8CB-D26027FF5718}" sibTransId="{361BCA6D-C8F2-4D05-89A8-707DBFE20A77}"/>
     <dgm:cxn modelId="{50604644-B5F9-4858-9E22-9FBBB92923D3}" type="presParOf" srcId="{3C25A451-661C-4CBA-87A2-C6F25AA8060B}" destId="{44F34DB5-739A-4DB4-943D-F5949F626714}" srcOrd="0" destOrd="0" presId="urn:microsoft.com/office/officeart/2008/layout/TitledPictureBlocks"/>
     <dgm:cxn modelId="{85EABE5F-EF22-4634-9E78-71C054CC5D8B}" type="presParOf" srcId="{44F34DB5-739A-4DB4-943D-F5949F626714}" destId="{A61D3707-F3D1-49FA-B15D-ECBC6724D5E9}" srcOrd="0" destOrd="0" presId="urn:microsoft.com/office/officeart/2008/layout/TitledPictureBlocks"/>
     <dgm:cxn modelId="{686DC610-4FB1-4C48-97D4-21601564D8F7}" type="presParOf" srcId="{44F34DB5-739A-4DB4-943D-F5949F626714}" destId="{9529F91D-F14D-465E-9D82-D29BEB1A8524}" srcOrd="1" destOrd="0" presId="urn:microsoft.com/office/officeart/2008/layout/TitledPictureBlocks"/>
@@ -4008,7 +4080,16 @@
     </dgm:pt>
     <dgm:pt modelId="{478293B6-08FD-4B6D-8CFE-A66F26097043}">
       <dgm:prSet phldrT="[Text]"/>
-      <dgm:spPr/>
+      <dgm:spPr>
+        <a:solidFill>
+          <a:schemeClr val="accent1">
+            <a:hueOff val="0"/>
+            <a:satOff val="0"/>
+            <a:lumOff val="0"/>
+            <a:alpha val="50000"/>
+          </a:schemeClr>
+        </a:solidFill>
+      </dgm:spPr>
       <dgm:t>
         <a:bodyPr/>
         <a:lstStyle/>
@@ -4055,7 +4136,16 @@
     </dgm:pt>
     <dgm:pt modelId="{C0D2A59D-D8EF-4B8F-BA4E-13C440B83E03}">
       <dgm:prSet phldrT="[Text]"/>
-      <dgm:spPr/>
+      <dgm:spPr>
+        <a:solidFill>
+          <a:schemeClr val="accent1">
+            <a:hueOff val="0"/>
+            <a:satOff val="0"/>
+            <a:lumOff val="0"/>
+            <a:alpha val="50000"/>
+          </a:schemeClr>
+        </a:solidFill>
+      </dgm:spPr>
       <dgm:t>
         <a:bodyPr/>
         <a:lstStyle/>
@@ -4102,7 +4192,16 @@
     </dgm:pt>
     <dgm:pt modelId="{A4F39D64-EADD-4107-9CD3-BCA17AA04C81}">
       <dgm:prSet phldrT="[Text]"/>
-      <dgm:spPr/>
+      <dgm:spPr>
+        <a:solidFill>
+          <a:schemeClr val="accent1">
+            <a:hueOff val="0"/>
+            <a:satOff val="0"/>
+            <a:lumOff val="0"/>
+            <a:alpha val="50000"/>
+          </a:schemeClr>
+        </a:solidFill>
+      </dgm:spPr>
       <dgm:t>
         <a:bodyPr/>
         <a:lstStyle/>
@@ -4149,7 +4248,16 @@
     </dgm:pt>
     <dgm:pt modelId="{9971C1EE-6DFF-453F-848A-A62C39C72C10}">
       <dgm:prSet phldrT="[Text]"/>
-      <dgm:spPr/>
+      <dgm:spPr>
+        <a:solidFill>
+          <a:schemeClr val="accent1">
+            <a:hueOff val="0"/>
+            <a:satOff val="0"/>
+            <a:lumOff val="0"/>
+            <a:alpha val="50000"/>
+          </a:schemeClr>
+        </a:solidFill>
+      </dgm:spPr>
       <dgm:t>
         <a:bodyPr/>
         <a:lstStyle/>
@@ -4196,7 +4304,16 @@
     </dgm:pt>
     <dgm:pt modelId="{B1FB7916-5433-46E2-A838-EBDD24470605}">
       <dgm:prSet phldrT="[Text]"/>
-      <dgm:spPr/>
+      <dgm:spPr>
+        <a:solidFill>
+          <a:schemeClr val="accent1">
+            <a:hueOff val="0"/>
+            <a:satOff val="0"/>
+            <a:lumOff val="0"/>
+            <a:alpha val="50000"/>
+          </a:schemeClr>
+        </a:solidFill>
+      </dgm:spPr>
       <dgm:t>
         <a:bodyPr/>
         <a:lstStyle/>
@@ -4261,7 +4378,16 @@
     </dgm:pt>
     <dgm:pt modelId="{2E2F2E8F-E6E7-4460-AF34-30B1CC3F52A6}">
       <dgm:prSet phldrT="[Text]"/>
-      <dgm:spPr/>
+      <dgm:spPr>
+        <a:solidFill>
+          <a:schemeClr val="accent1">
+            <a:hueOff val="0"/>
+            <a:satOff val="0"/>
+            <a:lumOff val="0"/>
+            <a:alpha val="50000"/>
+          </a:schemeClr>
+        </a:solidFill>
+      </dgm:spPr>
       <dgm:t>
         <a:bodyPr/>
         <a:lstStyle/>
@@ -4308,7 +4434,16 @@
     </dgm:pt>
     <dgm:pt modelId="{05C3EC26-47ED-4A33-8459-D4278F63609A}">
       <dgm:prSet phldrT="[Text]"/>
-      <dgm:spPr/>
+      <dgm:spPr>
+        <a:solidFill>
+          <a:schemeClr val="accent1">
+            <a:hueOff val="0"/>
+            <a:satOff val="0"/>
+            <a:lumOff val="0"/>
+            <a:alpha val="50000"/>
+          </a:schemeClr>
+        </a:solidFill>
+      </dgm:spPr>
       <dgm:t>
         <a:bodyPr/>
         <a:lstStyle/>
@@ -4355,7 +4490,16 @@
     </dgm:pt>
     <dgm:pt modelId="{06DB5709-F492-4060-ADFF-CA13404572A7}">
       <dgm:prSet phldrT="[Text]"/>
-      <dgm:spPr/>
+      <dgm:spPr>
+        <a:solidFill>
+          <a:schemeClr val="accent1">
+            <a:hueOff val="0"/>
+            <a:satOff val="0"/>
+            <a:lumOff val="0"/>
+            <a:alpha val="50000"/>
+          </a:schemeClr>
+        </a:solidFill>
+      </dgm:spPr>
       <dgm:t>
         <a:bodyPr/>
         <a:lstStyle/>
@@ -4402,7 +4546,16 @@
     </dgm:pt>
     <dgm:pt modelId="{107DFAAB-E742-419F-AF1F-847404648542}">
       <dgm:prSet phldrT="[Text]"/>
-      <dgm:spPr/>
+      <dgm:spPr>
+        <a:solidFill>
+          <a:schemeClr val="accent1">
+            <a:hueOff val="0"/>
+            <a:satOff val="0"/>
+            <a:lumOff val="0"/>
+            <a:alpha val="50000"/>
+          </a:schemeClr>
+        </a:solidFill>
+      </dgm:spPr>
       <dgm:t>
         <a:bodyPr/>
         <a:lstStyle/>
@@ -4449,7 +4602,16 @@
     </dgm:pt>
     <dgm:pt modelId="{74E6E131-4E7F-49E8-9987-26CB8D6DEE22}">
       <dgm:prSet phldrT="[Text]"/>
-      <dgm:spPr/>
+      <dgm:spPr>
+        <a:solidFill>
+          <a:schemeClr val="accent1">
+            <a:hueOff val="0"/>
+            <a:satOff val="0"/>
+            <a:lumOff val="0"/>
+            <a:alpha val="50000"/>
+          </a:schemeClr>
+        </a:solidFill>
+      </dgm:spPr>
       <dgm:t>
         <a:bodyPr/>
         <a:lstStyle/>
@@ -4496,7 +4658,16 @@
     </dgm:pt>
     <dgm:pt modelId="{DC68B65A-188A-415F-ADDA-ECF2C95B6EC6}">
       <dgm:prSet phldrT="[Text]"/>
-      <dgm:spPr/>
+      <dgm:spPr>
+        <a:solidFill>
+          <a:schemeClr val="accent1">
+            <a:hueOff val="0"/>
+            <a:satOff val="0"/>
+            <a:lumOff val="0"/>
+            <a:alpha val="50000"/>
+          </a:schemeClr>
+        </a:solidFill>
+      </dgm:spPr>
       <dgm:t>
         <a:bodyPr/>
         <a:lstStyle/>
@@ -4596,9 +4767,16 @@
           </a:stretch>
         </a:blipFill>
       </dgm:spPr>
+      <dgm:t>
+        <a:bodyPr/>
+        <a:lstStyle/>
+        <a:p>
+          <a:endParaRPr lang="nl-BE"/>
+        </a:p>
+      </dgm:t>
     </dgm:pt>
     <dgm:pt modelId="{4C413AB1-277D-4252-8373-B6FED2F3BDCF}" type="pres">
-      <dgm:prSet presAssocID="{478293B6-08FD-4B6D-8CFE-A66F26097043}" presName="txNode" presStyleLbl="node1" presStyleIdx="0" presStyleCnt="3" custScaleX="118114" custLinFactNeighborX="17669">
+      <dgm:prSet presAssocID="{478293B6-08FD-4B6D-8CFE-A66F26097043}" presName="txNode" presStyleLbl="node1" presStyleIdx="0" presStyleCnt="3" custScaleX="118114" custLinFactNeighborX="4544" custLinFactNeighborY="37178">
         <dgm:presLayoutVars>
           <dgm:bulletEnabled val="1"/>
         </dgm:presLayoutVars>
@@ -4664,7 +4842,7 @@
       </dgm:t>
     </dgm:pt>
     <dgm:pt modelId="{FF4DF0C2-8C13-431D-BC3C-378B53A8B039}" type="pres">
-      <dgm:prSet presAssocID="{9971C1EE-6DFF-453F-848A-A62C39C72C10}" presName="txNode" presStyleLbl="node1" presStyleIdx="1" presStyleCnt="3" custScaleX="158896" custLinFactNeighborX="9866" custLinFactNeighborY="1595">
+      <dgm:prSet presAssocID="{9971C1EE-6DFF-453F-848A-A62C39C72C10}" presName="txNode" presStyleLbl="node1" presStyleIdx="1" presStyleCnt="3" custScaleX="158896" custLinFactNeighborX="-10678" custLinFactNeighborY="42171">
         <dgm:presLayoutVars>
           <dgm:bulletEnabled val="1"/>
         </dgm:presLayoutVars>
@@ -4723,7 +4901,7 @@
       </dgm:spPr>
     </dgm:pt>
     <dgm:pt modelId="{9511BA2D-57C7-45CA-A1B9-696522CEC19D}" type="pres">
-      <dgm:prSet presAssocID="{05C3EC26-47ED-4A33-8459-D4278F63609A}" presName="txNode" presStyleLbl="node1" presStyleIdx="2" presStyleCnt="3" custScaleX="141199" custLinFactNeighborX="-21090">
+      <dgm:prSet presAssocID="{05C3EC26-47ED-4A33-8459-D4278F63609A}" presName="txNode" presStyleLbl="node1" presStyleIdx="2" presStyleCnt="3" custScaleX="141199" custLinFactNeighborX="-24580" custLinFactNeighborY="42171">
         <dgm:presLayoutVars>
           <dgm:bulletEnabled val="1"/>
         </dgm:presLayoutVars>
@@ -5064,7 +5242,7 @@
       </dgm:t>
     </dgm:pt>
     <dgm:pt modelId="{3F6D1125-9C98-480D-A594-F25492B47CE3}">
-      <dgm:prSet phldrT="[Text]"/>
+      <dgm:prSet phldrT="[Text]" custT="1"/>
       <dgm:spPr>
         <a:solidFill>
           <a:schemeClr val="accent4"/>
@@ -5075,18 +5253,18 @@
         <a:lstStyle/>
         <a:p>
           <a:r>
-            <a:rPr lang="en-GB" dirty="0" err="1" smtClean="0">
+            <a:rPr lang="en-GB" sz="2400" dirty="0" err="1" smtClean="0">
               <a:latin typeface="Arial Rounded MT Bold" panose="020F0704030504030204" pitchFamily="34" charset="0"/>
             </a:rPr>
             <a:t>Fase</a:t>
           </a:r>
           <a:r>
-            <a:rPr lang="en-GB" dirty="0" smtClean="0">
+            <a:rPr lang="en-GB" sz="2400" dirty="0" smtClean="0">
               <a:latin typeface="Arial Rounded MT Bold" panose="020F0704030504030204" pitchFamily="34" charset="0"/>
             </a:rPr>
             <a:t> 1</a:t>
           </a:r>
-          <a:endParaRPr lang="nl-BE" dirty="0">
+          <a:endParaRPr lang="nl-BE" sz="2400" dirty="0">
             <a:latin typeface="Arial Rounded MT Bold" panose="020F0704030504030204" pitchFamily="34" charset="0"/>
           </a:endParaRPr>
         </a:p>
@@ -5115,25 +5293,34 @@
       </dgm:t>
     </dgm:pt>
     <dgm:pt modelId="{0BDE11B2-9E37-4D05-93D8-9904BF709E94}">
-      <dgm:prSet phldrT="[Text]"/>
-      <dgm:spPr/>
+      <dgm:prSet phldrT="[Text]" custT="1"/>
+      <dgm:spPr>
+        <a:solidFill>
+          <a:schemeClr val="lt1">
+            <a:hueOff val="0"/>
+            <a:satOff val="0"/>
+            <a:lumOff val="0"/>
+            <a:alpha val="50000"/>
+          </a:schemeClr>
+        </a:solidFill>
+      </dgm:spPr>
       <dgm:t>
         <a:bodyPr/>
         <a:lstStyle/>
         <a:p>
           <a:r>
-            <a:rPr lang="en-GB" dirty="0" err="1" smtClean="0">
+            <a:rPr lang="en-GB" sz="2400" b="0" dirty="0" err="1" smtClean="0">
               <a:latin typeface="Arial Rounded MT Bold" panose="020F0704030504030204" pitchFamily="34" charset="0"/>
             </a:rPr>
             <a:t>Bouwen</a:t>
           </a:r>
           <a:r>
-            <a:rPr lang="en-GB" dirty="0" smtClean="0">
+            <a:rPr lang="en-GB" sz="2400" b="0" dirty="0" smtClean="0">
               <a:latin typeface="Arial Rounded MT Bold" panose="020F0704030504030204" pitchFamily="34" charset="0"/>
             </a:rPr>
             <a:t> van 2 prototypes</a:t>
           </a:r>
-          <a:endParaRPr lang="nl-BE" dirty="0">
+          <a:endParaRPr lang="nl-BE" sz="2400" b="0" dirty="0">
             <a:latin typeface="Arial Rounded MT Bold" panose="020F0704030504030204" pitchFamily="34" charset="0"/>
           </a:endParaRPr>
         </a:p>
@@ -5162,31 +5349,40 @@
       </dgm:t>
     </dgm:pt>
     <dgm:pt modelId="{39822E80-D4B5-4E04-90BB-196C709D1316}">
-      <dgm:prSet phldrT="[Text]"/>
-      <dgm:spPr/>
+      <dgm:prSet phldrT="[Text]" custT="1"/>
+      <dgm:spPr>
+        <a:solidFill>
+          <a:schemeClr val="lt1">
+            <a:hueOff val="0"/>
+            <a:satOff val="0"/>
+            <a:lumOff val="0"/>
+            <a:alpha val="50000"/>
+          </a:schemeClr>
+        </a:solidFill>
+      </dgm:spPr>
       <dgm:t>
         <a:bodyPr/>
         <a:lstStyle/>
         <a:p>
           <a:r>
-            <a:rPr lang="en-GB" dirty="0" err="1" smtClean="0">
+            <a:rPr lang="en-GB" sz="2400" b="0" dirty="0" err="1" smtClean="0">
               <a:latin typeface="Arial Rounded MT Bold" panose="020F0704030504030204" pitchFamily="34" charset="0"/>
             </a:rPr>
             <a:t>Testen</a:t>
           </a:r>
           <a:r>
-            <a:rPr lang="en-GB" dirty="0" smtClean="0">
+            <a:rPr lang="en-GB" sz="2400" b="0" dirty="0" smtClean="0">
               <a:latin typeface="Arial Rounded MT Bold" panose="020F0704030504030204" pitchFamily="34" charset="0"/>
             </a:rPr>
             <a:t> in 2 </a:t>
           </a:r>
           <a:r>
-            <a:rPr lang="en-GB" dirty="0" err="1" smtClean="0">
+            <a:rPr lang="en-GB" sz="2400" b="0" dirty="0" err="1" smtClean="0">
               <a:latin typeface="Arial Rounded MT Bold" panose="020F0704030504030204" pitchFamily="34" charset="0"/>
             </a:rPr>
             <a:t>zalen</a:t>
           </a:r>
-          <a:endParaRPr lang="nl-BE" dirty="0">
+          <a:endParaRPr lang="nl-BE" sz="2400" b="0" dirty="0">
             <a:latin typeface="Arial Rounded MT Bold" panose="020F0704030504030204" pitchFamily="34" charset="0"/>
           </a:endParaRPr>
         </a:p>
@@ -5215,7 +5411,7 @@
       </dgm:t>
     </dgm:pt>
     <dgm:pt modelId="{D7C8BC63-786A-40C4-8B8F-15E6B0DD8657}">
-      <dgm:prSet phldrT="[Text]"/>
+      <dgm:prSet phldrT="[Text]" custT="1"/>
       <dgm:spPr>
         <a:solidFill>
           <a:schemeClr val="accent4"/>
@@ -5226,18 +5422,18 @@
         <a:lstStyle/>
         <a:p>
           <a:r>
-            <a:rPr lang="en-GB" dirty="0" err="1" smtClean="0">
+            <a:rPr lang="en-GB" sz="2400" dirty="0" err="1" smtClean="0">
               <a:latin typeface="Arial Rounded MT Bold" panose="020F0704030504030204" pitchFamily="34" charset="0"/>
             </a:rPr>
             <a:t>Fase</a:t>
           </a:r>
           <a:r>
-            <a:rPr lang="en-GB" dirty="0" smtClean="0">
+            <a:rPr lang="en-GB" sz="2400" dirty="0" smtClean="0">
               <a:latin typeface="Arial Rounded MT Bold" panose="020F0704030504030204" pitchFamily="34" charset="0"/>
             </a:rPr>
             <a:t> 2</a:t>
           </a:r>
-          <a:endParaRPr lang="nl-BE" dirty="0">
+          <a:endParaRPr lang="nl-BE" sz="2400" dirty="0">
             <a:latin typeface="Arial Rounded MT Bold" panose="020F0704030504030204" pitchFamily="34" charset="0"/>
           </a:endParaRPr>
         </a:p>
@@ -5266,25 +5462,34 @@
       </dgm:t>
     </dgm:pt>
     <dgm:pt modelId="{22D7EF16-7941-4158-BC18-1A0A0AECBAE5}">
-      <dgm:prSet phldrT="[Text]"/>
-      <dgm:spPr/>
+      <dgm:prSet phldrT="[Text]" custT="1"/>
+      <dgm:spPr>
+        <a:solidFill>
+          <a:schemeClr val="lt1">
+            <a:hueOff val="0"/>
+            <a:satOff val="0"/>
+            <a:lumOff val="0"/>
+            <a:alpha val="50000"/>
+          </a:schemeClr>
+        </a:solidFill>
+      </dgm:spPr>
       <dgm:t>
         <a:bodyPr/>
         <a:lstStyle/>
         <a:p>
           <a:r>
-            <a:rPr lang="en-GB" dirty="0" err="1" smtClean="0">
+            <a:rPr lang="en-GB" sz="2400" b="0" dirty="0" err="1" smtClean="0">
               <a:latin typeface="Arial Rounded MT Bold" panose="020F0704030504030204" pitchFamily="34" charset="0"/>
             </a:rPr>
             <a:t>Bouwen</a:t>
           </a:r>
           <a:r>
-            <a:rPr lang="en-GB" dirty="0" smtClean="0">
+            <a:rPr lang="en-GB" sz="2400" b="0" dirty="0" smtClean="0">
               <a:latin typeface="Arial Rounded MT Bold" panose="020F0704030504030204" pitchFamily="34" charset="0"/>
             </a:rPr>
             <a:t> van 4 Prototypes</a:t>
           </a:r>
-          <a:endParaRPr lang="nl-BE" dirty="0">
+          <a:endParaRPr lang="nl-BE" sz="2400" b="0" dirty="0">
             <a:latin typeface="Arial Rounded MT Bold" panose="020F0704030504030204" pitchFamily="34" charset="0"/>
           </a:endParaRPr>
         </a:p>
@@ -5313,31 +5518,40 @@
       </dgm:t>
     </dgm:pt>
     <dgm:pt modelId="{022BB9A1-B624-4E9F-BA62-0DAEE0137388}">
-      <dgm:prSet phldrT="[Text]"/>
-      <dgm:spPr/>
+      <dgm:prSet phldrT="[Text]" custT="1"/>
+      <dgm:spPr>
+        <a:solidFill>
+          <a:schemeClr val="lt1">
+            <a:hueOff val="0"/>
+            <a:satOff val="0"/>
+            <a:lumOff val="0"/>
+            <a:alpha val="50000"/>
+          </a:schemeClr>
+        </a:solidFill>
+      </dgm:spPr>
       <dgm:t>
         <a:bodyPr/>
         <a:lstStyle/>
         <a:p>
           <a:r>
-            <a:rPr lang="en-GB" dirty="0" err="1" smtClean="0">
+            <a:rPr lang="en-GB" sz="2400" b="0" dirty="0" err="1" smtClean="0">
               <a:latin typeface="Arial Rounded MT Bold" panose="020F0704030504030204" pitchFamily="34" charset="0"/>
             </a:rPr>
             <a:t>Testen</a:t>
           </a:r>
           <a:r>
-            <a:rPr lang="en-GB" dirty="0" smtClean="0">
+            <a:rPr lang="en-GB" sz="2400" b="0" dirty="0" smtClean="0">
               <a:latin typeface="Arial Rounded MT Bold" panose="020F0704030504030204" pitchFamily="34" charset="0"/>
             </a:rPr>
             <a:t> op 1 </a:t>
           </a:r>
           <a:r>
-            <a:rPr lang="en-GB" dirty="0" err="1" smtClean="0">
+            <a:rPr lang="en-GB" sz="2400" b="0" dirty="0" err="1" smtClean="0">
               <a:latin typeface="Arial Rounded MT Bold" panose="020F0704030504030204" pitchFamily="34" charset="0"/>
             </a:rPr>
             <a:t>verdieping</a:t>
           </a:r>
-          <a:endParaRPr lang="nl-BE" dirty="0">
+          <a:endParaRPr lang="nl-BE" sz="2400" b="0" dirty="0">
             <a:latin typeface="Arial Rounded MT Bold" panose="020F0704030504030204" pitchFamily="34" charset="0"/>
           </a:endParaRPr>
         </a:p>
@@ -5366,7 +5580,7 @@
       </dgm:t>
     </dgm:pt>
     <dgm:pt modelId="{B7483DA8-39BA-4BA3-87DD-94CB73DCED0A}">
-      <dgm:prSet phldrT="[Text]"/>
+      <dgm:prSet phldrT="[Text]" custT="1"/>
       <dgm:spPr>
         <a:solidFill>
           <a:schemeClr val="accent4"/>
@@ -5377,16 +5591,16 @@
         <a:lstStyle/>
         <a:p>
           <a:r>
-            <a:rPr lang="en-GB" dirty="0" err="1" smtClean="0">
+            <a:rPr lang="en-GB" sz="2400" dirty="0" err="1" smtClean="0">
               <a:latin typeface="Arial Rounded MT Bold" panose="020F0704030504030204" pitchFamily="34" charset="0"/>
             </a:rPr>
             <a:t>Fase</a:t>
           </a:r>
           <a:r>
-            <a:rPr lang="en-GB" dirty="0" smtClean="0"/>
+            <a:rPr lang="en-GB" sz="2400" dirty="0" smtClean="0"/>
             <a:t> 3</a:t>
           </a:r>
-          <a:endParaRPr lang="nl-BE" dirty="0"/>
+          <a:endParaRPr lang="nl-BE" sz="2400" dirty="0"/>
         </a:p>
       </dgm:t>
     </dgm:pt>
@@ -5413,43 +5627,52 @@
       </dgm:t>
     </dgm:pt>
     <dgm:pt modelId="{D7177FE1-B5AF-423E-90BA-D15CD7AFC6BF}">
-      <dgm:prSet phldrT="[Text]"/>
-      <dgm:spPr/>
+      <dgm:prSet phldrT="[Text]" custT="1"/>
+      <dgm:spPr>
+        <a:solidFill>
+          <a:schemeClr val="lt1">
+            <a:hueOff val="0"/>
+            <a:satOff val="0"/>
+            <a:lumOff val="0"/>
+            <a:alpha val="50000"/>
+          </a:schemeClr>
+        </a:solidFill>
+      </dgm:spPr>
       <dgm:t>
         <a:bodyPr/>
         <a:lstStyle/>
         <a:p>
           <a:r>
-            <a:rPr lang="en-GB" dirty="0" err="1" smtClean="0">
+            <a:rPr lang="en-GB" sz="2400" b="0" dirty="0" err="1" smtClean="0">
               <a:latin typeface="Arial Rounded MT Bold" panose="020F0704030504030204" pitchFamily="34" charset="0"/>
             </a:rPr>
             <a:t>Bouwen</a:t>
           </a:r>
           <a:r>
-            <a:rPr lang="en-GB" dirty="0" smtClean="0">
+            <a:rPr lang="en-GB" sz="2400" b="0" dirty="0" smtClean="0">
               <a:latin typeface="Arial Rounded MT Bold" panose="020F0704030504030204" pitchFamily="34" charset="0"/>
             </a:rPr>
             <a:t> van prototypes </a:t>
           </a:r>
           <a:r>
-            <a:rPr lang="en-GB" dirty="0" err="1" smtClean="0">
+            <a:rPr lang="en-GB" sz="2400" b="0" dirty="0" err="1" smtClean="0">
               <a:latin typeface="Arial Rounded MT Bold" panose="020F0704030504030204" pitchFamily="34" charset="0"/>
             </a:rPr>
             <a:t>voor</a:t>
           </a:r>
           <a:r>
-            <a:rPr lang="en-GB" dirty="0" smtClean="0">
+            <a:rPr lang="en-GB" sz="2400" b="0" dirty="0" smtClean="0">
               <a:latin typeface="Arial Rounded MT Bold" panose="020F0704030504030204" pitchFamily="34" charset="0"/>
             </a:rPr>
             <a:t> heel het </a:t>
           </a:r>
           <a:r>
-            <a:rPr lang="en-GB" dirty="0" err="1" smtClean="0">
+            <a:rPr lang="en-GB" sz="2400" b="0" dirty="0" err="1" smtClean="0">
               <a:latin typeface="Arial Rounded MT Bold" panose="020F0704030504030204" pitchFamily="34" charset="0"/>
             </a:rPr>
             <a:t>gebouw</a:t>
           </a:r>
-          <a:endParaRPr lang="nl-BE" dirty="0">
+          <a:endParaRPr lang="nl-BE" sz="2400" b="0" dirty="0">
             <a:latin typeface="Arial Rounded MT Bold" panose="020F0704030504030204" pitchFamily="34" charset="0"/>
           </a:endParaRPr>
         </a:p>
@@ -5478,49 +5701,58 @@
       </dgm:t>
     </dgm:pt>
     <dgm:pt modelId="{06BC6F52-A032-4D29-B164-3AB1B3A57E42}">
-      <dgm:prSet phldrT="[Text]"/>
-      <dgm:spPr/>
+      <dgm:prSet phldrT="[Text]" custT="1"/>
+      <dgm:spPr>
+        <a:solidFill>
+          <a:schemeClr val="lt1">
+            <a:hueOff val="0"/>
+            <a:satOff val="0"/>
+            <a:lumOff val="0"/>
+            <a:alpha val="50000"/>
+          </a:schemeClr>
+        </a:solidFill>
+      </dgm:spPr>
       <dgm:t>
         <a:bodyPr/>
         <a:lstStyle/>
         <a:p>
           <a:r>
-            <a:rPr lang="en-GB" dirty="0" err="1" smtClean="0">
+            <a:rPr lang="en-GB" sz="2400" b="0" dirty="0" err="1" smtClean="0">
               <a:latin typeface="Arial Rounded MT Bold" panose="020F0704030504030204" pitchFamily="34" charset="0"/>
             </a:rPr>
             <a:t>Testen</a:t>
           </a:r>
           <a:r>
-            <a:rPr lang="en-GB" dirty="0" smtClean="0">
+            <a:rPr lang="en-GB" sz="2400" b="0" dirty="0" smtClean="0">
               <a:latin typeface="Arial Rounded MT Bold" panose="020F0704030504030204" pitchFamily="34" charset="0"/>
             </a:rPr>
             <a:t> in het hele </a:t>
           </a:r>
           <a:r>
-            <a:rPr lang="en-GB" dirty="0" err="1" smtClean="0">
+            <a:rPr lang="en-GB" sz="2400" b="0" dirty="0" err="1" smtClean="0">
               <a:latin typeface="Arial Rounded MT Bold" panose="020F0704030504030204" pitchFamily="34" charset="0"/>
             </a:rPr>
             <a:t>gebouw</a:t>
           </a:r>
           <a:r>
-            <a:rPr lang="en-GB" dirty="0" smtClean="0">
+            <a:rPr lang="en-GB" sz="2400" b="0" dirty="0" smtClean="0">
               <a:latin typeface="Arial Rounded MT Bold" panose="020F0704030504030204" pitchFamily="34" charset="0"/>
             </a:rPr>
             <a:t> van </a:t>
           </a:r>
           <a:r>
-            <a:rPr lang="en-GB" dirty="0" err="1" smtClean="0">
+            <a:rPr lang="en-GB" sz="2400" b="0" dirty="0" err="1" smtClean="0">
               <a:latin typeface="Arial Rounded MT Bold" panose="020F0704030504030204" pitchFamily="34" charset="0"/>
             </a:rPr>
             <a:t>Digipolis</a:t>
           </a:r>
           <a:r>
-            <a:rPr lang="en-GB" dirty="0" smtClean="0">
+            <a:rPr lang="en-GB" sz="2400" b="0" dirty="0" smtClean="0">
               <a:latin typeface="Arial Rounded MT Bold" panose="020F0704030504030204" pitchFamily="34" charset="0"/>
             </a:rPr>
             <a:t> 2</a:t>
           </a:r>
-          <a:endParaRPr lang="nl-BE" dirty="0">
+          <a:endParaRPr lang="nl-BE" sz="2400" b="0" dirty="0">
             <a:latin typeface="Arial Rounded MT Bold" panose="020F0704030504030204" pitchFamily="34" charset="0"/>
           </a:endParaRPr>
         </a:p>
@@ -5549,7 +5781,7 @@
       </dgm:t>
     </dgm:pt>
     <dgm:pt modelId="{D5B6D92D-5CB6-4C76-AD8D-180015F2559E}">
-      <dgm:prSet phldrT="[Text]"/>
+      <dgm:prSet phldrT="[Text]" custT="1"/>
       <dgm:spPr>
         <a:solidFill>
           <a:schemeClr val="accent4"/>
@@ -5560,22 +5792,22 @@
         <a:lstStyle/>
         <a:p>
           <a:r>
-            <a:rPr lang="en-GB" dirty="0" err="1" smtClean="0">
+            <a:rPr lang="en-GB" sz="2400" dirty="0" err="1" smtClean="0">
               <a:latin typeface="Arial Rounded MT Bold" panose="020F0704030504030204" pitchFamily="34" charset="0"/>
             </a:rPr>
             <a:t>Fase</a:t>
           </a:r>
           <a:r>
-            <a:rPr lang="en-GB" dirty="0" smtClean="0">
+            <a:rPr lang="en-GB" sz="2400" dirty="0" smtClean="0">
               <a:latin typeface="Arial Rounded MT Bold" panose="020F0704030504030204" pitchFamily="34" charset="0"/>
             </a:rPr>
             <a:t> </a:t>
           </a:r>
           <a:r>
-            <a:rPr lang="en-GB" dirty="0" smtClean="0"/>
+            <a:rPr lang="en-GB" sz="2400" dirty="0" smtClean="0"/>
             <a:t>4</a:t>
           </a:r>
-          <a:endParaRPr lang="nl-BE" dirty="0"/>
+          <a:endParaRPr lang="nl-BE" sz="2400" dirty="0"/>
         </a:p>
       </dgm:t>
     </dgm:pt>
@@ -5602,67 +5834,76 @@
       </dgm:t>
     </dgm:pt>
     <dgm:pt modelId="{508F2F0F-C344-4F2C-AE62-F509BDF25E2A}">
-      <dgm:prSet phldrT="[Text]"/>
-      <dgm:spPr/>
+      <dgm:prSet phldrT="[Text]" custT="1"/>
+      <dgm:spPr>
+        <a:solidFill>
+          <a:schemeClr val="lt1">
+            <a:hueOff val="0"/>
+            <a:satOff val="0"/>
+            <a:lumOff val="0"/>
+            <a:alpha val="50000"/>
+          </a:schemeClr>
+        </a:solidFill>
+      </dgm:spPr>
       <dgm:t>
         <a:bodyPr/>
         <a:lstStyle/>
         <a:p>
           <a:r>
-            <a:rPr lang="en-GB" dirty="0" err="1" smtClean="0">
+            <a:rPr lang="en-GB" sz="2400" dirty="0" err="1" smtClean="0">
               <a:latin typeface="Arial Rounded MT Bold" panose="020F0704030504030204" pitchFamily="34" charset="0"/>
             </a:rPr>
             <a:t>Verdere</a:t>
           </a:r>
           <a:r>
-            <a:rPr lang="en-GB" dirty="0" smtClean="0">
+            <a:rPr lang="en-GB" sz="2400" dirty="0" smtClean="0">
               <a:latin typeface="Arial Rounded MT Bold" panose="020F0704030504030204" pitchFamily="34" charset="0"/>
             </a:rPr>
             <a:t> </a:t>
           </a:r>
           <a:r>
-            <a:rPr lang="en-GB" dirty="0" err="1" smtClean="0">
+            <a:rPr lang="en-GB" sz="2400" dirty="0" err="1" smtClean="0">
               <a:latin typeface="Arial Rounded MT Bold" panose="020F0704030504030204" pitchFamily="34" charset="0"/>
             </a:rPr>
             <a:t>uitbereiding</a:t>
           </a:r>
           <a:r>
-            <a:rPr lang="en-GB" dirty="0" smtClean="0">
+            <a:rPr lang="en-GB" sz="2400" dirty="0" smtClean="0">
               <a:latin typeface="Arial Rounded MT Bold" panose="020F0704030504030204" pitchFamily="34" charset="0"/>
             </a:rPr>
             <a:t> </a:t>
           </a:r>
           <a:r>
-            <a:rPr lang="en-GB" dirty="0" err="1" smtClean="0">
+            <a:rPr lang="en-GB" sz="2400" dirty="0" err="1" smtClean="0">
               <a:latin typeface="Arial Rounded MT Bold" panose="020F0704030504030204" pitchFamily="34" charset="0"/>
             </a:rPr>
             <a:t>naar</a:t>
           </a:r>
           <a:r>
-            <a:rPr lang="en-GB" dirty="0" smtClean="0">
+            <a:rPr lang="en-GB" sz="2400" dirty="0" smtClean="0">
               <a:latin typeface="Arial Rounded MT Bold" panose="020F0704030504030204" pitchFamily="34" charset="0"/>
             </a:rPr>
             <a:t> </a:t>
           </a:r>
           <a:r>
-            <a:rPr lang="en-GB" dirty="0" err="1" smtClean="0">
+            <a:rPr lang="en-GB" sz="2400" dirty="0" err="1" smtClean="0">
               <a:latin typeface="Arial Rounded MT Bold" panose="020F0704030504030204" pitchFamily="34" charset="0"/>
             </a:rPr>
             <a:t>andere</a:t>
           </a:r>
           <a:r>
-            <a:rPr lang="en-GB" dirty="0" smtClean="0">
+            <a:rPr lang="en-GB" sz="2400" dirty="0" smtClean="0">
               <a:latin typeface="Arial Rounded MT Bold" panose="020F0704030504030204" pitchFamily="34" charset="0"/>
             </a:rPr>
             <a:t> </a:t>
           </a:r>
           <a:r>
-            <a:rPr lang="en-GB" dirty="0" err="1" smtClean="0">
+            <a:rPr lang="en-GB" sz="2400" dirty="0" err="1" smtClean="0">
               <a:latin typeface="Arial Rounded MT Bold" panose="020F0704030504030204" pitchFamily="34" charset="0"/>
             </a:rPr>
             <a:t>gebouwen</a:t>
           </a:r>
-          <a:endParaRPr lang="nl-BE" dirty="0">
+          <a:endParaRPr lang="nl-BE" sz="2400" dirty="0">
             <a:latin typeface="Arial Rounded MT Bold" panose="020F0704030504030204" pitchFamily="34" charset="0"/>
           </a:endParaRPr>
         </a:p>
@@ -5690,6 +5931,98 @@
         </a:p>
       </dgm:t>
     </dgm:pt>
+    <dgm:pt modelId="{A38B6DAB-10FC-4A4C-B9C2-580B0CABD112}">
+      <dgm:prSet phldrT="[Text]" custT="1"/>
+      <dgm:spPr>
+        <a:solidFill>
+          <a:schemeClr val="lt1">
+            <a:hueOff val="0"/>
+            <a:satOff val="0"/>
+            <a:lumOff val="0"/>
+            <a:alpha val="50000"/>
+          </a:schemeClr>
+        </a:solidFill>
+      </dgm:spPr>
+      <dgm:t>
+        <a:bodyPr/>
+        <a:lstStyle/>
+        <a:p>
+          <a:r>
+            <a:rPr lang="en-GB" sz="2400" b="0" dirty="0" err="1" smtClean="0">
+              <a:latin typeface="Arial Rounded MT Bold" panose="020F0704030504030204" pitchFamily="34" charset="0"/>
+            </a:rPr>
+            <a:t>Toevoegen</a:t>
+          </a:r>
+          <a:r>
+            <a:rPr lang="en-GB" sz="2400" b="0" dirty="0" smtClean="0">
+              <a:latin typeface="Arial Rounded MT Bold" panose="020F0704030504030204" pitchFamily="34" charset="0"/>
+            </a:rPr>
+            <a:t> van </a:t>
+          </a:r>
+          <a:r>
+            <a:rPr lang="nl-BE" sz="2400" b="0" noProof="0" dirty="0" smtClean="0">
+              <a:latin typeface="Arial Rounded MT Bold" panose="020F0704030504030204" pitchFamily="34" charset="0"/>
+            </a:rPr>
+            <a:t>meerdere</a:t>
+          </a:r>
+          <a:r>
+            <a:rPr lang="en-GB" sz="2400" b="0" dirty="0" smtClean="0">
+              <a:latin typeface="Arial Rounded MT Bold" panose="020F0704030504030204" pitchFamily="34" charset="0"/>
+            </a:rPr>
+            <a:t> sensors (nog </a:t>
+          </a:r>
+          <a:r>
+            <a:rPr lang="en-GB" sz="2400" b="0" dirty="0" err="1" smtClean="0">
+              <a:latin typeface="Arial Rounded MT Bold" panose="020F0704030504030204" pitchFamily="34" charset="0"/>
+            </a:rPr>
+            <a:t>niet</a:t>
+          </a:r>
+          <a:r>
+            <a:rPr lang="en-GB" sz="2400" b="0" dirty="0" smtClean="0">
+              <a:latin typeface="Arial Rounded MT Bold" panose="020F0704030504030204" pitchFamily="34" charset="0"/>
+            </a:rPr>
+            <a:t> </a:t>
+          </a:r>
+          <a:r>
+            <a:rPr lang="en-GB" sz="2400" b="0" dirty="0" err="1" smtClean="0">
+              <a:latin typeface="Arial Rounded MT Bold" panose="020F0704030504030204" pitchFamily="34" charset="0"/>
+            </a:rPr>
+            <a:t>beslist</a:t>
+          </a:r>
+          <a:r>
+            <a:rPr lang="en-GB" sz="2400" b="0" dirty="0" smtClean="0">
+              <a:latin typeface="Arial Rounded MT Bold" panose="020F0704030504030204" pitchFamily="34" charset="0"/>
+            </a:rPr>
+            <a:t>)</a:t>
+          </a:r>
+          <a:endParaRPr lang="nl-BE" sz="2400" b="0" dirty="0">
+            <a:latin typeface="Arial Rounded MT Bold" panose="020F0704030504030204" pitchFamily="34" charset="0"/>
+          </a:endParaRPr>
+        </a:p>
+      </dgm:t>
+    </dgm:pt>
+    <dgm:pt modelId="{B55308D3-E5BC-422C-97B5-4860FB5FF9E7}" type="parTrans" cxnId="{191523F2-9D6E-43D9-8790-A245B226C9F1}">
+      <dgm:prSet/>
+      <dgm:spPr/>
+      <dgm:t>
+        <a:bodyPr/>
+        <a:lstStyle/>
+        <a:p>
+          <a:endParaRPr lang="nl-BE"/>
+        </a:p>
+      </dgm:t>
+    </dgm:pt>
+    <dgm:pt modelId="{1FD5320D-4A61-4B47-8FC9-D5022A0EE5D9}" type="sibTrans" cxnId="{191523F2-9D6E-43D9-8790-A245B226C9F1}">
+      <dgm:prSet/>
+      <dgm:spPr/>
+      <dgm:t>
+        <a:bodyPr/>
+        <a:lstStyle/>
+        <a:p>
+          <a:endParaRPr lang="nl-BE"/>
+        </a:p>
+      </dgm:t>
+    </dgm:pt>
     <dgm:pt modelId="{BA61877B-F250-4AAD-818B-96915BDB9B22}" type="pres">
       <dgm:prSet presAssocID="{4FC92D27-7CA9-464B-9AAC-53E02BC881C6}" presName="linearFlow" presStyleCnt="0">
         <dgm:presLayoutVars>
@@ -5699,6 +6032,13 @@
         </dgm:presLayoutVars>
       </dgm:prSet>
       <dgm:spPr/>
+      <dgm:t>
+        <a:bodyPr/>
+        <a:lstStyle/>
+        <a:p>
+          <a:endParaRPr lang="nl-BE"/>
+        </a:p>
+      </dgm:t>
     </dgm:pt>
     <dgm:pt modelId="{493132B9-AB83-4ADF-9227-E0C398F6141E}" type="pres">
       <dgm:prSet presAssocID="{3F6D1125-9C98-480D-A594-F25492B47CE3}" presName="composite" presStyleCnt="0"/>
@@ -5744,21 +6084,35 @@
       <dgm:spPr/>
     </dgm:pt>
     <dgm:pt modelId="{7E9B934E-2CE4-4BB9-9804-2AE3E4B98AB0}" type="pres">
-      <dgm:prSet presAssocID="{D7C8BC63-786A-40C4-8B8F-15E6B0DD8657}" presName="parentText" presStyleLbl="alignNode1" presStyleIdx="1" presStyleCnt="4">
+      <dgm:prSet presAssocID="{D7C8BC63-786A-40C4-8B8F-15E6B0DD8657}" presName="parentText" presStyleLbl="alignNode1" presStyleIdx="1" presStyleCnt="4" custLinFactNeighborX="-1714" custLinFactNeighborY="-18924">
         <dgm:presLayoutVars>
           <dgm:chMax val="1"/>
           <dgm:bulletEnabled val="1"/>
         </dgm:presLayoutVars>
       </dgm:prSet>
       <dgm:spPr/>
+      <dgm:t>
+        <a:bodyPr/>
+        <a:lstStyle/>
+        <a:p>
+          <a:endParaRPr lang="nl-BE"/>
+        </a:p>
+      </dgm:t>
     </dgm:pt>
     <dgm:pt modelId="{C67B5A0F-0987-4995-B317-F7DC20F70FDD}" type="pres">
-      <dgm:prSet presAssocID="{D7C8BC63-786A-40C4-8B8F-15E6B0DD8657}" presName="descendantText" presStyleLbl="alignAcc1" presStyleIdx="1" presStyleCnt="4">
+      <dgm:prSet presAssocID="{D7C8BC63-786A-40C4-8B8F-15E6B0DD8657}" presName="descendantText" presStyleLbl="alignAcc1" presStyleIdx="1" presStyleCnt="4" custScaleY="163791" custLinFactNeighborY="-12915">
         <dgm:presLayoutVars>
           <dgm:bulletEnabled val="1"/>
         </dgm:presLayoutVars>
       </dgm:prSet>
       <dgm:spPr/>
+      <dgm:t>
+        <a:bodyPr/>
+        <a:lstStyle/>
+        <a:p>
+          <a:endParaRPr lang="nl-BE"/>
+        </a:p>
+      </dgm:t>
     </dgm:pt>
     <dgm:pt modelId="{5A326924-7212-4141-B388-8DF5D6161222}" type="pres">
       <dgm:prSet presAssocID="{24881914-52F0-48B6-B0A5-E68B5293DCBD}" presName="sp" presStyleCnt="0"/>
@@ -5769,16 +6123,23 @@
       <dgm:spPr/>
     </dgm:pt>
     <dgm:pt modelId="{70FBF651-615D-4F87-9430-6097E72966B4}" type="pres">
-      <dgm:prSet presAssocID="{B7483DA8-39BA-4BA3-87DD-94CB73DCED0A}" presName="parentText" presStyleLbl="alignNode1" presStyleIdx="2" presStyleCnt="4">
+      <dgm:prSet presAssocID="{B7483DA8-39BA-4BA3-87DD-94CB73DCED0A}" presName="parentText" presStyleLbl="alignNode1" presStyleIdx="2" presStyleCnt="4" custLinFactNeighborY="-4798">
         <dgm:presLayoutVars>
           <dgm:chMax val="1"/>
           <dgm:bulletEnabled val="1"/>
         </dgm:presLayoutVars>
       </dgm:prSet>
       <dgm:spPr/>
+      <dgm:t>
+        <a:bodyPr/>
+        <a:lstStyle/>
+        <a:p>
+          <a:endParaRPr lang="nl-BE"/>
+        </a:p>
+      </dgm:t>
     </dgm:pt>
     <dgm:pt modelId="{2E54FC23-FF6E-4620-8988-9E3376FA05C9}" type="pres">
-      <dgm:prSet presAssocID="{B7483DA8-39BA-4BA3-87DD-94CB73DCED0A}" presName="descendantText" presStyleLbl="alignAcc1" presStyleIdx="2" presStyleCnt="4">
+      <dgm:prSet presAssocID="{B7483DA8-39BA-4BA3-87DD-94CB73DCED0A}" presName="descendantText" presStyleLbl="alignAcc1" presStyleIdx="2" presStyleCnt="4" custScaleY="126943">
         <dgm:presLayoutVars>
           <dgm:bulletEnabled val="1"/>
         </dgm:presLayoutVars>
@@ -5808,6 +6169,13 @@
         </dgm:presLayoutVars>
       </dgm:prSet>
       <dgm:spPr/>
+      <dgm:t>
+        <a:bodyPr/>
+        <a:lstStyle/>
+        <a:p>
+          <a:endParaRPr lang="nl-BE"/>
+        </a:p>
+      </dgm:t>
     </dgm:pt>
     <dgm:pt modelId="{B69CD7D7-3D43-44A7-9D66-069B1070C034}" type="pres">
       <dgm:prSet presAssocID="{D5B6D92D-5CB6-4C76-AD8D-180015F2559E}" presName="descendantText" presStyleLbl="alignAcc1" presStyleIdx="3" presStyleCnt="4">
@@ -5816,12 +6184,21 @@
         </dgm:presLayoutVars>
       </dgm:prSet>
       <dgm:spPr/>
+      <dgm:t>
+        <a:bodyPr/>
+        <a:lstStyle/>
+        <a:p>
+          <a:endParaRPr lang="nl-BE"/>
+        </a:p>
+      </dgm:t>
     </dgm:pt>
   </dgm:ptLst>
   <dgm:cxnLst>
+    <dgm:cxn modelId="{191523F2-9D6E-43D9-8790-A245B226C9F1}" srcId="{D7C8BC63-786A-40C4-8B8F-15E6B0DD8657}" destId="{A38B6DAB-10FC-4A4C-B9C2-580B0CABD112}" srcOrd="1" destOrd="0" parTransId="{B55308D3-E5BC-422C-97B5-4860FB5FF9E7}" sibTransId="{1FD5320D-4A61-4B47-8FC9-D5022A0EE5D9}"/>
     <dgm:cxn modelId="{579BE90B-314C-4D10-B1BD-DD501E8A03AD}" type="presOf" srcId="{39822E80-D4B5-4E04-90BB-196C709D1316}" destId="{38A8BA1E-811B-4496-AA63-2B5267F87596}" srcOrd="0" destOrd="1" presId="urn:microsoft.com/office/officeart/2005/8/layout/chevron2"/>
+    <dgm:cxn modelId="{51AAAFC5-2957-4006-A5D7-3DA7A6AD16D3}" type="presOf" srcId="{A38B6DAB-10FC-4A4C-B9C2-580B0CABD112}" destId="{C67B5A0F-0987-4995-B317-F7DC20F70FDD}" srcOrd="0" destOrd="1" presId="urn:microsoft.com/office/officeart/2005/8/layout/chevron2"/>
     <dgm:cxn modelId="{ACB4CC4F-E767-49FD-80B2-510BD286EC19}" srcId="{4FC92D27-7CA9-464B-9AAC-53E02BC881C6}" destId="{D5B6D92D-5CB6-4C76-AD8D-180015F2559E}" srcOrd="3" destOrd="0" parTransId="{89526078-E8C8-42A1-91F8-80CE82207A31}" sibTransId="{36B4B98D-C188-4B1A-82E8-71E87AF04C83}"/>
-    <dgm:cxn modelId="{3CD49824-C617-411E-B8CC-53E4EDBBBA48}" srcId="{D7C8BC63-786A-40C4-8B8F-15E6B0DD8657}" destId="{022BB9A1-B624-4E9F-BA62-0DAEE0137388}" srcOrd="1" destOrd="0" parTransId="{3EF0E0D0-EF56-4F70-B748-34683BDBAA33}" sibTransId="{2F8A362D-E822-441D-A34E-41513864D7CF}"/>
+    <dgm:cxn modelId="{3CD49824-C617-411E-B8CC-53E4EDBBBA48}" srcId="{D7C8BC63-786A-40C4-8B8F-15E6B0DD8657}" destId="{022BB9A1-B624-4E9F-BA62-0DAEE0137388}" srcOrd="2" destOrd="0" parTransId="{3EF0E0D0-EF56-4F70-B748-34683BDBAA33}" sibTransId="{2F8A362D-E822-441D-A34E-41513864D7CF}"/>
     <dgm:cxn modelId="{A346273E-521B-442A-8DC8-303D69AD4890}" type="presOf" srcId="{4FC92D27-7CA9-464B-9AAC-53E02BC881C6}" destId="{BA61877B-F250-4AAD-818B-96915BDB9B22}" srcOrd="0" destOrd="0" presId="urn:microsoft.com/office/officeart/2005/8/layout/chevron2"/>
     <dgm:cxn modelId="{869B696C-4E91-40F1-9085-DB62F1308E67}" type="presOf" srcId="{0BDE11B2-9E37-4D05-93D8-9904BF709E94}" destId="{38A8BA1E-811B-4496-AA63-2B5267F87596}" srcOrd="0" destOrd="0" presId="urn:microsoft.com/office/officeart/2005/8/layout/chevron2"/>
     <dgm:cxn modelId="{9BAD396E-5731-416E-B3CE-DB9B494B03F8}" srcId="{D7C8BC63-786A-40C4-8B8F-15E6B0DD8657}" destId="{22D7EF16-7941-4158-BC18-1A0A0AECBAE5}" srcOrd="0" destOrd="0" parTransId="{DB8684B7-F71A-43A1-BCD9-6845BCBE7E8A}" sibTransId="{3F59EFF0-321E-42EF-A049-FB844F265394}"/>
@@ -5838,7 +6215,7 @@
     <dgm:cxn modelId="{3D49D224-4758-402C-ADCE-8A5810D2A921}" type="presOf" srcId="{D7C8BC63-786A-40C4-8B8F-15E6B0DD8657}" destId="{7E9B934E-2CE4-4BB9-9804-2AE3E4B98AB0}" srcOrd="0" destOrd="0" presId="urn:microsoft.com/office/officeart/2005/8/layout/chevron2"/>
     <dgm:cxn modelId="{5594275A-B9A6-401B-861C-19E41E604D72}" type="presOf" srcId="{22D7EF16-7941-4158-BC18-1A0A0AECBAE5}" destId="{C67B5A0F-0987-4995-B317-F7DC20F70FDD}" srcOrd="0" destOrd="0" presId="urn:microsoft.com/office/officeart/2005/8/layout/chevron2"/>
     <dgm:cxn modelId="{88DC221E-643A-4EDB-8F94-2A2602B39CD6}" type="presOf" srcId="{D5B6D92D-5CB6-4C76-AD8D-180015F2559E}" destId="{8D96AB64-7470-49B9-BBB2-6F6DD160A68C}" srcOrd="0" destOrd="0" presId="urn:microsoft.com/office/officeart/2005/8/layout/chevron2"/>
-    <dgm:cxn modelId="{78EAD267-4E49-40B9-86BC-8E1EB1533080}" type="presOf" srcId="{022BB9A1-B624-4E9F-BA62-0DAEE0137388}" destId="{C67B5A0F-0987-4995-B317-F7DC20F70FDD}" srcOrd="0" destOrd="1" presId="urn:microsoft.com/office/officeart/2005/8/layout/chevron2"/>
+    <dgm:cxn modelId="{78EAD267-4E49-40B9-86BC-8E1EB1533080}" type="presOf" srcId="{022BB9A1-B624-4E9F-BA62-0DAEE0137388}" destId="{C67B5A0F-0987-4995-B317-F7DC20F70FDD}" srcOrd="0" destOrd="2" presId="urn:microsoft.com/office/officeart/2005/8/layout/chevron2"/>
     <dgm:cxn modelId="{23EE270C-C2B7-4DA4-859F-475C1DC3623B}" srcId="{B7483DA8-39BA-4BA3-87DD-94CB73DCED0A}" destId="{06BC6F52-A032-4D29-B164-3AB1B3A57E42}" srcOrd="1" destOrd="0" parTransId="{D685C5A8-595A-49AB-AE9F-CA16364501A6}" sibTransId="{CEC10C90-34B7-483C-80FA-CDB32F9589E9}"/>
     <dgm:cxn modelId="{4E726AB7-2680-4A84-8713-80BDD3795223}" type="presOf" srcId="{06BC6F52-A032-4D29-B164-3AB1B3A57E42}" destId="{2E54FC23-FF6E-4620-8988-9E3376FA05C9}" srcOrd="0" destOrd="1" presId="urn:microsoft.com/office/officeart/2005/8/layout/chevron2"/>
     <dgm:cxn modelId="{0388F8BE-BA60-4ECB-8ADA-349C52C32FA2}" type="presOf" srcId="{3F6D1125-9C98-480D-A594-F25492B47CE3}" destId="{02A3927B-5301-47FB-A751-881D86367340}" srcOrd="0" destOrd="0" presId="urn:microsoft.com/office/officeart/2005/8/layout/chevron2"/>
@@ -5946,11 +6323,10 @@
         </a:prstGeom>
         <a:solidFill>
           <a:schemeClr val="lt1">
-            <a:alpha val="90000"/>
             <a:hueOff val="0"/>
             <a:satOff val="0"/>
             <a:lumOff val="0"/>
-            <a:alphaOff val="0"/>
+            <a:alpha val="50000"/>
           </a:schemeClr>
         </a:solidFill>
         <a:ln w="12700" cap="flat" cmpd="sng" algn="ctr">
@@ -6231,11 +6607,10 @@
         </a:prstGeom>
         <a:solidFill>
           <a:schemeClr val="lt1">
-            <a:alpha val="90000"/>
             <a:hueOff val="0"/>
             <a:satOff val="0"/>
             <a:lumOff val="0"/>
-            <a:alphaOff val="0"/>
+            <a:alpha val="50000"/>
           </a:schemeClr>
         </a:solidFill>
         <a:ln w="12700" cap="flat" cmpd="sng" algn="ctr">
@@ -6498,11 +6873,10 @@
         </a:prstGeom>
         <a:solidFill>
           <a:schemeClr val="lt1">
-            <a:alpha val="90000"/>
             <a:hueOff val="0"/>
             <a:satOff val="0"/>
             <a:lumOff val="0"/>
-            <a:alphaOff val="0"/>
+            <a:alpha val="50000"/>
           </a:schemeClr>
         </a:solidFill>
         <a:ln w="12700" cap="flat" cmpd="sng" algn="ctr">
@@ -6897,7 +7271,7 @@
       </dsp:nvSpPr>
       <dsp:spPr>
         <a:xfrm>
-          <a:off x="555811" y="2104053"/>
+          <a:off x="263710" y="2872787"/>
           <a:ext cx="2628664" cy="2225531"/>
         </a:xfrm>
         <a:prstGeom prst="roundRect">
@@ -6910,7 +7284,7 @@
             <a:hueOff val="0"/>
             <a:satOff val="0"/>
             <a:lumOff val="0"/>
-            <a:alphaOff val="0"/>
+            <a:alpha val="50000"/>
           </a:schemeClr>
         </a:solidFill>
         <a:ln w="12700" cap="flat" cmpd="sng" algn="ctr">
@@ -7063,7 +7437,7 @@
         </a:p>
       </dsp:txBody>
       <dsp:txXfrm>
-        <a:off x="620995" y="2169237"/>
+        <a:off x="328894" y="2937971"/>
         <a:ext cx="2498296" cy="2095163"/>
       </dsp:txXfrm>
     </dsp:sp>
@@ -7198,7 +7572,7 @@
       </dsp:nvSpPr>
       <dsp:spPr>
         <a:xfrm>
-          <a:off x="3873341" y="2139550"/>
+          <a:off x="3416127" y="2872787"/>
           <a:ext cx="3536281" cy="2225531"/>
         </a:xfrm>
         <a:prstGeom prst="roundRect">
@@ -7211,7 +7585,7 @@
             <a:hueOff val="0"/>
             <a:satOff val="0"/>
             <a:lumOff val="0"/>
-            <a:alphaOff val="0"/>
+            <a:alpha val="50000"/>
           </a:schemeClr>
         </a:solidFill>
         <a:ln w="12700" cap="flat" cmpd="sng" algn="ctr">
@@ -7400,7 +7774,7 @@
         </a:p>
       </dsp:txBody>
       <dsp:txXfrm>
-        <a:off x="3938525" y="2204734"/>
+        <a:off x="3481311" y="2937971"/>
         <a:ext cx="3405913" cy="2095163"/>
       </dsp:txXfrm>
     </dsp:sp>
@@ -7535,7 +7909,7 @@
       </dsp:nvSpPr>
       <dsp:spPr>
         <a:xfrm>
-          <a:off x="7945505" y="2104053"/>
+          <a:off x="7867834" y="2872787"/>
           <a:ext cx="3142428" cy="2225531"/>
         </a:xfrm>
         <a:prstGeom prst="roundRect">
@@ -7548,7 +7922,7 @@
             <a:hueOff val="0"/>
             <a:satOff val="0"/>
             <a:lumOff val="0"/>
-            <a:alphaOff val="0"/>
+            <a:alpha val="50000"/>
           </a:schemeClr>
         </a:solidFill>
         <a:ln w="12700" cap="flat" cmpd="sng" algn="ctr">
@@ -7672,7 +8046,7 @@
         </a:p>
       </dsp:txBody>
       <dsp:txXfrm>
-        <a:off x="8010689" y="2169237"/>
+        <a:off x="7933018" y="2937971"/>
         <a:ext cx="3012060" cy="2095163"/>
       </dsp:txXfrm>
     </dsp:sp>
@@ -8097,8 +8471,8 @@
       </dsp:nvSpPr>
       <dsp:spPr>
         <a:xfrm rot="5400000">
-          <a:off x="-171710" y="175346"/>
-          <a:ext cx="1144734" cy="801314"/>
+          <a:off x="-158813" y="161624"/>
+          <a:ext cx="1058754" cy="741128"/>
         </a:xfrm>
         <a:prstGeom prst="chevron">
           <a:avLst/>
@@ -8135,12 +8509,12 @@
         </a:fontRef>
       </dsp:style>
       <dsp:txBody>
-        <a:bodyPr spcFirstLastPara="0" vert="horz" wrap="square" lIns="12065" tIns="12065" rIns="12065" bIns="12065" numCol="1" spcCol="1270" anchor="ctr" anchorCtr="0">
+        <a:bodyPr spcFirstLastPara="0" vert="horz" wrap="square" lIns="15240" tIns="15240" rIns="15240" bIns="15240" numCol="1" spcCol="1270" anchor="ctr" anchorCtr="0">
           <a:noAutofit/>
         </a:bodyPr>
         <a:lstStyle/>
         <a:p>
-          <a:pPr lvl="0" algn="ctr" defTabSz="844550">
+          <a:pPr lvl="0" algn="ctr" defTabSz="1066800">
             <a:lnSpc>
               <a:spcPct val="90000"/>
             </a:lnSpc>
@@ -8152,25 +8526,25 @@
             </a:spcAft>
           </a:pPr>
           <a:r>
-            <a:rPr lang="en-GB" sz="1900" kern="1200" dirty="0" err="1" smtClean="0">
+            <a:rPr lang="en-GB" sz="2400" kern="1200" dirty="0" err="1" smtClean="0">
               <a:latin typeface="Arial Rounded MT Bold" panose="020F0704030504030204" pitchFamily="34" charset="0"/>
             </a:rPr>
             <a:t>Fase</a:t>
           </a:r>
           <a:r>
-            <a:rPr lang="en-GB" sz="1900" kern="1200" dirty="0" smtClean="0">
+            <a:rPr lang="en-GB" sz="2400" kern="1200" dirty="0" smtClean="0">
               <a:latin typeface="Arial Rounded MT Bold" panose="020F0704030504030204" pitchFamily="34" charset="0"/>
             </a:rPr>
             <a:t> 1</a:t>
           </a:r>
-          <a:endParaRPr lang="nl-BE" sz="1900" kern="1200" dirty="0">
+          <a:endParaRPr lang="nl-BE" sz="2400" kern="1200" dirty="0">
             <a:latin typeface="Arial Rounded MT Bold" panose="020F0704030504030204" pitchFamily="34" charset="0"/>
           </a:endParaRPr>
         </a:p>
       </dsp:txBody>
       <dsp:txXfrm rot="-5400000">
-        <a:off x="0" y="404293"/>
-        <a:ext cx="801314" cy="343420"/>
+        <a:off x="0" y="373375"/>
+        <a:ext cx="741128" cy="317626"/>
       </dsp:txXfrm>
     </dsp:sp>
     <dsp:sp modelId="{38A8BA1E-811B-4496-AA63-2B5267F87596}">
@@ -8180,19 +8554,18 @@
       </dsp:nvSpPr>
       <dsp:spPr>
         <a:xfrm rot="5400000">
-          <a:off x="3139660" y="-2334709"/>
-          <a:ext cx="744077" cy="5420769"/>
+          <a:off x="4965941" y="-4222002"/>
+          <a:ext cx="688552" cy="9138179"/>
         </a:xfrm>
         <a:prstGeom prst="round2SameRect">
           <a:avLst/>
         </a:prstGeom>
         <a:solidFill>
           <a:schemeClr val="lt1">
-            <a:alpha val="90000"/>
             <a:hueOff val="0"/>
             <a:satOff val="0"/>
             <a:lumOff val="0"/>
-            <a:alphaOff val="0"/>
+            <a:alpha val="50000"/>
           </a:schemeClr>
         </a:solidFill>
         <a:ln w="12700" cap="flat" cmpd="sng" algn="ctr">
@@ -8222,12 +8595,12 @@
         <a:fontRef idx="minor"/>
       </dsp:style>
       <dsp:txBody>
-        <a:bodyPr spcFirstLastPara="0" vert="horz" wrap="square" lIns="128016" tIns="11430" rIns="11430" bIns="11430" numCol="1" spcCol="1270" anchor="ctr" anchorCtr="0">
+        <a:bodyPr spcFirstLastPara="0" vert="horz" wrap="square" lIns="170688" tIns="15240" rIns="15240" bIns="15240" numCol="1" spcCol="1270" anchor="ctr" anchorCtr="0">
           <a:noAutofit/>
         </a:bodyPr>
         <a:lstStyle/>
         <a:p>
-          <a:pPr marL="171450" lvl="1" indent="-171450" algn="l" defTabSz="800100">
+          <a:pPr marL="228600" lvl="1" indent="-228600" algn="l" defTabSz="1066800">
             <a:lnSpc>
               <a:spcPct val="90000"/>
             </a:lnSpc>
@@ -8240,23 +8613,23 @@
             <a:buChar char="••"/>
           </a:pPr>
           <a:r>
-            <a:rPr lang="en-GB" sz="1800" kern="1200" dirty="0" err="1" smtClean="0">
+            <a:rPr lang="en-GB" sz="2400" b="0" kern="1200" dirty="0" err="1" smtClean="0">
               <a:latin typeface="Arial Rounded MT Bold" panose="020F0704030504030204" pitchFamily="34" charset="0"/>
             </a:rPr>
             <a:t>Bouwen</a:t>
           </a:r>
           <a:r>
-            <a:rPr lang="en-GB" sz="1800" kern="1200" dirty="0" smtClean="0">
+            <a:rPr lang="en-GB" sz="2400" b="0" kern="1200" dirty="0" smtClean="0">
               <a:latin typeface="Arial Rounded MT Bold" panose="020F0704030504030204" pitchFamily="34" charset="0"/>
             </a:rPr>
             <a:t> van 2 prototypes</a:t>
           </a:r>
-          <a:endParaRPr lang="nl-BE" sz="1800" kern="1200" dirty="0">
+          <a:endParaRPr lang="nl-BE" sz="2400" b="0" kern="1200" dirty="0">
             <a:latin typeface="Arial Rounded MT Bold" panose="020F0704030504030204" pitchFamily="34" charset="0"/>
           </a:endParaRPr>
         </a:p>
         <a:p>
-          <a:pPr marL="171450" lvl="1" indent="-171450" algn="l" defTabSz="800100">
+          <a:pPr marL="228600" lvl="1" indent="-228600" algn="l" defTabSz="1066800">
             <a:lnSpc>
               <a:spcPct val="90000"/>
             </a:lnSpc>
@@ -8269,31 +8642,31 @@
             <a:buChar char="••"/>
           </a:pPr>
           <a:r>
-            <a:rPr lang="en-GB" sz="1800" kern="1200" dirty="0" err="1" smtClean="0">
+            <a:rPr lang="en-GB" sz="2400" b="0" kern="1200" dirty="0" err="1" smtClean="0">
               <a:latin typeface="Arial Rounded MT Bold" panose="020F0704030504030204" pitchFamily="34" charset="0"/>
             </a:rPr>
             <a:t>Testen</a:t>
           </a:r>
           <a:r>
-            <a:rPr lang="en-GB" sz="1800" kern="1200" dirty="0" smtClean="0">
+            <a:rPr lang="en-GB" sz="2400" b="0" kern="1200" dirty="0" smtClean="0">
               <a:latin typeface="Arial Rounded MT Bold" panose="020F0704030504030204" pitchFamily="34" charset="0"/>
             </a:rPr>
             <a:t> in 2 </a:t>
           </a:r>
           <a:r>
-            <a:rPr lang="en-GB" sz="1800" kern="1200" dirty="0" err="1" smtClean="0">
+            <a:rPr lang="en-GB" sz="2400" b="0" kern="1200" dirty="0" err="1" smtClean="0">
               <a:latin typeface="Arial Rounded MT Bold" panose="020F0704030504030204" pitchFamily="34" charset="0"/>
             </a:rPr>
             <a:t>zalen</a:t>
           </a:r>
-          <a:endParaRPr lang="nl-BE" sz="1800" kern="1200" dirty="0">
+          <a:endParaRPr lang="nl-BE" sz="2400" b="0" kern="1200" dirty="0">
             <a:latin typeface="Arial Rounded MT Bold" panose="020F0704030504030204" pitchFamily="34" charset="0"/>
           </a:endParaRPr>
         </a:p>
       </dsp:txBody>
       <dsp:txXfrm rot="-5400000">
-        <a:off x="801315" y="39959"/>
-        <a:ext cx="5384446" cy="671431"/>
+        <a:off x="741128" y="36423"/>
+        <a:ext cx="9104567" cy="621328"/>
       </dsp:txXfrm>
     </dsp:sp>
     <dsp:sp modelId="{7E9B934E-2CE4-4BB9-9804-2AE3E4B98AB0}">
@@ -8303,8 +8676,8 @@
       </dsp:nvSpPr>
       <dsp:spPr>
         <a:xfrm rot="5400000">
-          <a:off x="-171710" y="1172037"/>
-          <a:ext cx="1144734" cy="801314"/>
+          <a:off x="-158813" y="1102597"/>
+          <a:ext cx="1058754" cy="741128"/>
         </a:xfrm>
         <a:prstGeom prst="chevron">
           <a:avLst/>
@@ -8341,12 +8714,12 @@
         </a:fontRef>
       </dsp:style>
       <dsp:txBody>
-        <a:bodyPr spcFirstLastPara="0" vert="horz" wrap="square" lIns="12065" tIns="12065" rIns="12065" bIns="12065" numCol="1" spcCol="1270" anchor="ctr" anchorCtr="0">
+        <a:bodyPr spcFirstLastPara="0" vert="horz" wrap="square" lIns="15240" tIns="15240" rIns="15240" bIns="15240" numCol="1" spcCol="1270" anchor="ctr" anchorCtr="0">
           <a:noAutofit/>
         </a:bodyPr>
         <a:lstStyle/>
         <a:p>
-          <a:pPr lvl="0" algn="ctr" defTabSz="844550">
+          <a:pPr lvl="0" algn="ctr" defTabSz="1066800">
             <a:lnSpc>
               <a:spcPct val="90000"/>
             </a:lnSpc>
@@ -8358,25 +8731,25 @@
             </a:spcAft>
           </a:pPr>
           <a:r>
-            <a:rPr lang="en-GB" sz="1900" kern="1200" dirty="0" err="1" smtClean="0">
+            <a:rPr lang="en-GB" sz="2400" kern="1200" dirty="0" err="1" smtClean="0">
               <a:latin typeface="Arial Rounded MT Bold" panose="020F0704030504030204" pitchFamily="34" charset="0"/>
             </a:rPr>
             <a:t>Fase</a:t>
           </a:r>
           <a:r>
-            <a:rPr lang="en-GB" sz="1900" kern="1200" dirty="0" smtClean="0">
+            <a:rPr lang="en-GB" sz="2400" kern="1200" dirty="0" smtClean="0">
               <a:latin typeface="Arial Rounded MT Bold" panose="020F0704030504030204" pitchFamily="34" charset="0"/>
             </a:rPr>
             <a:t> 2</a:t>
           </a:r>
-          <a:endParaRPr lang="nl-BE" sz="1900" kern="1200" dirty="0">
+          <a:endParaRPr lang="nl-BE" sz="2400" kern="1200" dirty="0">
             <a:latin typeface="Arial Rounded MT Bold" panose="020F0704030504030204" pitchFamily="34" charset="0"/>
           </a:endParaRPr>
         </a:p>
       </dsp:txBody>
       <dsp:txXfrm rot="-5400000">
-        <a:off x="0" y="1400984"/>
-        <a:ext cx="801314" cy="343420"/>
+        <a:off x="0" y="1314348"/>
+        <a:ext cx="741128" cy="317626"/>
       </dsp:txXfrm>
     </dsp:sp>
     <dsp:sp modelId="{C67B5A0F-0987-4995-B317-F7DC20F70FDD}">
@@ -8386,19 +8759,18 @@
       </dsp:nvSpPr>
       <dsp:spPr>
         <a:xfrm rot="5400000">
-          <a:off x="3139660" y="-1338019"/>
-          <a:ext cx="744077" cy="5420769"/>
+          <a:off x="4746621" y="-3169731"/>
+          <a:ext cx="1127194" cy="9138179"/>
         </a:xfrm>
         <a:prstGeom prst="round2SameRect">
           <a:avLst/>
         </a:prstGeom>
         <a:solidFill>
           <a:schemeClr val="lt1">
-            <a:alpha val="90000"/>
             <a:hueOff val="0"/>
             <a:satOff val="0"/>
             <a:lumOff val="0"/>
-            <a:alphaOff val="0"/>
+            <a:alpha val="50000"/>
           </a:schemeClr>
         </a:solidFill>
         <a:ln w="12700" cap="flat" cmpd="sng" algn="ctr">
@@ -8428,12 +8800,12 @@
         <a:fontRef idx="minor"/>
       </dsp:style>
       <dsp:txBody>
-        <a:bodyPr spcFirstLastPara="0" vert="horz" wrap="square" lIns="128016" tIns="11430" rIns="11430" bIns="11430" numCol="1" spcCol="1270" anchor="ctr" anchorCtr="0">
+        <a:bodyPr spcFirstLastPara="0" vert="horz" wrap="square" lIns="170688" tIns="15240" rIns="15240" bIns="15240" numCol="1" spcCol="1270" anchor="ctr" anchorCtr="0">
           <a:noAutofit/>
         </a:bodyPr>
         <a:lstStyle/>
         <a:p>
-          <a:pPr marL="171450" lvl="1" indent="-171450" algn="l" defTabSz="800100">
+          <a:pPr marL="228600" lvl="1" indent="-228600" algn="l" defTabSz="1066800">
             <a:lnSpc>
               <a:spcPct val="90000"/>
             </a:lnSpc>
@@ -8446,23 +8818,23 @@
             <a:buChar char="••"/>
           </a:pPr>
           <a:r>
-            <a:rPr lang="en-GB" sz="1800" kern="1200" dirty="0" err="1" smtClean="0">
+            <a:rPr lang="en-GB" sz="2400" b="0" kern="1200" dirty="0" err="1" smtClean="0">
               <a:latin typeface="Arial Rounded MT Bold" panose="020F0704030504030204" pitchFamily="34" charset="0"/>
             </a:rPr>
             <a:t>Bouwen</a:t>
           </a:r>
           <a:r>
-            <a:rPr lang="en-GB" sz="1800" kern="1200" dirty="0" smtClean="0">
+            <a:rPr lang="en-GB" sz="2400" b="0" kern="1200" dirty="0" smtClean="0">
               <a:latin typeface="Arial Rounded MT Bold" panose="020F0704030504030204" pitchFamily="34" charset="0"/>
             </a:rPr>
             <a:t> van 4 Prototypes</a:t>
           </a:r>
-          <a:endParaRPr lang="nl-BE" sz="1800" kern="1200" dirty="0">
+          <a:endParaRPr lang="nl-BE" sz="2400" b="0" kern="1200" dirty="0">
             <a:latin typeface="Arial Rounded MT Bold" panose="020F0704030504030204" pitchFamily="34" charset="0"/>
           </a:endParaRPr>
         </a:p>
         <a:p>
-          <a:pPr marL="171450" lvl="1" indent="-171450" algn="l" defTabSz="800100">
+          <a:pPr marL="228600" lvl="1" indent="-228600" algn="l" defTabSz="1066800">
             <a:lnSpc>
               <a:spcPct val="90000"/>
             </a:lnSpc>
@@ -8475,31 +8847,96 @@
             <a:buChar char="••"/>
           </a:pPr>
           <a:r>
-            <a:rPr lang="en-GB" sz="1800" kern="1200" dirty="0" err="1" smtClean="0">
+            <a:rPr lang="en-GB" sz="2400" b="0" kern="1200" dirty="0" err="1" smtClean="0">
+              <a:latin typeface="Arial Rounded MT Bold" panose="020F0704030504030204" pitchFamily="34" charset="0"/>
+            </a:rPr>
+            <a:t>Toevoegen</a:t>
+          </a:r>
+          <a:r>
+            <a:rPr lang="en-GB" sz="2400" b="0" kern="1200" dirty="0" smtClean="0">
+              <a:latin typeface="Arial Rounded MT Bold" panose="020F0704030504030204" pitchFamily="34" charset="0"/>
+            </a:rPr>
+            <a:t> van </a:t>
+          </a:r>
+          <a:r>
+            <a:rPr lang="nl-BE" sz="2400" b="0" kern="1200" noProof="0" dirty="0" smtClean="0">
+              <a:latin typeface="Arial Rounded MT Bold" panose="020F0704030504030204" pitchFamily="34" charset="0"/>
+            </a:rPr>
+            <a:t>meerdere</a:t>
+          </a:r>
+          <a:r>
+            <a:rPr lang="en-GB" sz="2400" b="0" kern="1200" dirty="0" smtClean="0">
+              <a:latin typeface="Arial Rounded MT Bold" panose="020F0704030504030204" pitchFamily="34" charset="0"/>
+            </a:rPr>
+            <a:t> sensors (nog </a:t>
+          </a:r>
+          <a:r>
+            <a:rPr lang="en-GB" sz="2400" b="0" kern="1200" dirty="0" err="1" smtClean="0">
+              <a:latin typeface="Arial Rounded MT Bold" panose="020F0704030504030204" pitchFamily="34" charset="0"/>
+            </a:rPr>
+            <a:t>niet</a:t>
+          </a:r>
+          <a:r>
+            <a:rPr lang="en-GB" sz="2400" b="0" kern="1200" dirty="0" smtClean="0">
+              <a:latin typeface="Arial Rounded MT Bold" panose="020F0704030504030204" pitchFamily="34" charset="0"/>
+            </a:rPr>
+            <a:t> </a:t>
+          </a:r>
+          <a:r>
+            <a:rPr lang="en-GB" sz="2400" b="0" kern="1200" dirty="0" err="1" smtClean="0">
+              <a:latin typeface="Arial Rounded MT Bold" panose="020F0704030504030204" pitchFamily="34" charset="0"/>
+            </a:rPr>
+            <a:t>beslist</a:t>
+          </a:r>
+          <a:r>
+            <a:rPr lang="en-GB" sz="2400" b="0" kern="1200" dirty="0" smtClean="0">
+              <a:latin typeface="Arial Rounded MT Bold" panose="020F0704030504030204" pitchFamily="34" charset="0"/>
+            </a:rPr>
+            <a:t>)</a:t>
+          </a:r>
+          <a:endParaRPr lang="nl-BE" sz="2400" b="0" kern="1200" dirty="0">
+            <a:latin typeface="Arial Rounded MT Bold" panose="020F0704030504030204" pitchFamily="34" charset="0"/>
+          </a:endParaRPr>
+        </a:p>
+        <a:p>
+          <a:pPr marL="228600" lvl="1" indent="-228600" algn="l" defTabSz="1066800">
+            <a:lnSpc>
+              <a:spcPct val="90000"/>
+            </a:lnSpc>
+            <a:spcBef>
+              <a:spcPct val="0"/>
+            </a:spcBef>
+            <a:spcAft>
+              <a:spcPct val="15000"/>
+            </a:spcAft>
+            <a:buChar char="••"/>
+          </a:pPr>
+          <a:r>
+            <a:rPr lang="en-GB" sz="2400" b="0" kern="1200" dirty="0" err="1" smtClean="0">
               <a:latin typeface="Arial Rounded MT Bold" panose="020F0704030504030204" pitchFamily="34" charset="0"/>
             </a:rPr>
             <a:t>Testen</a:t>
           </a:r>
           <a:r>
-            <a:rPr lang="en-GB" sz="1800" kern="1200" dirty="0" smtClean="0">
+            <a:rPr lang="en-GB" sz="2400" b="0" kern="1200" dirty="0" smtClean="0">
               <a:latin typeface="Arial Rounded MT Bold" panose="020F0704030504030204" pitchFamily="34" charset="0"/>
             </a:rPr>
             <a:t> op 1 </a:t>
           </a:r>
           <a:r>
-            <a:rPr lang="en-GB" sz="1800" kern="1200" dirty="0" err="1" smtClean="0">
+            <a:rPr lang="en-GB" sz="2400" b="0" kern="1200" dirty="0" err="1" smtClean="0">
               <a:latin typeface="Arial Rounded MT Bold" panose="020F0704030504030204" pitchFamily="34" charset="0"/>
             </a:rPr>
             <a:t>verdieping</a:t>
           </a:r>
-          <a:endParaRPr lang="nl-BE" sz="1800" kern="1200" dirty="0">
+          <a:endParaRPr lang="nl-BE" sz="2400" b="0" kern="1200" dirty="0">
             <a:latin typeface="Arial Rounded MT Bold" panose="020F0704030504030204" pitchFamily="34" charset="0"/>
           </a:endParaRPr>
         </a:p>
       </dsp:txBody>
       <dsp:txXfrm rot="-5400000">
-        <a:off x="801315" y="1036649"/>
-        <a:ext cx="5384446" cy="671431"/>
+        <a:off x="741129" y="890786"/>
+        <a:ext cx="9083154" cy="1017144"/>
       </dsp:txXfrm>
     </dsp:sp>
     <dsp:sp modelId="{70FBF651-615D-4F87-9430-6097E72966B4}">
@@ -8509,8 +8946,8 @@
       </dsp:nvSpPr>
       <dsp:spPr>
         <a:xfrm rot="5400000">
-          <a:off x="-171710" y="2168727"/>
-          <a:ext cx="1144734" cy="801314"/>
+          <a:off x="-158813" y="2266696"/>
+          <a:ext cx="1058754" cy="741128"/>
         </a:xfrm>
         <a:prstGeom prst="chevron">
           <a:avLst/>
@@ -8547,12 +8984,12 @@
         </a:fontRef>
       </dsp:style>
       <dsp:txBody>
-        <a:bodyPr spcFirstLastPara="0" vert="horz" wrap="square" lIns="12065" tIns="12065" rIns="12065" bIns="12065" numCol="1" spcCol="1270" anchor="ctr" anchorCtr="0">
+        <a:bodyPr spcFirstLastPara="0" vert="horz" wrap="square" lIns="15240" tIns="15240" rIns="15240" bIns="15240" numCol="1" spcCol="1270" anchor="ctr" anchorCtr="0">
           <a:noAutofit/>
         </a:bodyPr>
         <a:lstStyle/>
         <a:p>
-          <a:pPr lvl="0" algn="ctr" defTabSz="844550">
+          <a:pPr lvl="0" algn="ctr" defTabSz="1066800">
             <a:lnSpc>
               <a:spcPct val="90000"/>
             </a:lnSpc>
@@ -8564,21 +9001,21 @@
             </a:spcAft>
           </a:pPr>
           <a:r>
-            <a:rPr lang="en-GB" sz="1900" kern="1200" dirty="0" err="1" smtClean="0">
+            <a:rPr lang="en-GB" sz="2400" kern="1200" dirty="0" err="1" smtClean="0">
               <a:latin typeface="Arial Rounded MT Bold" panose="020F0704030504030204" pitchFamily="34" charset="0"/>
             </a:rPr>
             <a:t>Fase</a:t>
           </a:r>
           <a:r>
-            <a:rPr lang="en-GB" sz="1900" kern="1200" dirty="0" smtClean="0"/>
+            <a:rPr lang="en-GB" sz="2400" kern="1200" dirty="0" smtClean="0"/>
             <a:t> 3</a:t>
           </a:r>
-          <a:endParaRPr lang="nl-BE" sz="1900" kern="1200" dirty="0"/>
+          <a:endParaRPr lang="nl-BE" sz="2400" kern="1200" dirty="0"/>
         </a:p>
       </dsp:txBody>
       <dsp:txXfrm rot="-5400000">
-        <a:off x="0" y="2397674"/>
-        <a:ext cx="801314" cy="343420"/>
+        <a:off x="0" y="2478447"/>
+        <a:ext cx="741128" cy="317626"/>
       </dsp:txXfrm>
     </dsp:sp>
     <dsp:sp modelId="{2E54FC23-FF6E-4620-8988-9E3376FA05C9}">
@@ -8588,19 +9025,18 @@
       </dsp:nvSpPr>
       <dsp:spPr>
         <a:xfrm rot="5400000">
-          <a:off x="3139660" y="-341328"/>
-          <a:ext cx="744077" cy="5420769"/>
+          <a:off x="4873413" y="-2066311"/>
+          <a:ext cx="873609" cy="9138179"/>
         </a:xfrm>
         <a:prstGeom prst="round2SameRect">
           <a:avLst/>
         </a:prstGeom>
         <a:solidFill>
           <a:schemeClr val="lt1">
-            <a:alpha val="90000"/>
             <a:hueOff val="0"/>
             <a:satOff val="0"/>
             <a:lumOff val="0"/>
-            <a:alphaOff val="0"/>
+            <a:alpha val="50000"/>
           </a:schemeClr>
         </a:solidFill>
         <a:ln w="12700" cap="flat" cmpd="sng" algn="ctr">
@@ -8630,12 +9066,12 @@
         <a:fontRef idx="minor"/>
       </dsp:style>
       <dsp:txBody>
-        <a:bodyPr spcFirstLastPara="0" vert="horz" wrap="square" lIns="128016" tIns="11430" rIns="11430" bIns="11430" numCol="1" spcCol="1270" anchor="ctr" anchorCtr="0">
+        <a:bodyPr spcFirstLastPara="0" vert="horz" wrap="square" lIns="170688" tIns="15240" rIns="15240" bIns="15240" numCol="1" spcCol="1270" anchor="ctr" anchorCtr="0">
           <a:noAutofit/>
         </a:bodyPr>
         <a:lstStyle/>
         <a:p>
-          <a:pPr marL="171450" lvl="1" indent="-171450" algn="l" defTabSz="800100">
+          <a:pPr marL="228600" lvl="1" indent="-228600" algn="l" defTabSz="1066800">
             <a:lnSpc>
               <a:spcPct val="90000"/>
             </a:lnSpc>
@@ -8648,41 +9084,41 @@
             <a:buChar char="••"/>
           </a:pPr>
           <a:r>
-            <a:rPr lang="en-GB" sz="1800" kern="1200" dirty="0" err="1" smtClean="0">
+            <a:rPr lang="en-GB" sz="2400" b="0" kern="1200" dirty="0" err="1" smtClean="0">
               <a:latin typeface="Arial Rounded MT Bold" panose="020F0704030504030204" pitchFamily="34" charset="0"/>
             </a:rPr>
             <a:t>Bouwen</a:t>
           </a:r>
           <a:r>
-            <a:rPr lang="en-GB" sz="1800" kern="1200" dirty="0" smtClean="0">
+            <a:rPr lang="en-GB" sz="2400" b="0" kern="1200" dirty="0" smtClean="0">
               <a:latin typeface="Arial Rounded MT Bold" panose="020F0704030504030204" pitchFamily="34" charset="0"/>
             </a:rPr>
             <a:t> van prototypes </a:t>
           </a:r>
           <a:r>
-            <a:rPr lang="en-GB" sz="1800" kern="1200" dirty="0" err="1" smtClean="0">
+            <a:rPr lang="en-GB" sz="2400" b="0" kern="1200" dirty="0" err="1" smtClean="0">
               <a:latin typeface="Arial Rounded MT Bold" panose="020F0704030504030204" pitchFamily="34" charset="0"/>
             </a:rPr>
             <a:t>voor</a:t>
           </a:r>
           <a:r>
-            <a:rPr lang="en-GB" sz="1800" kern="1200" dirty="0" smtClean="0">
+            <a:rPr lang="en-GB" sz="2400" b="0" kern="1200" dirty="0" smtClean="0">
               <a:latin typeface="Arial Rounded MT Bold" panose="020F0704030504030204" pitchFamily="34" charset="0"/>
             </a:rPr>
             <a:t> heel het </a:t>
           </a:r>
           <a:r>
-            <a:rPr lang="en-GB" sz="1800" kern="1200" dirty="0" err="1" smtClean="0">
+            <a:rPr lang="en-GB" sz="2400" b="0" kern="1200" dirty="0" err="1" smtClean="0">
               <a:latin typeface="Arial Rounded MT Bold" panose="020F0704030504030204" pitchFamily="34" charset="0"/>
             </a:rPr>
             <a:t>gebouw</a:t>
           </a:r>
-          <a:endParaRPr lang="nl-BE" sz="1800" kern="1200" dirty="0">
+          <a:endParaRPr lang="nl-BE" sz="2400" b="0" kern="1200" dirty="0">
             <a:latin typeface="Arial Rounded MT Bold" panose="020F0704030504030204" pitchFamily="34" charset="0"/>
           </a:endParaRPr>
         </a:p>
         <a:p>
-          <a:pPr marL="171450" lvl="1" indent="-171450" algn="l" defTabSz="800100">
+          <a:pPr marL="228600" lvl="1" indent="-228600" algn="l" defTabSz="1066800">
             <a:lnSpc>
               <a:spcPct val="90000"/>
             </a:lnSpc>
@@ -8695,49 +9131,49 @@
             <a:buChar char="••"/>
           </a:pPr>
           <a:r>
-            <a:rPr lang="en-GB" sz="1800" kern="1200" dirty="0" err="1" smtClean="0">
+            <a:rPr lang="en-GB" sz="2400" b="0" kern="1200" dirty="0" err="1" smtClean="0">
               <a:latin typeface="Arial Rounded MT Bold" panose="020F0704030504030204" pitchFamily="34" charset="0"/>
             </a:rPr>
             <a:t>Testen</a:t>
           </a:r>
           <a:r>
-            <a:rPr lang="en-GB" sz="1800" kern="1200" dirty="0" smtClean="0">
+            <a:rPr lang="en-GB" sz="2400" b="0" kern="1200" dirty="0" smtClean="0">
               <a:latin typeface="Arial Rounded MT Bold" panose="020F0704030504030204" pitchFamily="34" charset="0"/>
             </a:rPr>
             <a:t> in het hele </a:t>
           </a:r>
           <a:r>
-            <a:rPr lang="en-GB" sz="1800" kern="1200" dirty="0" err="1" smtClean="0">
+            <a:rPr lang="en-GB" sz="2400" b="0" kern="1200" dirty="0" err="1" smtClean="0">
               <a:latin typeface="Arial Rounded MT Bold" panose="020F0704030504030204" pitchFamily="34" charset="0"/>
             </a:rPr>
             <a:t>gebouw</a:t>
           </a:r>
           <a:r>
-            <a:rPr lang="en-GB" sz="1800" kern="1200" dirty="0" smtClean="0">
+            <a:rPr lang="en-GB" sz="2400" b="0" kern="1200" dirty="0" smtClean="0">
               <a:latin typeface="Arial Rounded MT Bold" panose="020F0704030504030204" pitchFamily="34" charset="0"/>
             </a:rPr>
             <a:t> van </a:t>
           </a:r>
           <a:r>
-            <a:rPr lang="en-GB" sz="1800" kern="1200" dirty="0" err="1" smtClean="0">
+            <a:rPr lang="en-GB" sz="2400" b="0" kern="1200" dirty="0" err="1" smtClean="0">
               <a:latin typeface="Arial Rounded MT Bold" panose="020F0704030504030204" pitchFamily="34" charset="0"/>
             </a:rPr>
             <a:t>Digipolis</a:t>
           </a:r>
           <a:r>
-            <a:rPr lang="en-GB" sz="1800" kern="1200" dirty="0" smtClean="0">
+            <a:rPr lang="en-GB" sz="2400" b="0" kern="1200" dirty="0" smtClean="0">
               <a:latin typeface="Arial Rounded MT Bold" panose="020F0704030504030204" pitchFamily="34" charset="0"/>
             </a:rPr>
             <a:t> 2</a:t>
           </a:r>
-          <a:endParaRPr lang="nl-BE" sz="1800" kern="1200" dirty="0">
+          <a:endParaRPr lang="nl-BE" sz="2400" b="0" kern="1200" dirty="0">
             <a:latin typeface="Arial Rounded MT Bold" panose="020F0704030504030204" pitchFamily="34" charset="0"/>
           </a:endParaRPr>
         </a:p>
       </dsp:txBody>
       <dsp:txXfrm rot="-5400000">
-        <a:off x="801315" y="2033340"/>
-        <a:ext cx="5384446" cy="671431"/>
+        <a:off x="741128" y="2108620"/>
+        <a:ext cx="9095533" cy="788317"/>
       </dsp:txXfrm>
     </dsp:sp>
     <dsp:sp modelId="{8D96AB64-7470-49B9-BBB2-6F6DD160A68C}">
@@ -8747,8 +9183,8 @@
       </dsp:nvSpPr>
       <dsp:spPr>
         <a:xfrm rot="5400000">
-          <a:off x="-171710" y="3165417"/>
-          <a:ext cx="1144734" cy="801314"/>
+          <a:off x="-158813" y="3239325"/>
+          <a:ext cx="1058754" cy="741128"/>
         </a:xfrm>
         <a:prstGeom prst="chevron">
           <a:avLst/>
@@ -8785,12 +9221,12 @@
         </a:fontRef>
       </dsp:style>
       <dsp:txBody>
-        <a:bodyPr spcFirstLastPara="0" vert="horz" wrap="square" lIns="12065" tIns="12065" rIns="12065" bIns="12065" numCol="1" spcCol="1270" anchor="ctr" anchorCtr="0">
+        <a:bodyPr spcFirstLastPara="0" vert="horz" wrap="square" lIns="15240" tIns="15240" rIns="15240" bIns="15240" numCol="1" spcCol="1270" anchor="ctr" anchorCtr="0">
           <a:noAutofit/>
         </a:bodyPr>
         <a:lstStyle/>
         <a:p>
-          <a:pPr lvl="0" algn="ctr" defTabSz="844550">
+          <a:pPr lvl="0" algn="ctr" defTabSz="1066800">
             <a:lnSpc>
               <a:spcPct val="90000"/>
             </a:lnSpc>
@@ -8802,27 +9238,27 @@
             </a:spcAft>
           </a:pPr>
           <a:r>
-            <a:rPr lang="en-GB" sz="1900" kern="1200" dirty="0" err="1" smtClean="0">
+            <a:rPr lang="en-GB" sz="2400" kern="1200" dirty="0" err="1" smtClean="0">
               <a:latin typeface="Arial Rounded MT Bold" panose="020F0704030504030204" pitchFamily="34" charset="0"/>
             </a:rPr>
             <a:t>Fase</a:t>
           </a:r>
           <a:r>
-            <a:rPr lang="en-GB" sz="1900" kern="1200" dirty="0" smtClean="0">
+            <a:rPr lang="en-GB" sz="2400" kern="1200" dirty="0" smtClean="0">
               <a:latin typeface="Arial Rounded MT Bold" panose="020F0704030504030204" pitchFamily="34" charset="0"/>
             </a:rPr>
             <a:t> </a:t>
           </a:r>
           <a:r>
-            <a:rPr lang="en-GB" sz="1900" kern="1200" dirty="0" smtClean="0"/>
+            <a:rPr lang="en-GB" sz="2400" kern="1200" dirty="0" smtClean="0"/>
             <a:t>4</a:t>
           </a:r>
-          <a:endParaRPr lang="nl-BE" sz="1900" kern="1200" dirty="0"/>
+          <a:endParaRPr lang="nl-BE" sz="2400" kern="1200" dirty="0"/>
         </a:p>
       </dsp:txBody>
       <dsp:txXfrm rot="-5400000">
-        <a:off x="0" y="3394364"/>
-        <a:ext cx="801314" cy="343420"/>
+        <a:off x="0" y="3451076"/>
+        <a:ext cx="741128" cy="317626"/>
       </dsp:txXfrm>
     </dsp:sp>
     <dsp:sp modelId="{B69CD7D7-3D43-44A7-9D66-069B1070C034}">
@@ -8832,19 +9268,18 @@
       </dsp:nvSpPr>
       <dsp:spPr>
         <a:xfrm rot="5400000">
-          <a:off x="3139660" y="655361"/>
-          <a:ext cx="744077" cy="5420769"/>
+          <a:off x="4966122" y="-1144481"/>
+          <a:ext cx="688190" cy="9138179"/>
         </a:xfrm>
         <a:prstGeom prst="round2SameRect">
           <a:avLst/>
         </a:prstGeom>
         <a:solidFill>
           <a:schemeClr val="lt1">
-            <a:alpha val="90000"/>
             <a:hueOff val="0"/>
             <a:satOff val="0"/>
             <a:lumOff val="0"/>
-            <a:alphaOff val="0"/>
+            <a:alpha val="50000"/>
           </a:schemeClr>
         </a:solidFill>
         <a:ln w="12700" cap="flat" cmpd="sng" algn="ctr">
@@ -8874,12 +9309,12 @@
         <a:fontRef idx="minor"/>
       </dsp:style>
       <dsp:txBody>
-        <a:bodyPr spcFirstLastPara="0" vert="horz" wrap="square" lIns="128016" tIns="11430" rIns="11430" bIns="11430" numCol="1" spcCol="1270" anchor="ctr" anchorCtr="0">
+        <a:bodyPr spcFirstLastPara="0" vert="horz" wrap="square" lIns="170688" tIns="15240" rIns="15240" bIns="15240" numCol="1" spcCol="1270" anchor="ctr" anchorCtr="0">
           <a:noAutofit/>
         </a:bodyPr>
         <a:lstStyle/>
         <a:p>
-          <a:pPr marL="171450" lvl="1" indent="-171450" algn="l" defTabSz="800100">
+          <a:pPr marL="228600" lvl="1" indent="-228600" algn="l" defTabSz="1066800">
             <a:lnSpc>
               <a:spcPct val="90000"/>
             </a:lnSpc>
@@ -8892,67 +9327,67 @@
             <a:buChar char="••"/>
           </a:pPr>
           <a:r>
-            <a:rPr lang="en-GB" sz="1800" kern="1200" dirty="0" err="1" smtClean="0">
+            <a:rPr lang="en-GB" sz="2400" kern="1200" dirty="0" err="1" smtClean="0">
               <a:latin typeface="Arial Rounded MT Bold" panose="020F0704030504030204" pitchFamily="34" charset="0"/>
             </a:rPr>
             <a:t>Verdere</a:t>
           </a:r>
           <a:r>
-            <a:rPr lang="en-GB" sz="1800" kern="1200" dirty="0" smtClean="0">
+            <a:rPr lang="en-GB" sz="2400" kern="1200" dirty="0" smtClean="0">
               <a:latin typeface="Arial Rounded MT Bold" panose="020F0704030504030204" pitchFamily="34" charset="0"/>
             </a:rPr>
             <a:t> </a:t>
           </a:r>
           <a:r>
-            <a:rPr lang="en-GB" sz="1800" kern="1200" dirty="0" err="1" smtClean="0">
+            <a:rPr lang="en-GB" sz="2400" kern="1200" dirty="0" err="1" smtClean="0">
               <a:latin typeface="Arial Rounded MT Bold" panose="020F0704030504030204" pitchFamily="34" charset="0"/>
             </a:rPr>
             <a:t>uitbereiding</a:t>
           </a:r>
           <a:r>
-            <a:rPr lang="en-GB" sz="1800" kern="1200" dirty="0" smtClean="0">
+            <a:rPr lang="en-GB" sz="2400" kern="1200" dirty="0" smtClean="0">
               <a:latin typeface="Arial Rounded MT Bold" panose="020F0704030504030204" pitchFamily="34" charset="0"/>
             </a:rPr>
             <a:t> </a:t>
           </a:r>
           <a:r>
-            <a:rPr lang="en-GB" sz="1800" kern="1200" dirty="0" err="1" smtClean="0">
+            <a:rPr lang="en-GB" sz="2400" kern="1200" dirty="0" err="1" smtClean="0">
               <a:latin typeface="Arial Rounded MT Bold" panose="020F0704030504030204" pitchFamily="34" charset="0"/>
             </a:rPr>
             <a:t>naar</a:t>
           </a:r>
           <a:r>
-            <a:rPr lang="en-GB" sz="1800" kern="1200" dirty="0" smtClean="0">
+            <a:rPr lang="en-GB" sz="2400" kern="1200" dirty="0" smtClean="0">
               <a:latin typeface="Arial Rounded MT Bold" panose="020F0704030504030204" pitchFamily="34" charset="0"/>
             </a:rPr>
             <a:t> </a:t>
           </a:r>
           <a:r>
-            <a:rPr lang="en-GB" sz="1800" kern="1200" dirty="0" err="1" smtClean="0">
+            <a:rPr lang="en-GB" sz="2400" kern="1200" dirty="0" err="1" smtClean="0">
               <a:latin typeface="Arial Rounded MT Bold" panose="020F0704030504030204" pitchFamily="34" charset="0"/>
             </a:rPr>
             <a:t>andere</a:t>
           </a:r>
           <a:r>
-            <a:rPr lang="en-GB" sz="1800" kern="1200" dirty="0" smtClean="0">
+            <a:rPr lang="en-GB" sz="2400" kern="1200" dirty="0" smtClean="0">
               <a:latin typeface="Arial Rounded MT Bold" panose="020F0704030504030204" pitchFamily="34" charset="0"/>
             </a:rPr>
             <a:t> </a:t>
           </a:r>
           <a:r>
-            <a:rPr lang="en-GB" sz="1800" kern="1200" dirty="0" err="1" smtClean="0">
+            <a:rPr lang="en-GB" sz="2400" kern="1200" dirty="0" err="1" smtClean="0">
               <a:latin typeface="Arial Rounded MT Bold" panose="020F0704030504030204" pitchFamily="34" charset="0"/>
             </a:rPr>
             <a:t>gebouwen</a:t>
           </a:r>
-          <a:endParaRPr lang="nl-BE" sz="1800" kern="1200" dirty="0">
+          <a:endParaRPr lang="nl-BE" sz="2400" kern="1200" dirty="0">
             <a:latin typeface="Arial Rounded MT Bold" panose="020F0704030504030204" pitchFamily="34" charset="0"/>
           </a:endParaRPr>
         </a:p>
       </dsp:txBody>
       <dsp:txXfrm rot="-5400000">
-        <a:off x="801315" y="3030030"/>
-        <a:ext cx="5384446" cy="671431"/>
+        <a:off x="741128" y="3114108"/>
+        <a:ext cx="9104584" cy="621000"/>
       </dsp:txXfrm>
     </dsp:sp>
   </dsp:spTree>
@@ -14162,7 +14597,7 @@
           <a:p>
             <a:fld id="{1C0923D5-26DA-44A5-B485-4B3EB89B253D}" type="datetimeFigureOut">
               <a:rPr lang="nl-BE" smtClean="0"/>
-              <a:t>20/03/2017</a:t>
+              <a:t>23/03/2017</a:t>
             </a:fld>
             <a:endParaRPr lang="nl-BE"/>
           </a:p>
@@ -14332,7 +14767,7 @@
           <a:p>
             <a:fld id="{1C0923D5-26DA-44A5-B485-4B3EB89B253D}" type="datetimeFigureOut">
               <a:rPr lang="nl-BE" smtClean="0"/>
-              <a:t>20/03/2017</a:t>
+              <a:t>23/03/2017</a:t>
             </a:fld>
             <a:endParaRPr lang="nl-BE"/>
           </a:p>
@@ -14512,7 +14947,7 @@
           <a:p>
             <a:fld id="{1C0923D5-26DA-44A5-B485-4B3EB89B253D}" type="datetimeFigureOut">
               <a:rPr lang="nl-BE" smtClean="0"/>
-              <a:t>20/03/2017</a:t>
+              <a:t>23/03/2017</a:t>
             </a:fld>
             <a:endParaRPr lang="nl-BE"/>
           </a:p>
@@ -14682,7 +15117,7 @@
           <a:p>
             <a:fld id="{1C0923D5-26DA-44A5-B485-4B3EB89B253D}" type="datetimeFigureOut">
               <a:rPr lang="nl-BE" smtClean="0"/>
-              <a:t>20/03/2017</a:t>
+              <a:t>23/03/2017</a:t>
             </a:fld>
             <a:endParaRPr lang="nl-BE"/>
           </a:p>
@@ -14928,7 +15363,7 @@
           <a:p>
             <a:fld id="{1C0923D5-26DA-44A5-B485-4B3EB89B253D}" type="datetimeFigureOut">
               <a:rPr lang="nl-BE" smtClean="0"/>
-              <a:t>20/03/2017</a:t>
+              <a:t>23/03/2017</a:t>
             </a:fld>
             <a:endParaRPr lang="nl-BE"/>
           </a:p>
@@ -15160,7 +15595,7 @@
           <a:p>
             <a:fld id="{1C0923D5-26DA-44A5-B485-4B3EB89B253D}" type="datetimeFigureOut">
               <a:rPr lang="nl-BE" smtClean="0"/>
-              <a:t>20/03/2017</a:t>
+              <a:t>23/03/2017</a:t>
             </a:fld>
             <a:endParaRPr lang="nl-BE"/>
           </a:p>
@@ -15527,7 +15962,7 @@
           <a:p>
             <a:fld id="{1C0923D5-26DA-44A5-B485-4B3EB89B253D}" type="datetimeFigureOut">
               <a:rPr lang="nl-BE" smtClean="0"/>
-              <a:t>20/03/2017</a:t>
+              <a:t>23/03/2017</a:t>
             </a:fld>
             <a:endParaRPr lang="nl-BE"/>
           </a:p>
@@ -15645,7 +16080,7 @@
           <a:p>
             <a:fld id="{1C0923D5-26DA-44A5-B485-4B3EB89B253D}" type="datetimeFigureOut">
               <a:rPr lang="nl-BE" smtClean="0"/>
-              <a:t>20/03/2017</a:t>
+              <a:t>23/03/2017</a:t>
             </a:fld>
             <a:endParaRPr lang="nl-BE"/>
           </a:p>
@@ -15740,7 +16175,7 @@
           <a:p>
             <a:fld id="{1C0923D5-26DA-44A5-B485-4B3EB89B253D}" type="datetimeFigureOut">
               <a:rPr lang="nl-BE" smtClean="0"/>
-              <a:t>20/03/2017</a:t>
+              <a:t>23/03/2017</a:t>
             </a:fld>
             <a:endParaRPr lang="nl-BE"/>
           </a:p>
@@ -16017,7 +16452,7 @@
           <a:p>
             <a:fld id="{1C0923D5-26DA-44A5-B485-4B3EB89B253D}" type="datetimeFigureOut">
               <a:rPr lang="nl-BE" smtClean="0"/>
-              <a:t>20/03/2017</a:t>
+              <a:t>23/03/2017</a:t>
             </a:fld>
             <a:endParaRPr lang="nl-BE"/>
           </a:p>
@@ -16270,7 +16705,7 @@
           <a:p>
             <a:fld id="{1C0923D5-26DA-44A5-B485-4B3EB89B253D}" type="datetimeFigureOut">
               <a:rPr lang="nl-BE" smtClean="0"/>
-              <a:t>20/03/2017</a:t>
+              <a:t>23/03/2017</a:t>
             </a:fld>
             <a:endParaRPr lang="nl-BE"/>
           </a:p>
@@ -16483,7 +16918,7 @@
           <a:p>
             <a:fld id="{1C0923D5-26DA-44A5-B485-4B3EB89B253D}" type="datetimeFigureOut">
               <a:rPr lang="nl-BE" smtClean="0"/>
-              <a:t>20/03/2017</a:t>
+              <a:t>23/03/2017</a:t>
             </a:fld>
             <a:endParaRPr lang="nl-BE"/>
           </a:p>
@@ -16995,19 +17430,19 @@
               <a:rPr lang="nl-BE" sz="2800" b="1" dirty="0" smtClean="0">
                 <a:latin typeface="Arial Rounded MT Bold" panose="020F0704030504030204" pitchFamily="34" charset="0"/>
               </a:rPr>
-              <a:t>-Smart buildings</a:t>
+              <a:t>-Smart buildings: </a:t>
             </a:r>
             <a:r>
               <a:rPr lang="nl-BE" sz="2800" b="1" dirty="0" smtClean="0">
                 <a:latin typeface="Arial Rounded MT Bold" panose="020F0704030504030204" pitchFamily="34" charset="0"/>
               </a:rPr>
-              <a:t>: Het automatisch beheren van vergaderzalen met sensoren en Exchange </a:t>
-            </a:r>
-            <a:r>
-              <a:rPr lang="nl-BE" sz="2800" b="1" dirty="0" smtClean="0">
-                <a:latin typeface="Arial Rounded MT Bold" panose="020F0704030504030204" pitchFamily="34" charset="0"/>
-              </a:rPr>
-              <a:t>server 2016</a:t>
+              <a:t>Het gebruik van vergaderzalen optimaliseren door inzet </a:t>
+            </a:r>
+            <a:r>
+              <a:rPr lang="nl-BE" sz="2800" b="1" smtClean="0">
+                <a:latin typeface="Arial Rounded MT Bold" panose="020F0704030504030204" pitchFamily="34" charset="0"/>
+              </a:rPr>
+              <a:t>van sensors</a:t>
             </a:r>
             <a:endParaRPr lang="nl-BE" sz="2800" b="1" dirty="0">
               <a:latin typeface="Arial Rounded MT Bold" panose="020F0704030504030204" pitchFamily="34" charset="0"/>
@@ -17107,13 +17542,7 @@
               <a:rPr lang="nl-BE" sz="2000" dirty="0" smtClean="0">
                 <a:latin typeface="Arial Rounded MT Bold" panose="020F0704030504030204" pitchFamily="34" charset="0"/>
               </a:rPr>
-              <a:t> </a:t>
-            </a:r>
-            <a:r>
-              <a:rPr lang="nl-BE" sz="2000" dirty="0" smtClean="0">
-                <a:latin typeface="Arial Rounded MT Bold" panose="020F0704030504030204" pitchFamily="34" charset="0"/>
-              </a:rPr>
-              <a:t>- Maarten </a:t>
+              <a:t> - Maarten </a:t>
             </a:r>
             <a:r>
               <a:rPr lang="nl-BE" sz="2000" dirty="0" err="1" smtClean="0">
@@ -17508,10 +17937,22 @@
               <a:buChar char="•"/>
             </a:pPr>
             <a:r>
+              <a:rPr lang="nl-BE" sz="2400" dirty="0" smtClean="0">
+                <a:latin typeface="Arial Rounded MT Bold" panose="020F0704030504030204" pitchFamily="34" charset="0"/>
+              </a:rPr>
+              <a:t>Uitdaging</a:t>
+            </a:r>
+            <a:r>
+              <a:rPr lang="en-GB" sz="2400" dirty="0" smtClean="0">
+                <a:latin typeface="Arial Rounded MT Bold" panose="020F0704030504030204" pitchFamily="34" charset="0"/>
+              </a:rPr>
+              <a:t> </a:t>
+            </a:r>
+            <a:r>
               <a:rPr lang="en-GB" sz="2400" dirty="0" err="1" smtClean="0">
                 <a:latin typeface="Arial Rounded MT Bold" panose="020F0704030504030204" pitchFamily="34" charset="0"/>
               </a:rPr>
-              <a:t>Uitdaging</a:t>
+              <a:t>te</a:t>
             </a:r>
             <a:r>
               <a:rPr lang="en-GB" sz="2400" dirty="0" smtClean="0">
@@ -17520,10 +17961,10 @@
               <a:t> </a:t>
             </a:r>
             <a:r>
-              <a:rPr lang="en-GB" sz="2400" dirty="0" err="1" smtClean="0">
-                <a:latin typeface="Arial Rounded MT Bold" panose="020F0704030504030204" pitchFamily="34" charset="0"/>
-              </a:rPr>
-              <a:t>te</a:t>
+              <a:rPr lang="nl-BE" sz="2400" dirty="0" smtClean="0">
+                <a:latin typeface="Arial Rounded MT Bold" panose="020F0704030504030204" pitchFamily="34" charset="0"/>
+              </a:rPr>
+              <a:t>werken</a:t>
             </a:r>
             <a:r>
               <a:rPr lang="en-GB" sz="2400" dirty="0" smtClean="0">
@@ -17532,19 +17973,7 @@
               <a:t> </a:t>
             </a:r>
             <a:r>
-              <a:rPr lang="en-GB" sz="2400" dirty="0" err="1" smtClean="0">
-                <a:latin typeface="Arial Rounded MT Bold" panose="020F0704030504030204" pitchFamily="34" charset="0"/>
-              </a:rPr>
-              <a:t>werken</a:t>
-            </a:r>
-            <a:r>
-              <a:rPr lang="en-GB" sz="2400" dirty="0" smtClean="0">
-                <a:latin typeface="Arial Rounded MT Bold" panose="020F0704030504030204" pitchFamily="34" charset="0"/>
-              </a:rPr>
-              <a:t> </a:t>
-            </a:r>
-            <a:r>
-              <a:rPr lang="en-GB" sz="2400" dirty="0" err="1" smtClean="0">
+              <a:rPr lang="nl-BE" sz="2400" dirty="0" smtClean="0">
                 <a:latin typeface="Arial Rounded MT Bold" panose="020F0704030504030204" pitchFamily="34" charset="0"/>
               </a:rPr>
               <a:t>binnen</a:t>
@@ -17574,7 +18003,7 @@
               <a:buChar char="•"/>
             </a:pPr>
             <a:r>
-              <a:rPr lang="en-GB" sz="2400" dirty="0" err="1" smtClean="0">
+              <a:rPr lang="nl-BE" sz="2400" dirty="0" smtClean="0">
                 <a:latin typeface="Arial Rounded MT Bold" panose="020F0704030504030204" pitchFamily="34" charset="0"/>
               </a:rPr>
               <a:t>Gebruik</a:t>
@@ -17586,7 +18015,7 @@
               <a:t> van </a:t>
             </a:r>
             <a:r>
-              <a:rPr lang="en-GB" sz="2400" dirty="0" err="1" smtClean="0">
+              <a:rPr lang="nl-BE" sz="2400" dirty="0" smtClean="0">
                 <a:latin typeface="Arial Rounded MT Bold" panose="020F0704030504030204" pitchFamily="34" charset="0"/>
               </a:rPr>
               <a:t>nieuwe</a:t>
@@ -17598,14 +18027,11 @@
               <a:t> </a:t>
             </a:r>
             <a:r>
-              <a:rPr lang="en-GB" sz="2400" dirty="0" err="1" smtClean="0">
-                <a:latin typeface="Arial Rounded MT Bold" panose="020F0704030504030204" pitchFamily="34" charset="0"/>
-              </a:rPr>
-              <a:t>techonologiën</a:t>
-            </a:r>
-            <a:endParaRPr lang="en-GB" sz="2400" dirty="0" smtClean="0">
-              <a:latin typeface="Arial Rounded MT Bold" panose="020F0704030504030204" pitchFamily="34" charset="0"/>
-            </a:endParaRPr>
+              <a:rPr lang="nl-BE" sz="2400" dirty="0" smtClean="0">
+                <a:latin typeface="Arial Rounded MT Bold" panose="020F0704030504030204" pitchFamily="34" charset="0"/>
+              </a:rPr>
+              <a:t>technologieën</a:t>
+            </a:r>
           </a:p>
           <a:p>
             <a:pPr marL="742950" lvl="1" indent="-285750">
@@ -17643,7 +18069,7 @@
               <a:t>Software </a:t>
             </a:r>
             <a:r>
-              <a:rPr lang="en-GB" sz="2400" dirty="0" err="1" smtClean="0">
+              <a:rPr lang="nl-BE" sz="2400" dirty="0" smtClean="0">
                 <a:latin typeface="Arial Rounded MT Bold" panose="020F0704030504030204" pitchFamily="34" charset="0"/>
               </a:rPr>
               <a:t>ontwikkeling</a:t>
@@ -17655,7 +18081,7 @@
               <a:t> </a:t>
             </a:r>
             <a:r>
-              <a:rPr lang="en-GB" sz="2400" dirty="0" err="1" smtClean="0">
+              <a:rPr lang="nl-BE" sz="2400" dirty="0" smtClean="0">
                 <a:latin typeface="Arial Rounded MT Bold" panose="020F0704030504030204" pitchFamily="34" charset="0"/>
               </a:rPr>
               <a:t>verloopt</a:t>
@@ -17667,19 +18093,31 @@
               <a:t> </a:t>
             </a:r>
             <a:r>
-              <a:rPr lang="en-GB" sz="2400" dirty="0" err="1" smtClean="0">
-                <a:latin typeface="Arial Rounded MT Bold" panose="020F0704030504030204" pitchFamily="34" charset="0"/>
-              </a:rPr>
-              <a:t>moeizaamLimitaties</a:t>
+              <a:rPr lang="nl-BE" sz="2400" dirty="0" smtClean="0">
+                <a:latin typeface="Arial Rounded MT Bold" panose="020F0704030504030204" pitchFamily="34" charset="0"/>
+              </a:rPr>
+              <a:t>moeizaam</a:t>
             </a:r>
             <a:r>
               <a:rPr lang="en-GB" sz="2400" dirty="0" smtClean="0">
                 <a:latin typeface="Arial Rounded MT Bold" panose="020F0704030504030204" pitchFamily="34" charset="0"/>
               </a:rPr>
+              <a:t>, de </a:t>
+            </a:r>
+            <a:r>
+              <a:rPr lang="nl-BE" sz="2400" dirty="0" err="1" smtClean="0">
+                <a:latin typeface="Arial Rounded MT Bold" panose="020F0704030504030204" pitchFamily="34" charset="0"/>
+              </a:rPr>
+              <a:t>limitaties</a:t>
+            </a:r>
+            <a:r>
+              <a:rPr lang="en-GB" sz="2400" dirty="0" smtClean="0">
+                <a:latin typeface="Arial Rounded MT Bold" panose="020F0704030504030204" pitchFamily="34" charset="0"/>
+              </a:rPr>
               <a:t> </a:t>
             </a:r>
             <a:r>
-              <a:rPr lang="en-GB" sz="2400" dirty="0" err="1" smtClean="0">
+              <a:rPr lang="nl-BE" sz="2400" dirty="0" smtClean="0">
                 <a:latin typeface="Arial Rounded MT Bold" panose="020F0704030504030204" pitchFamily="34" charset="0"/>
               </a:rPr>
               <a:t>worden</a:t>
@@ -17691,7 +18129,7 @@
               <a:t> pas in het </a:t>
             </a:r>
             <a:r>
-              <a:rPr lang="en-GB" sz="2400" dirty="0" err="1" smtClean="0">
+              <a:rPr lang="nl-BE" sz="2400" dirty="0" smtClean="0">
                 <a:latin typeface="Arial Rounded MT Bold" panose="020F0704030504030204" pitchFamily="34" charset="0"/>
               </a:rPr>
               <a:t>verloop</a:t>
@@ -17703,14 +18141,11 @@
               <a:t> van het project </a:t>
             </a:r>
             <a:r>
-              <a:rPr lang="en-GB" sz="2400" dirty="0" err="1" smtClean="0">
-                <a:latin typeface="Arial Rounded MT Bold" panose="020F0704030504030204" pitchFamily="34" charset="0"/>
-              </a:rPr>
-              <a:t>opgelegd</a:t>
-            </a:r>
-            <a:endParaRPr lang="en-GB" sz="2400" dirty="0" smtClean="0">
-              <a:latin typeface="Arial Rounded MT Bold" panose="020F0704030504030204" pitchFamily="34" charset="0"/>
-            </a:endParaRPr>
+              <a:rPr lang="nl-BE" sz="2400" dirty="0" smtClean="0">
+                <a:latin typeface="Arial Rounded MT Bold" panose="020F0704030504030204" pitchFamily="34" charset="0"/>
+              </a:rPr>
+              <a:t>duidelijk</a:t>
+            </a:r>
           </a:p>
         </p:txBody>
       </p:sp>
@@ -18012,6 +18447,13 @@
         </p:nvPicPr>
         <p:blipFill>
           <a:blip r:embed="rId2">
+            <a:duotone>
+              <a:schemeClr val="accent3">
+                <a:shade val="45000"/>
+                <a:satMod val="135000"/>
+              </a:schemeClr>
+              <a:prstClr val="white"/>
+            </a:duotone>
             <a:extLst>
               <a:ext uri="{28A0092B-C50C-407E-A947-70E740481C1C}">
                 <a14:useLocalDpi xmlns:a14="http://schemas.microsoft.com/office/drawing/2010/main" val="0"/>
@@ -18658,7 +19100,7 @@
           <p:nvPr>
             <p:extLst>
               <p:ext uri="{D42A27DB-BD31-4B8C-83A1-F6EECF244321}">
-                <p14:modId xmlns:p14="http://schemas.microsoft.com/office/powerpoint/2010/main" val="948216528"/>
+                <p14:modId xmlns:p14="http://schemas.microsoft.com/office/powerpoint/2010/main" val="1777442534"/>
               </p:ext>
             </p:extLst>
           </p:nvPr>
@@ -19220,7 +19662,7 @@
           <p:nvPr>
             <p:extLst>
               <p:ext uri="{D42A27DB-BD31-4B8C-83A1-F6EECF244321}">
-                <p14:modId xmlns:p14="http://schemas.microsoft.com/office/powerpoint/2010/main" val="2884478207"/>
+                <p14:modId xmlns:p14="http://schemas.microsoft.com/office/powerpoint/2010/main" val="1427021145"/>
               </p:ext>
             </p:extLst>
           </p:nvPr>
@@ -20047,7 +20489,7 @@
         <p:spPr>
           <a:xfrm>
             <a:off x="939800" y="1400175"/>
-            <a:ext cx="8064500" cy="4878259"/>
+            <a:ext cx="8064500" cy="4508927"/>
           </a:xfrm>
           <a:prstGeom prst="rect">
             <a:avLst/>
@@ -20066,7 +20508,7 @@
               </a:spcAft>
             </a:pPr>
             <a:r>
-              <a:rPr lang="en-GB" sz="3200" dirty="0" err="1" smtClean="0">
+              <a:rPr lang="nl-BE" sz="3200" dirty="0" smtClean="0">
                 <a:latin typeface="Arial Rounded MT Bold" panose="020F0704030504030204" pitchFamily="34" charset="0"/>
               </a:rPr>
               <a:t>Beperkingen</a:t>
@@ -20096,7 +20538,7 @@
               <a:buChar char="•"/>
             </a:pPr>
             <a:r>
-              <a:rPr lang="en-GB" sz="2400" dirty="0" err="1" smtClean="0">
+              <a:rPr lang="nl-BE" sz="2400" dirty="0" smtClean="0">
                 <a:latin typeface="Arial Rounded MT Bold" panose="020F0704030504030204" pitchFamily="34" charset="0"/>
               </a:rPr>
               <a:t>Verbinden</a:t>
@@ -20135,39 +20577,45 @@
               <a:t> </a:t>
             </a:r>
             <a:r>
+              <a:rPr lang="nl-BE" sz="2400" dirty="0" smtClean="0">
+                <a:latin typeface="Arial Rounded MT Bold" panose="020F0704030504030204" pitchFamily="34" charset="0"/>
+              </a:rPr>
+              <a:t>beweren</a:t>
+            </a:r>
+            <a:r>
+              <a:rPr lang="en-GB" sz="2400" dirty="0" smtClean="0">
+                <a:latin typeface="Arial Rounded MT Bold" panose="020F0704030504030204" pitchFamily="34" charset="0"/>
+              </a:rPr>
+              <a:t> </a:t>
+            </a:r>
+            <a:r>
+              <a:rPr lang="en-GB" sz="2400" dirty="0">
+                <a:latin typeface="Arial Rounded MT Bold" panose="020F0704030504030204" pitchFamily="34" charset="0"/>
+              </a:rPr>
+              <a:t>van </a:t>
+            </a:r>
+            <a:r>
               <a:rPr lang="en-GB" sz="2400" dirty="0" err="1">
                 <a:latin typeface="Arial Rounded MT Bold" panose="020F0704030504030204" pitchFamily="34" charset="0"/>
               </a:rPr>
-              <a:t>beweren</a:t>
+              <a:t>certificaten</a:t>
             </a:r>
             <a:r>
               <a:rPr lang="en-GB" sz="2400" dirty="0">
                 <a:latin typeface="Arial Rounded MT Bold" panose="020F0704030504030204" pitchFamily="34" charset="0"/>
               </a:rPr>
-              <a:t> van </a:t>
+              <a:t> op Arduino’s </a:t>
             </a:r>
             <a:r>
               <a:rPr lang="en-GB" sz="2400" dirty="0" err="1">
                 <a:latin typeface="Arial Rounded MT Bold" panose="020F0704030504030204" pitchFamily="34" charset="0"/>
               </a:rPr>
-              <a:t>certificaten</a:t>
+              <a:t>voor</a:t>
             </a:r>
             <a:r>
               <a:rPr lang="en-GB" sz="2400" dirty="0">
                 <a:latin typeface="Arial Rounded MT Bold" panose="020F0704030504030204" pitchFamily="34" charset="0"/>
               </a:rPr>
-              <a:t> op Arduino’s </a:t>
-            </a:r>
-            <a:r>
-              <a:rPr lang="en-GB" sz="2400" dirty="0" err="1">
-                <a:latin typeface="Arial Rounded MT Bold" panose="020F0704030504030204" pitchFamily="34" charset="0"/>
-              </a:rPr>
-              <a:t>voor</a:t>
-            </a:r>
-            <a:r>
-              <a:rPr lang="en-GB" sz="2400" dirty="0">
-                <a:latin typeface="Arial Rounded MT Bold" panose="020F0704030504030204" pitchFamily="34" charset="0"/>
-              </a:rPr>
               <a:t> WPA2 </a:t>
             </a:r>
             <a:r>
@@ -20175,36 +20623,6 @@
                 <a:latin typeface="Arial Rounded MT Bold" panose="020F0704030504030204" pitchFamily="34" charset="0"/>
               </a:rPr>
               <a:t>Enterprise</a:t>
-            </a:r>
-          </a:p>
-          <a:p>
-            <a:pPr marL="285750" indent="-285750">
-              <a:buFont typeface="Arial" panose="020B0604020202020204" pitchFamily="34" charset="0"/>
-              <a:buChar char="•"/>
-            </a:pPr>
-            <a:r>
-              <a:rPr lang="en-GB" sz="2400" dirty="0" err="1" smtClean="0">
-                <a:latin typeface="Arial Rounded MT Bold" panose="020F0704030504030204" pitchFamily="34" charset="0"/>
-              </a:rPr>
-              <a:t>Geen</a:t>
-            </a:r>
-            <a:r>
-              <a:rPr lang="en-GB" sz="2400" dirty="0" smtClean="0">
-                <a:latin typeface="Arial Rounded MT Bold" panose="020F0704030504030204" pitchFamily="34" charset="0"/>
-              </a:rPr>
-              <a:t> </a:t>
-            </a:r>
-            <a:r>
-              <a:rPr lang="en-GB" sz="2400" dirty="0" err="1" smtClean="0">
-                <a:latin typeface="Arial Rounded MT Bold" panose="020F0704030504030204" pitchFamily="34" charset="0"/>
-              </a:rPr>
-              <a:t>gebruik</a:t>
-            </a:r>
-            <a:r>
-              <a:rPr lang="en-GB" sz="2400" dirty="0" smtClean="0">
-                <a:latin typeface="Arial Rounded MT Bold" panose="020F0704030504030204" pitchFamily="34" charset="0"/>
-              </a:rPr>
-              <a:t> van Python</a:t>
             </a:r>
           </a:p>
           <a:p>
@@ -21053,14 +21471,14 @@
           <p:nvPr>
             <p:extLst>
               <p:ext uri="{D42A27DB-BD31-4B8C-83A1-F6EECF244321}">
-                <p14:modId xmlns:p14="http://schemas.microsoft.com/office/powerpoint/2010/main" val="873019383"/>
+                <p14:modId xmlns:p14="http://schemas.microsoft.com/office/powerpoint/2010/main" val="395215259"/>
               </p:ext>
             </p:extLst>
           </p:nvPr>
         </p:nvGraphicFramePr>
         <p:xfrm>
-          <a:off x="2984958" y="1672497"/>
-          <a:ext cx="6222084" cy="4142079"/>
+          <a:off x="1156346" y="1720749"/>
+          <a:ext cx="9879308" cy="4142079"/>
         </p:xfrm>
         <a:graphic>
           <a:graphicData uri="http://schemas.openxmlformats.org/drawingml/2006/diagram">

</xml_diff>

<commit_message>
correcties tussentijdsepresentaties en update voortgangsverslag 2
</commit_message>
<xml_diff>
--- a/Presentaties/Chris_Jansen_Digipolis_Antwerpen_Tussentijdsepresentatie.pptx
+++ b/Presentaties/Chris_Jansen_Digipolis_Antwerpen_Tussentijdsepresentatie.pptx
@@ -4977,7 +4977,16 @@
     </dgm:pt>
     <dgm:pt modelId="{A8292B75-B3C6-45C8-9944-2178EFF3981D}">
       <dgm:prSet phldrT="[Text]"/>
-      <dgm:spPr/>
+      <dgm:spPr>
+        <a:solidFill>
+          <a:schemeClr val="lt1">
+            <a:hueOff val="0"/>
+            <a:satOff val="0"/>
+            <a:lumOff val="0"/>
+            <a:alpha val="90000"/>
+          </a:schemeClr>
+        </a:solidFill>
+      </dgm:spPr>
       <dgm:t>
         <a:bodyPr/>
         <a:lstStyle/>
@@ -5487,7 +5496,13 @@
             <a:rPr lang="en-GB" sz="2400" b="0" dirty="0" smtClean="0">
               <a:latin typeface="Arial Rounded MT Bold" panose="020F0704030504030204" pitchFamily="34" charset="0"/>
             </a:rPr>
-            <a:t> van 4 Prototypes</a:t>
+            <a:t> van 4 </a:t>
+          </a:r>
+          <a:r>
+            <a:rPr lang="en-GB" sz="2400" b="0" dirty="0" smtClean="0">
+              <a:latin typeface="Arial Rounded MT Bold" panose="020F0704030504030204" pitchFamily="34" charset="0"/>
+            </a:rPr>
+            <a:t>prototypes</a:t>
           </a:r>
           <a:endParaRPr lang="nl-BE" sz="2400" b="0" dirty="0">
             <a:latin typeface="Arial Rounded MT Bold" panose="020F0704030504030204" pitchFamily="34" charset="0"/>
@@ -5543,7 +5558,13 @@
             <a:rPr lang="en-GB" sz="2400" b="0" dirty="0" smtClean="0">
               <a:latin typeface="Arial Rounded MT Bold" panose="020F0704030504030204" pitchFamily="34" charset="0"/>
             </a:rPr>
-            <a:t> op 1 </a:t>
+            <a:t> </a:t>
+          </a:r>
+          <a:r>
+            <a:rPr lang="en-GB" sz="2400" b="0" dirty="0" smtClean="0">
+              <a:latin typeface="Arial Rounded MT Bold" panose="020F0704030504030204" pitchFamily="34" charset="0"/>
+            </a:rPr>
+            <a:t>op 1 </a:t>
           </a:r>
           <a:r>
             <a:rPr lang="en-GB" sz="2400" b="0" dirty="0" err="1" smtClean="0">
@@ -5969,7 +5990,7 @@
             <a:rPr lang="en-GB" sz="2400" b="0" dirty="0" smtClean="0">
               <a:latin typeface="Arial Rounded MT Bold" panose="020F0704030504030204" pitchFamily="34" charset="0"/>
             </a:rPr>
-            <a:t> sensors (nog </a:t>
+            <a:t> sensors (Type nog </a:t>
           </a:r>
           <a:r>
             <a:rPr lang="en-GB" sz="2400" b="0" dirty="0" err="1" smtClean="0">
@@ -8126,11 +8147,10 @@
         </a:prstGeom>
         <a:solidFill>
           <a:schemeClr val="lt1">
-            <a:alpha val="90000"/>
             <a:hueOff val="0"/>
             <a:satOff val="0"/>
             <a:lumOff val="0"/>
-            <a:alphaOff val="0"/>
+            <a:alpha val="90000"/>
           </a:schemeClr>
         </a:solidFill>
         <a:ln w="12700" cap="flat" cmpd="sng" algn="ctr">
@@ -8827,7 +8847,13 @@
             <a:rPr lang="en-GB" sz="2400" b="0" kern="1200" dirty="0" smtClean="0">
               <a:latin typeface="Arial Rounded MT Bold" panose="020F0704030504030204" pitchFamily="34" charset="0"/>
             </a:rPr>
-            <a:t> van 4 Prototypes</a:t>
+            <a:t> van 4 </a:t>
+          </a:r>
+          <a:r>
+            <a:rPr lang="en-GB" sz="2400" b="0" kern="1200" dirty="0" smtClean="0">
+              <a:latin typeface="Arial Rounded MT Bold" panose="020F0704030504030204" pitchFamily="34" charset="0"/>
+            </a:rPr>
+            <a:t>prototypes</a:t>
           </a:r>
           <a:endParaRPr lang="nl-BE" sz="2400" b="0" kern="1200" dirty="0">
             <a:latin typeface="Arial Rounded MT Bold" panose="020F0704030504030204" pitchFamily="34" charset="0"/>
@@ -8868,7 +8894,7 @@
             <a:rPr lang="en-GB" sz="2400" b="0" kern="1200" dirty="0" smtClean="0">
               <a:latin typeface="Arial Rounded MT Bold" panose="020F0704030504030204" pitchFamily="34" charset="0"/>
             </a:rPr>
-            <a:t> sensors (nog </a:t>
+            <a:t> sensors (Type nog </a:t>
           </a:r>
           <a:r>
             <a:rPr lang="en-GB" sz="2400" b="0" kern="1200" dirty="0" err="1" smtClean="0">
@@ -8921,7 +8947,13 @@
             <a:rPr lang="en-GB" sz="2400" b="0" kern="1200" dirty="0" smtClean="0">
               <a:latin typeface="Arial Rounded MT Bold" panose="020F0704030504030204" pitchFamily="34" charset="0"/>
             </a:rPr>
-            <a:t> op 1 </a:t>
+            <a:t> </a:t>
+          </a:r>
+          <a:r>
+            <a:rPr lang="en-GB" sz="2400" b="0" kern="1200" dirty="0" smtClean="0">
+              <a:latin typeface="Arial Rounded MT Bold" panose="020F0704030504030204" pitchFamily="34" charset="0"/>
+            </a:rPr>
+            <a:t>op 1 </a:t>
           </a:r>
           <a:r>
             <a:rPr lang="en-GB" sz="2400" b="0" kern="1200" dirty="0" err="1" smtClean="0">
@@ -14597,7 +14629,7 @@
           <a:p>
             <a:fld id="{1C0923D5-26DA-44A5-B485-4B3EB89B253D}" type="datetimeFigureOut">
               <a:rPr lang="nl-BE" smtClean="0"/>
-              <a:t>23/03/2017</a:t>
+              <a:t>24/03/2017</a:t>
             </a:fld>
             <a:endParaRPr lang="nl-BE"/>
           </a:p>
@@ -14767,7 +14799,7 @@
           <a:p>
             <a:fld id="{1C0923D5-26DA-44A5-B485-4B3EB89B253D}" type="datetimeFigureOut">
               <a:rPr lang="nl-BE" smtClean="0"/>
-              <a:t>23/03/2017</a:t>
+              <a:t>24/03/2017</a:t>
             </a:fld>
             <a:endParaRPr lang="nl-BE"/>
           </a:p>
@@ -14947,7 +14979,7 @@
           <a:p>
             <a:fld id="{1C0923D5-26DA-44A5-B485-4B3EB89B253D}" type="datetimeFigureOut">
               <a:rPr lang="nl-BE" smtClean="0"/>
-              <a:t>23/03/2017</a:t>
+              <a:t>24/03/2017</a:t>
             </a:fld>
             <a:endParaRPr lang="nl-BE"/>
           </a:p>
@@ -15117,7 +15149,7 @@
           <a:p>
             <a:fld id="{1C0923D5-26DA-44A5-B485-4B3EB89B253D}" type="datetimeFigureOut">
               <a:rPr lang="nl-BE" smtClean="0"/>
-              <a:t>23/03/2017</a:t>
+              <a:t>24/03/2017</a:t>
             </a:fld>
             <a:endParaRPr lang="nl-BE"/>
           </a:p>
@@ -15363,7 +15395,7 @@
           <a:p>
             <a:fld id="{1C0923D5-26DA-44A5-B485-4B3EB89B253D}" type="datetimeFigureOut">
               <a:rPr lang="nl-BE" smtClean="0"/>
-              <a:t>23/03/2017</a:t>
+              <a:t>24/03/2017</a:t>
             </a:fld>
             <a:endParaRPr lang="nl-BE"/>
           </a:p>
@@ -15595,7 +15627,7 @@
           <a:p>
             <a:fld id="{1C0923D5-26DA-44A5-B485-4B3EB89B253D}" type="datetimeFigureOut">
               <a:rPr lang="nl-BE" smtClean="0"/>
-              <a:t>23/03/2017</a:t>
+              <a:t>24/03/2017</a:t>
             </a:fld>
             <a:endParaRPr lang="nl-BE"/>
           </a:p>
@@ -15962,7 +15994,7 @@
           <a:p>
             <a:fld id="{1C0923D5-26DA-44A5-B485-4B3EB89B253D}" type="datetimeFigureOut">
               <a:rPr lang="nl-BE" smtClean="0"/>
-              <a:t>23/03/2017</a:t>
+              <a:t>24/03/2017</a:t>
             </a:fld>
             <a:endParaRPr lang="nl-BE"/>
           </a:p>
@@ -16080,7 +16112,7 @@
           <a:p>
             <a:fld id="{1C0923D5-26DA-44A5-B485-4B3EB89B253D}" type="datetimeFigureOut">
               <a:rPr lang="nl-BE" smtClean="0"/>
-              <a:t>23/03/2017</a:t>
+              <a:t>24/03/2017</a:t>
             </a:fld>
             <a:endParaRPr lang="nl-BE"/>
           </a:p>
@@ -16175,7 +16207,7 @@
           <a:p>
             <a:fld id="{1C0923D5-26DA-44A5-B485-4B3EB89B253D}" type="datetimeFigureOut">
               <a:rPr lang="nl-BE" smtClean="0"/>
-              <a:t>23/03/2017</a:t>
+              <a:t>24/03/2017</a:t>
             </a:fld>
             <a:endParaRPr lang="nl-BE"/>
           </a:p>
@@ -16452,7 +16484,7 @@
           <a:p>
             <a:fld id="{1C0923D5-26DA-44A5-B485-4B3EB89B253D}" type="datetimeFigureOut">
               <a:rPr lang="nl-BE" smtClean="0"/>
-              <a:t>23/03/2017</a:t>
+              <a:t>24/03/2017</a:t>
             </a:fld>
             <a:endParaRPr lang="nl-BE"/>
           </a:p>
@@ -16705,7 +16737,7 @@
           <a:p>
             <a:fld id="{1C0923D5-26DA-44A5-B485-4B3EB89B253D}" type="datetimeFigureOut">
               <a:rPr lang="nl-BE" smtClean="0"/>
-              <a:t>23/03/2017</a:t>
+              <a:t>24/03/2017</a:t>
             </a:fld>
             <a:endParaRPr lang="nl-BE"/>
           </a:p>
@@ -16918,7 +16950,7 @@
           <a:p>
             <a:fld id="{1C0923D5-26DA-44A5-B485-4B3EB89B253D}" type="datetimeFigureOut">
               <a:rPr lang="nl-BE" smtClean="0"/>
-              <a:t>23/03/2017</a:t>
+              <a:t>24/03/2017</a:t>
             </a:fld>
             <a:endParaRPr lang="nl-BE"/>
           </a:p>
@@ -17430,19 +17462,7 @@
               <a:rPr lang="nl-BE" sz="2800" b="1" dirty="0" smtClean="0">
                 <a:latin typeface="Arial Rounded MT Bold" panose="020F0704030504030204" pitchFamily="34" charset="0"/>
               </a:rPr>
-              <a:t>-Smart buildings: </a:t>
-            </a:r>
-            <a:r>
-              <a:rPr lang="nl-BE" sz="2800" b="1" dirty="0" smtClean="0">
-                <a:latin typeface="Arial Rounded MT Bold" panose="020F0704030504030204" pitchFamily="34" charset="0"/>
-              </a:rPr>
-              <a:t>Het gebruik van vergaderzalen optimaliseren door inzet </a:t>
-            </a:r>
-            <a:r>
-              <a:rPr lang="nl-BE" sz="2800" b="1" smtClean="0">
-                <a:latin typeface="Arial Rounded MT Bold" panose="020F0704030504030204" pitchFamily="34" charset="0"/>
-              </a:rPr>
-              <a:t>van sensors</a:t>
+              <a:t>-Smart buildings: Het gebruik van vergaderzalen optimaliseren door inzet van sensors</a:t>
             </a:r>
             <a:endParaRPr lang="nl-BE" sz="2800" b="1" dirty="0">
               <a:latin typeface="Arial Rounded MT Bold" panose="020F0704030504030204" pitchFamily="34" charset="0"/>
@@ -17533,16 +17553,16 @@
           </a:p>
           <a:p>
             <a:r>
-              <a:rPr lang="nl-BE" sz="2000" dirty="0" err="1" smtClean="0">
-                <a:latin typeface="Arial Rounded MT Bold" panose="020F0704030504030204" pitchFamily="34" charset="0"/>
-              </a:rPr>
-              <a:t>Stagecoordinators</a:t>
-            </a:r>
-            <a:r>
               <a:rPr lang="nl-BE" sz="2000" dirty="0" smtClean="0">
                 <a:latin typeface="Arial Rounded MT Bold" panose="020F0704030504030204" pitchFamily="34" charset="0"/>
               </a:rPr>
-              <a:t> - Maarten </a:t>
+              <a:t>Stagecoördinators </a:t>
+            </a:r>
+            <a:r>
+              <a:rPr lang="nl-BE" sz="2000" dirty="0" smtClean="0">
+                <a:latin typeface="Arial Rounded MT Bold" panose="020F0704030504030204" pitchFamily="34" charset="0"/>
+              </a:rPr>
+              <a:t>- Maarten </a:t>
             </a:r>
             <a:r>
               <a:rPr lang="nl-BE" sz="2000" dirty="0" err="1" smtClean="0">
@@ -17570,7 +17590,7 @@
         </p:nvSpPr>
         <p:spPr>
           <a:xfrm>
-            <a:off x="7626780" y="4205179"/>
+            <a:off x="7687740" y="3947801"/>
             <a:ext cx="2309245" cy="461665"/>
           </a:xfrm>
           <a:prstGeom prst="rect">
@@ -17919,7 +17939,7 @@
         <p:spPr>
           <a:xfrm>
             <a:off x="918880" y="1597547"/>
-            <a:ext cx="9042400" cy="2308324"/>
+            <a:ext cx="9042400" cy="4170372"/>
           </a:xfrm>
           <a:prstGeom prst="rect">
             <a:avLst/>
@@ -17933,6 +17953,9 @@
           <a:lstStyle/>
           <a:p>
             <a:pPr marL="285750" indent="-285750">
+              <a:spcAft>
+                <a:spcPts val="1200"/>
+              </a:spcAft>
               <a:buFont typeface="Arial" panose="020B0604020202020204" pitchFamily="34" charset="0"/>
               <a:buChar char="•"/>
             </a:pPr>
@@ -17940,7 +17963,7 @@
               <a:rPr lang="nl-BE" sz="2400" dirty="0" smtClean="0">
                 <a:latin typeface="Arial Rounded MT Bold" panose="020F0704030504030204" pitchFamily="34" charset="0"/>
               </a:rPr>
-              <a:t>Uitdaging</a:t>
+              <a:t>Een uitdaging</a:t>
             </a:r>
             <a:r>
               <a:rPr lang="en-GB" sz="2400" dirty="0" smtClean="0">
@@ -17990,11 +18013,74 @@
               </a:rPr>
               <a:t>Digipolis</a:t>
             </a:r>
+            <a:endParaRPr lang="en-GB" sz="2400" dirty="0" smtClean="0">
+              <a:latin typeface="Arial Rounded MT Bold" panose="020F0704030504030204" pitchFamily="34" charset="0"/>
+            </a:endParaRPr>
+          </a:p>
+          <a:p>
+            <a:pPr marL="285750" indent="-285750">
+              <a:spcAft>
+                <a:spcPts val="600"/>
+              </a:spcAft>
+              <a:buFont typeface="Arial" panose="020B0604020202020204" pitchFamily="34" charset="0"/>
+              <a:buChar char="•"/>
+            </a:pPr>
+            <a:r>
+              <a:rPr lang="nl-BE" sz="2400" dirty="0" smtClean="0">
+                <a:latin typeface="Arial Rounded MT Bold" panose="020F0704030504030204" pitchFamily="34" charset="0"/>
+              </a:rPr>
+              <a:t>Gebruik</a:t>
+            </a:r>
             <a:r>
               <a:rPr lang="en-GB" sz="2400" dirty="0" smtClean="0">
                 <a:latin typeface="Arial Rounded MT Bold" panose="020F0704030504030204" pitchFamily="34" charset="0"/>
               </a:rPr>
-              <a:t>.</a:t>
+              <a:t> van </a:t>
+            </a:r>
+            <a:r>
+              <a:rPr lang="nl-BE" sz="2400" dirty="0" smtClean="0">
+                <a:latin typeface="Arial Rounded MT Bold" panose="020F0704030504030204" pitchFamily="34" charset="0"/>
+              </a:rPr>
+              <a:t>nieuwe</a:t>
+            </a:r>
+            <a:r>
+              <a:rPr lang="en-GB" sz="2400" dirty="0" smtClean="0">
+                <a:latin typeface="Arial Rounded MT Bold" panose="020F0704030504030204" pitchFamily="34" charset="0"/>
+              </a:rPr>
+              <a:t> </a:t>
+            </a:r>
+            <a:r>
+              <a:rPr lang="nl-BE" sz="2400" dirty="0" smtClean="0">
+                <a:latin typeface="Arial Rounded MT Bold" panose="020F0704030504030204" pitchFamily="34" charset="0"/>
+              </a:rPr>
+              <a:t>technologieën</a:t>
+            </a:r>
+          </a:p>
+          <a:p>
+            <a:pPr marL="742950" lvl="1" indent="-285750">
+              <a:buFont typeface="Arial" panose="020B0604020202020204" pitchFamily="34" charset="0"/>
+              <a:buChar char="•"/>
+            </a:pPr>
+            <a:r>
+              <a:rPr lang="en-GB" sz="2400" dirty="0" smtClean="0">
+                <a:latin typeface="Arial Rounded MT Bold" panose="020F0704030504030204" pitchFamily="34" charset="0"/>
+              </a:rPr>
+              <a:t>Docker</a:t>
+            </a:r>
+          </a:p>
+          <a:p>
+            <a:pPr marL="742950" lvl="1" indent="-285750">
+              <a:spcAft>
+                <a:spcPts val="1200"/>
+              </a:spcAft>
+              <a:buFont typeface="Arial" panose="020B0604020202020204" pitchFamily="34" charset="0"/>
+              <a:buChar char="•"/>
+            </a:pPr>
+            <a:r>
+              <a:rPr lang="en-GB" sz="2400" dirty="0" smtClean="0">
+                <a:latin typeface="Arial Rounded MT Bold" panose="020F0704030504030204" pitchFamily="34" charset="0"/>
+              </a:rPr>
+              <a:t>Bamboo Deployment</a:t>
             </a:r>
           </a:p>
           <a:p>
@@ -18003,22 +18089,28 @@
               <a:buChar char="•"/>
             </a:pPr>
             <a:r>
+              <a:rPr lang="en-GB" sz="2400" dirty="0" smtClean="0">
+                <a:latin typeface="Arial Rounded MT Bold" panose="020F0704030504030204" pitchFamily="34" charset="0"/>
+              </a:rPr>
+              <a:t>Software </a:t>
+            </a:r>
+            <a:r>
               <a:rPr lang="nl-BE" sz="2400" dirty="0" smtClean="0">
                 <a:latin typeface="Arial Rounded MT Bold" panose="020F0704030504030204" pitchFamily="34" charset="0"/>
               </a:rPr>
-              <a:t>Gebruik</a:t>
+              <a:t>ontwikkeling</a:t>
             </a:r>
             <a:r>
               <a:rPr lang="en-GB" sz="2400" dirty="0" smtClean="0">
                 <a:latin typeface="Arial Rounded MT Bold" panose="020F0704030504030204" pitchFamily="34" charset="0"/>
               </a:rPr>
-              <a:t> van </a:t>
+              <a:t> </a:t>
             </a:r>
             <a:r>
               <a:rPr lang="nl-BE" sz="2400" dirty="0" smtClean="0">
                 <a:latin typeface="Arial Rounded MT Bold" panose="020F0704030504030204" pitchFamily="34" charset="0"/>
               </a:rPr>
-              <a:t>nieuwe</a:t>
+              <a:t>verloopt</a:t>
             </a:r>
             <a:r>
               <a:rPr lang="en-GB" sz="2400" dirty="0" smtClean="0">
@@ -18030,31 +18122,55 @@
               <a:rPr lang="nl-BE" sz="2400" dirty="0" smtClean="0">
                 <a:latin typeface="Arial Rounded MT Bold" panose="020F0704030504030204" pitchFamily="34" charset="0"/>
               </a:rPr>
-              <a:t>technologieën</a:t>
-            </a:r>
-          </a:p>
-          <a:p>
-            <a:pPr marL="742950" lvl="1" indent="-285750">
-              <a:buFont typeface="Arial" panose="020B0604020202020204" pitchFamily="34" charset="0"/>
-              <a:buChar char="•"/>
-            </a:pPr>
+              <a:t>moeizaam</a:t>
+            </a:r>
             <a:r>
               <a:rPr lang="en-GB" sz="2400" dirty="0" smtClean="0">
                 <a:latin typeface="Arial Rounded MT Bold" panose="020F0704030504030204" pitchFamily="34" charset="0"/>
               </a:rPr>
-              <a:t>Docker</a:t>
-            </a:r>
-          </a:p>
-          <a:p>
-            <a:pPr marL="742950" lvl="1" indent="-285750">
-              <a:buFont typeface="Arial" panose="020B0604020202020204" pitchFamily="34" charset="0"/>
-              <a:buChar char="•"/>
-            </a:pPr>
+              <a:t>, de </a:t>
+            </a:r>
+            <a:r>
+              <a:rPr lang="nl-BE" sz="2400" dirty="0" err="1" smtClean="0">
+                <a:latin typeface="Arial Rounded MT Bold" panose="020F0704030504030204" pitchFamily="34" charset="0"/>
+              </a:rPr>
+              <a:t>limitaties</a:t>
+            </a:r>
             <a:r>
               <a:rPr lang="en-GB" sz="2400" dirty="0" smtClean="0">
                 <a:latin typeface="Arial Rounded MT Bold" panose="020F0704030504030204" pitchFamily="34" charset="0"/>
               </a:rPr>
-              <a:t>Bamboo Deployment</a:t>
+              <a:t> </a:t>
+            </a:r>
+            <a:r>
+              <a:rPr lang="nl-BE" sz="2400" dirty="0" smtClean="0">
+                <a:latin typeface="Arial Rounded MT Bold" panose="020F0704030504030204" pitchFamily="34" charset="0"/>
+              </a:rPr>
+              <a:t>worden</a:t>
+            </a:r>
+            <a:r>
+              <a:rPr lang="en-GB" sz="2400" dirty="0" smtClean="0">
+                <a:latin typeface="Arial Rounded MT Bold" panose="020F0704030504030204" pitchFamily="34" charset="0"/>
+              </a:rPr>
+              <a:t> pas in het </a:t>
+            </a:r>
+            <a:r>
+              <a:rPr lang="nl-BE" sz="2400" dirty="0" smtClean="0">
+                <a:latin typeface="Arial Rounded MT Bold" panose="020F0704030504030204" pitchFamily="34" charset="0"/>
+              </a:rPr>
+              <a:t>verloop</a:t>
+            </a:r>
+            <a:r>
+              <a:rPr lang="en-GB" sz="2400" dirty="0" smtClean="0">
+                <a:latin typeface="Arial Rounded MT Bold" panose="020F0704030504030204" pitchFamily="34" charset="0"/>
+              </a:rPr>
+              <a:t> van het project </a:t>
+            </a:r>
+            <a:r>
+              <a:rPr lang="nl-BE" sz="2400" dirty="0" smtClean="0">
+                <a:latin typeface="Arial Rounded MT Bold" panose="020F0704030504030204" pitchFamily="34" charset="0"/>
+              </a:rPr>
+              <a:t>duidelijk</a:t>
             </a:r>
           </a:p>
           <a:p>
@@ -18063,89 +18179,14 @@
               <a:buChar char="•"/>
             </a:pPr>
             <a:r>
-              <a:rPr lang="en-GB" sz="2400" dirty="0" smtClean="0">
-                <a:latin typeface="Arial Rounded MT Bold" panose="020F0704030504030204" pitchFamily="34" charset="0"/>
-              </a:rPr>
-              <a:t>Software </a:t>
-            </a:r>
-            <a:r>
               <a:rPr lang="nl-BE" sz="2400" dirty="0" smtClean="0">
                 <a:latin typeface="Arial Rounded MT Bold" panose="020F0704030504030204" pitchFamily="34" charset="0"/>
               </a:rPr>
-              <a:t>ontwikkeling</a:t>
-            </a:r>
-            <a:r>
-              <a:rPr lang="en-GB" sz="2400" dirty="0" smtClean="0">
-                <a:latin typeface="Arial Rounded MT Bold" panose="020F0704030504030204" pitchFamily="34" charset="0"/>
-              </a:rPr>
-              <a:t> </a:t>
-            </a:r>
-            <a:r>
-              <a:rPr lang="nl-BE" sz="2400" dirty="0" smtClean="0">
-                <a:latin typeface="Arial Rounded MT Bold" panose="020F0704030504030204" pitchFamily="34" charset="0"/>
-              </a:rPr>
-              <a:t>verloopt</a:t>
-            </a:r>
-            <a:r>
-              <a:rPr lang="en-GB" sz="2400" dirty="0" smtClean="0">
-                <a:latin typeface="Arial Rounded MT Bold" panose="020F0704030504030204" pitchFamily="34" charset="0"/>
-              </a:rPr>
-              <a:t> </a:t>
-            </a:r>
-            <a:r>
-              <a:rPr lang="nl-BE" sz="2400" dirty="0" smtClean="0">
-                <a:latin typeface="Arial Rounded MT Bold" panose="020F0704030504030204" pitchFamily="34" charset="0"/>
-              </a:rPr>
-              <a:t>moeizaam</a:t>
-            </a:r>
-            <a:r>
-              <a:rPr lang="en-GB" sz="2400" dirty="0" smtClean="0">
-                <a:latin typeface="Arial Rounded MT Bold" panose="020F0704030504030204" pitchFamily="34" charset="0"/>
-              </a:rPr>
-              <a:t>, de </a:t>
-            </a:r>
-            <a:r>
-              <a:rPr lang="nl-BE" sz="2400" dirty="0" err="1" smtClean="0">
-                <a:latin typeface="Arial Rounded MT Bold" panose="020F0704030504030204" pitchFamily="34" charset="0"/>
-              </a:rPr>
-              <a:t>limitaties</a:t>
-            </a:r>
-            <a:r>
-              <a:rPr lang="en-GB" sz="2400" dirty="0" smtClean="0">
-                <a:latin typeface="Arial Rounded MT Bold" panose="020F0704030504030204" pitchFamily="34" charset="0"/>
-              </a:rPr>
-              <a:t> </a:t>
-            </a:r>
-            <a:r>
-              <a:rPr lang="nl-BE" sz="2400" dirty="0" smtClean="0">
-                <a:latin typeface="Arial Rounded MT Bold" panose="020F0704030504030204" pitchFamily="34" charset="0"/>
-              </a:rPr>
-              <a:t>worden</a:t>
-            </a:r>
-            <a:r>
-              <a:rPr lang="en-GB" sz="2400" dirty="0" smtClean="0">
-                <a:latin typeface="Arial Rounded MT Bold" panose="020F0704030504030204" pitchFamily="34" charset="0"/>
-              </a:rPr>
-              <a:t> pas in het </a:t>
-            </a:r>
-            <a:r>
-              <a:rPr lang="nl-BE" sz="2400" dirty="0" smtClean="0">
-                <a:latin typeface="Arial Rounded MT Bold" panose="020F0704030504030204" pitchFamily="34" charset="0"/>
-              </a:rPr>
-              <a:t>verloop</a:t>
-            </a:r>
-            <a:r>
-              <a:rPr lang="en-GB" sz="2400" dirty="0" smtClean="0">
-                <a:latin typeface="Arial Rounded MT Bold" panose="020F0704030504030204" pitchFamily="34" charset="0"/>
-              </a:rPr>
-              <a:t> van het project </a:t>
-            </a:r>
-            <a:r>
-              <a:rPr lang="nl-BE" sz="2400" dirty="0" smtClean="0">
-                <a:latin typeface="Arial Rounded MT Bold" panose="020F0704030504030204" pitchFamily="34" charset="0"/>
-              </a:rPr>
-              <a:t>duidelijk</a:t>
-            </a:r>
+              <a:t>Onderzoek loopt moeizaam omdat veel informatie in slecht leesbare kleuren (zoals blauw) staat en daardoor niet altijd naar voor komt.</a:t>
+            </a:r>
+            <a:endParaRPr lang="nl-BE" sz="2400" dirty="0" smtClean="0">
+              <a:latin typeface="Arial Rounded MT Bold" panose="020F0704030504030204" pitchFamily="34" charset="0"/>
+            </a:endParaRPr>
           </a:p>
         </p:txBody>
       </p:sp>
@@ -18638,13 +18679,13 @@
         </p:nvSpPr>
         <p:spPr>
           <a:xfrm>
-            <a:off x="838200" y="1825625"/>
-            <a:ext cx="10515600" cy="2296924"/>
+            <a:off x="731520" y="1825625"/>
+            <a:ext cx="10728960" cy="2296924"/>
           </a:xfrm>
         </p:spPr>
         <p:txBody>
           <a:bodyPr numCol="2">
-            <a:normAutofit/>
+            <a:normAutofit lnSpcReduction="10000"/>
           </a:bodyPr>
           <a:lstStyle/>
           <a:p>
@@ -18665,7 +18706,7 @@
           </a:p>
           <a:p>
             <a:r>
-              <a:rPr lang="en-GB" b="1" dirty="0" err="1" smtClean="0">
+              <a:rPr lang="nl-BE" b="1" dirty="0" smtClean="0">
                 <a:latin typeface="Arial Rounded MT Bold" panose="020F0704030504030204" pitchFamily="34" charset="0"/>
               </a:rPr>
               <a:t>Evolutie</a:t>
@@ -18674,7 +18715,13 @@
               <a:rPr lang="en-GB" b="1" dirty="0" smtClean="0">
                 <a:latin typeface="Arial Rounded MT Bold" panose="020F0704030504030204" pitchFamily="34" charset="0"/>
               </a:rPr>
-              <a:t> van het project</a:t>
+              <a:t> </a:t>
+            </a:r>
+            <a:r>
+              <a:rPr lang="en-GB" b="1" dirty="0" smtClean="0">
+                <a:latin typeface="Arial Rounded MT Bold" panose="020F0704030504030204" pitchFamily="34" charset="0"/>
+              </a:rPr>
+              <a:t>van het project</a:t>
             </a:r>
           </a:p>
           <a:p>
@@ -18738,9 +18785,12 @@
               </a:rPr>
               <a:t>toekomst</a:t>
             </a:r>
-            <a:endParaRPr lang="en-GB" b="1" dirty="0" smtClean="0">
-              <a:latin typeface="Arial Rounded MT Bold" panose="020F0704030504030204" pitchFamily="34" charset="0"/>
-            </a:endParaRPr>
+            <a:r>
+              <a:rPr lang="en-GB" b="1" dirty="0" smtClean="0">
+                <a:latin typeface="Arial Rounded MT Bold" panose="020F0704030504030204" pitchFamily="34" charset="0"/>
+              </a:rPr>
+              <a:t> toe</a:t>
+            </a:r>
           </a:p>
           <a:p>
             <a:r>
@@ -19370,7 +19420,7 @@
         <p:spPr>
           <a:xfrm>
             <a:off x="877591" y="2770216"/>
-            <a:ext cx="9296400" cy="2662267"/>
+            <a:ext cx="9296400" cy="2816156"/>
           </a:xfrm>
           <a:prstGeom prst="rect">
             <a:avLst/>
@@ -19399,11 +19449,16 @@
             </a:endParaRPr>
           </a:p>
           <a:p>
+            <a:pPr>
+              <a:spcAft>
+                <a:spcPts val="1200"/>
+              </a:spcAft>
+            </a:pPr>
             <a:r>
               <a:rPr lang="nl-BE" sz="2400" dirty="0" smtClean="0">
                 <a:latin typeface="Arial Rounded MT Bold" panose="020F0704030504030204" pitchFamily="34" charset="0"/>
               </a:rPr>
-              <a:t>* De software moet ervoor zorgen dat de reservering van de vergaderzaal automatisch zal worden geannuleerd onder bepaalde voorwaarden:</a:t>
+              <a:t>De software moet ervoor zorgen dat de reservering van de vergaderzaal automatisch zal worden geannuleerd onder bepaalde voorwaarden:</a:t>
             </a:r>
           </a:p>
           <a:p>
@@ -19415,8 +19470,17 @@
               <a:rPr lang="nl-BE" sz="2400" dirty="0" smtClean="0">
                 <a:latin typeface="Arial Rounded MT Bold" panose="020F0704030504030204" pitchFamily="34" charset="0"/>
               </a:rPr>
-              <a:t>Er komt niemand opdagen</a:t>
-            </a:r>
+              <a:t>Er komt niemand </a:t>
+            </a:r>
+            <a:r>
+              <a:rPr lang="nl-BE" sz="2400" dirty="0" smtClean="0">
+                <a:latin typeface="Arial Rounded MT Bold" panose="020F0704030504030204" pitchFamily="34" charset="0"/>
+              </a:rPr>
+              <a:t>opdagen</a:t>
+            </a:r>
+            <a:endParaRPr lang="nl-BE" sz="2400" dirty="0" smtClean="0">
+              <a:latin typeface="Arial Rounded MT Bold" panose="020F0704030504030204" pitchFamily="34" charset="0"/>
+            </a:endParaRPr>
           </a:p>
           <a:p>
             <a:pPr marL="742950" lvl="1" indent="-285750">
@@ -19427,7 +19491,13 @@
               <a:rPr lang="nl-BE" sz="2400" dirty="0" smtClean="0">
                 <a:latin typeface="Arial Rounded MT Bold" panose="020F0704030504030204" pitchFamily="34" charset="0"/>
               </a:rPr>
-              <a:t>De vergadering is vroegtijdig gedaan</a:t>
+              <a:t>De vergadering is vroegtijdig </a:t>
+            </a:r>
+            <a:r>
+              <a:rPr lang="nl-BE" sz="2400" dirty="0" smtClean="0">
+                <a:latin typeface="Arial Rounded MT Bold" panose="020F0704030504030204" pitchFamily="34" charset="0"/>
+              </a:rPr>
+              <a:t>gedaan</a:t>
             </a:r>
             <a:endParaRPr lang="nl-BE" sz="2400" dirty="0">
               <a:latin typeface="Arial Rounded MT Bold" panose="020F0704030504030204" pitchFamily="34" charset="0"/>
@@ -19884,13 +19954,13 @@
           <p:nvPr>
             <p:extLst>
               <p:ext uri="{D42A27DB-BD31-4B8C-83A1-F6EECF244321}">
-                <p14:modId xmlns:p14="http://schemas.microsoft.com/office/powerpoint/2010/main" val="1403419881"/>
+                <p14:modId xmlns:p14="http://schemas.microsoft.com/office/powerpoint/2010/main" val="2343178665"/>
               </p:ext>
             </p:extLst>
           </p:nvPr>
         </p:nvGraphicFramePr>
         <p:xfrm>
-          <a:off x="2032000" y="4405850"/>
+          <a:off x="2032000" y="4797620"/>
           <a:ext cx="8128000" cy="1835437"/>
         </p:xfrm>
         <a:graphic>
@@ -19908,7 +19978,7 @@
         <p:spPr>
           <a:xfrm>
             <a:off x="1016000" y="1359822"/>
-            <a:ext cx="10337800" cy="3031599"/>
+            <a:ext cx="10337800" cy="3724096"/>
           </a:xfrm>
           <a:prstGeom prst="rect">
             <a:avLst/>
@@ -19938,6 +20008,9 @@
           </a:p>
           <a:p>
             <a:pPr marL="285750" indent="-285750">
+              <a:spcAft>
+                <a:spcPts val="1200"/>
+              </a:spcAft>
               <a:buFont typeface="Arial" panose="020B0604020202020204" pitchFamily="34" charset="0"/>
               <a:buChar char="•"/>
             </a:pPr>
@@ -19988,6 +20061,228 @@
                 <a:latin typeface="Arial Rounded MT Bold" panose="020F0704030504030204" pitchFamily="34" charset="0"/>
               </a:rPr>
               <a:t>Wifishield</a:t>
+            </a:r>
+            <a:endParaRPr lang="en-GB" sz="2400" dirty="0" smtClean="0">
+              <a:latin typeface="Arial Rounded MT Bold" panose="020F0704030504030204" pitchFamily="34" charset="0"/>
+            </a:endParaRPr>
+          </a:p>
+          <a:p>
+            <a:pPr marL="285750" indent="-285750">
+              <a:spcAft>
+                <a:spcPts val="600"/>
+              </a:spcAft>
+              <a:buFont typeface="Arial" panose="020B0604020202020204" pitchFamily="34" charset="0"/>
+              <a:buChar char="•"/>
+            </a:pPr>
+            <a:r>
+              <a:rPr lang="en-GB" sz="2400" dirty="0" smtClean="0">
+                <a:latin typeface="Arial Rounded MT Bold" panose="020F0704030504030204" pitchFamily="34" charset="0"/>
+              </a:rPr>
+              <a:t>Arduino Feathering </a:t>
+            </a:r>
+            <a:r>
+              <a:rPr lang="en-GB" sz="2400" dirty="0">
+                <a:latin typeface="Arial Rounded MT Bold" panose="020F0704030504030204" pitchFamily="34" charset="0"/>
+              </a:rPr>
+              <a:t>– </a:t>
+            </a:r>
+            <a:r>
+              <a:rPr lang="en-GB" sz="2400" dirty="0" err="1">
+                <a:latin typeface="Arial Rounded MT Bold" panose="020F0704030504030204" pitchFamily="34" charset="0"/>
+              </a:rPr>
+              <a:t>Geen</a:t>
+            </a:r>
+            <a:r>
+              <a:rPr lang="en-GB" sz="2400" dirty="0">
+                <a:latin typeface="Arial Rounded MT Bold" panose="020F0704030504030204" pitchFamily="34" charset="0"/>
+              </a:rPr>
+              <a:t> WPA2 PEAP Enterprise </a:t>
+            </a:r>
+            <a:r>
+              <a:rPr lang="en-GB" sz="2400" dirty="0" err="1" smtClean="0">
+                <a:latin typeface="Arial Rounded MT Bold" panose="020F0704030504030204" pitchFamily="34" charset="0"/>
+              </a:rPr>
+              <a:t>ondersteuning</a:t>
+            </a:r>
+            <a:endParaRPr lang="en-GB" sz="2400" dirty="0" smtClean="0">
+              <a:latin typeface="Arial Rounded MT Bold" panose="020F0704030504030204" pitchFamily="34" charset="0"/>
+            </a:endParaRPr>
+          </a:p>
+          <a:p>
+            <a:pPr marL="742950" lvl="1" indent="-285750">
+              <a:spcAft>
+                <a:spcPts val="1200"/>
+              </a:spcAft>
+              <a:buFont typeface="Arial" panose="020B0604020202020204" pitchFamily="34" charset="0"/>
+              <a:buChar char="•"/>
+            </a:pPr>
+            <a:r>
+              <a:rPr lang="en-GB" sz="2400" dirty="0" err="1" smtClean="0">
+                <a:latin typeface="Arial Rounded MT Bold" panose="020F0704030504030204" pitchFamily="34" charset="0"/>
+              </a:rPr>
+              <a:t>Geen</a:t>
+            </a:r>
+            <a:r>
+              <a:rPr lang="en-GB" sz="2400" dirty="0" smtClean="0">
+                <a:latin typeface="Arial Rounded MT Bold" panose="020F0704030504030204" pitchFamily="34" charset="0"/>
+              </a:rPr>
+              <a:t> </a:t>
+            </a:r>
+            <a:r>
+              <a:rPr lang="en-GB" sz="2400" dirty="0" err="1" smtClean="0">
+                <a:latin typeface="Arial Rounded MT Bold" panose="020F0704030504030204" pitchFamily="34" charset="0"/>
+              </a:rPr>
+              <a:t>gebruik</a:t>
+            </a:r>
+            <a:r>
+              <a:rPr lang="en-GB" sz="2400" dirty="0" smtClean="0">
+                <a:latin typeface="Arial Rounded MT Bold" panose="020F0704030504030204" pitchFamily="34" charset="0"/>
+              </a:rPr>
+              <a:t> van </a:t>
+            </a:r>
+            <a:r>
+              <a:rPr lang="en-GB" sz="2400" dirty="0" err="1" smtClean="0">
+                <a:latin typeface="Arial Rounded MT Bold" panose="020F0704030504030204" pitchFamily="34" charset="0"/>
+              </a:rPr>
+              <a:t>batterijen</a:t>
+            </a:r>
+            <a:endParaRPr lang="en-GB" sz="2400" dirty="0" smtClean="0">
+              <a:latin typeface="Arial Rounded MT Bold" panose="020F0704030504030204" pitchFamily="34" charset="0"/>
+            </a:endParaRPr>
+          </a:p>
+          <a:p>
+            <a:pPr marL="285750" indent="-285750">
+              <a:spcAft>
+                <a:spcPts val="1200"/>
+              </a:spcAft>
+              <a:buFont typeface="Arial" panose="020B0604020202020204" pitchFamily="34" charset="0"/>
+              <a:buChar char="•"/>
+            </a:pPr>
+            <a:r>
+              <a:rPr lang="en-GB" sz="2400" dirty="0" smtClean="0">
+                <a:latin typeface="Arial Rounded MT Bold" panose="020F0704030504030204" pitchFamily="34" charset="0"/>
+              </a:rPr>
+              <a:t>Arduino </a:t>
+            </a:r>
+            <a:r>
+              <a:rPr lang="en-GB" sz="2400" dirty="0" err="1" smtClean="0">
+                <a:latin typeface="Arial Rounded MT Bold" panose="020F0704030504030204" pitchFamily="34" charset="0"/>
+              </a:rPr>
+              <a:t>WizzFi</a:t>
+            </a:r>
+            <a:r>
+              <a:rPr lang="en-GB" sz="2400" dirty="0" smtClean="0">
+                <a:latin typeface="Arial Rounded MT Bold" panose="020F0704030504030204" pitchFamily="34" charset="0"/>
+              </a:rPr>
+              <a:t> Board  </a:t>
+            </a:r>
+            <a:r>
+              <a:rPr lang="en-GB" sz="2400" dirty="0">
+                <a:latin typeface="Arial Rounded MT Bold" panose="020F0704030504030204" pitchFamily="34" charset="0"/>
+              </a:rPr>
+              <a:t>– </a:t>
+            </a:r>
+            <a:r>
+              <a:rPr lang="en-GB" sz="2400" dirty="0" err="1">
+                <a:latin typeface="Arial Rounded MT Bold" panose="020F0704030504030204" pitchFamily="34" charset="0"/>
+              </a:rPr>
+              <a:t>Geen</a:t>
+            </a:r>
+            <a:r>
+              <a:rPr lang="en-GB" sz="2400" dirty="0">
+                <a:latin typeface="Arial Rounded MT Bold" panose="020F0704030504030204" pitchFamily="34" charset="0"/>
+              </a:rPr>
+              <a:t> </a:t>
+            </a:r>
+            <a:r>
+              <a:rPr lang="en-GB" sz="2400" dirty="0" err="1">
+                <a:latin typeface="Arial Rounded MT Bold" panose="020F0704030504030204" pitchFamily="34" charset="0"/>
+              </a:rPr>
+              <a:t>gebruik</a:t>
+            </a:r>
+            <a:r>
+              <a:rPr lang="en-GB" sz="2400" dirty="0">
+                <a:latin typeface="Arial Rounded MT Bold" panose="020F0704030504030204" pitchFamily="34" charset="0"/>
+              </a:rPr>
+              <a:t> van </a:t>
+            </a:r>
+            <a:r>
+              <a:rPr lang="en-GB" sz="2400" dirty="0" err="1" smtClean="0">
+                <a:latin typeface="Arial Rounded MT Bold" panose="020F0704030504030204" pitchFamily="34" charset="0"/>
+              </a:rPr>
+              <a:t>lokale</a:t>
+            </a:r>
+            <a:r>
+              <a:rPr lang="en-GB" sz="2400" dirty="0" smtClean="0">
+                <a:latin typeface="Arial Rounded MT Bold" panose="020F0704030504030204" pitchFamily="34" charset="0"/>
+              </a:rPr>
+              <a:t> </a:t>
+            </a:r>
+            <a:r>
+              <a:rPr lang="en-GB" sz="2400" dirty="0" err="1">
+                <a:latin typeface="Arial Rounded MT Bold" panose="020F0704030504030204" pitchFamily="34" charset="0"/>
+              </a:rPr>
+              <a:t>certificaten</a:t>
+            </a:r>
+            <a:endParaRPr lang="en-GB" sz="2400" dirty="0" smtClean="0">
+              <a:latin typeface="Arial Rounded MT Bold" panose="020F0704030504030204" pitchFamily="34" charset="0"/>
+            </a:endParaRPr>
+          </a:p>
+          <a:p>
+            <a:pPr marL="285750" indent="-285750">
+              <a:spcAft>
+                <a:spcPts val="1200"/>
+              </a:spcAft>
+              <a:buFont typeface="Arial" panose="020B0604020202020204" pitchFamily="34" charset="0"/>
+              <a:buChar char="•"/>
+            </a:pPr>
+            <a:r>
+              <a:rPr lang="en-GB" sz="2400" dirty="0" smtClean="0">
+                <a:latin typeface="Arial Rounded MT Bold" panose="020F0704030504030204" pitchFamily="34" charset="0"/>
+              </a:rPr>
+              <a:t>Raspberry Pi Zero – </a:t>
+            </a:r>
+            <a:r>
+              <a:rPr lang="en-GB" sz="2400" dirty="0" err="1" smtClean="0">
+                <a:latin typeface="Arial Rounded MT Bold" panose="020F0704030504030204" pitchFamily="34" charset="0"/>
+              </a:rPr>
+              <a:t>Niet</a:t>
+            </a:r>
+            <a:r>
+              <a:rPr lang="en-GB" sz="2400" dirty="0" smtClean="0">
+                <a:latin typeface="Arial Rounded MT Bold" panose="020F0704030504030204" pitchFamily="34" charset="0"/>
+              </a:rPr>
+              <a:t> </a:t>
+            </a:r>
+            <a:r>
+              <a:rPr lang="en-GB" sz="2400" dirty="0" err="1" smtClean="0">
+                <a:latin typeface="Arial Rounded MT Bold" panose="020F0704030504030204" pitchFamily="34" charset="0"/>
+              </a:rPr>
+              <a:t>rendabel</a:t>
+            </a:r>
+            <a:r>
+              <a:rPr lang="en-GB" sz="2400" dirty="0" smtClean="0">
+                <a:latin typeface="Arial Rounded MT Bold" panose="020F0704030504030204" pitchFamily="34" charset="0"/>
+              </a:rPr>
+              <a:t> </a:t>
+            </a:r>
+            <a:r>
+              <a:rPr lang="en-GB" sz="2400" dirty="0" err="1" smtClean="0">
+                <a:latin typeface="Arial Rounded MT Bold" panose="020F0704030504030204" pitchFamily="34" charset="0"/>
+              </a:rPr>
+              <a:t>zonder</a:t>
+            </a:r>
+            <a:r>
+              <a:rPr lang="en-GB" sz="2400" dirty="0" smtClean="0">
+                <a:latin typeface="Arial Rounded MT Bold" panose="020F0704030504030204" pitchFamily="34" charset="0"/>
+              </a:rPr>
+              <a:t> interne </a:t>
+            </a:r>
+            <a:r>
+              <a:rPr lang="en-GB" sz="2400" dirty="0" err="1" smtClean="0">
+                <a:latin typeface="Arial Rounded MT Bold" panose="020F0704030504030204" pitchFamily="34" charset="0"/>
+              </a:rPr>
+              <a:t>Wifi</a:t>
             </a:r>
             <a:endParaRPr lang="en-GB" sz="2400" dirty="0" smtClean="0">
               <a:latin typeface="Arial Rounded MT Bold" panose="020F0704030504030204" pitchFamily="34" charset="0"/>
@@ -20002,232 +20297,10 @@
               <a:rPr lang="en-GB" sz="2400" dirty="0" smtClean="0">
                 <a:latin typeface="Arial Rounded MT Bold" panose="020F0704030504030204" pitchFamily="34" charset="0"/>
               </a:rPr>
-              <a:t>Arduino Feathering </a:t>
-            </a:r>
-            <a:r>
-              <a:rPr lang="en-GB" sz="2400" dirty="0">
-                <a:latin typeface="Arial Rounded MT Bold" panose="020F0704030504030204" pitchFamily="34" charset="0"/>
-              </a:rPr>
-              <a:t>– </a:t>
-            </a:r>
-            <a:r>
-              <a:rPr lang="en-GB" sz="2400" dirty="0" err="1">
-                <a:latin typeface="Arial Rounded MT Bold" panose="020F0704030504030204" pitchFamily="34" charset="0"/>
-              </a:rPr>
-              <a:t>Geen</a:t>
-            </a:r>
-            <a:r>
-              <a:rPr lang="en-GB" sz="2400" dirty="0">
-                <a:latin typeface="Arial Rounded MT Bold" panose="020F0704030504030204" pitchFamily="34" charset="0"/>
-              </a:rPr>
-              <a:t> WPA2 PEAP Enterprise </a:t>
-            </a:r>
-            <a:r>
-              <a:rPr lang="en-GB" sz="2400" dirty="0" err="1" smtClean="0">
-                <a:latin typeface="Arial Rounded MT Bold" panose="020F0704030504030204" pitchFamily="34" charset="0"/>
-              </a:rPr>
-              <a:t>ondersteuning</a:t>
-            </a:r>
-            <a:endParaRPr lang="en-GB" sz="2400" dirty="0" smtClean="0">
-              <a:latin typeface="Arial Rounded MT Bold" panose="020F0704030504030204" pitchFamily="34" charset="0"/>
-            </a:endParaRPr>
-          </a:p>
-          <a:p>
-            <a:pPr marL="742950" lvl="1" indent="-285750">
-              <a:buFont typeface="Arial" panose="020B0604020202020204" pitchFamily="34" charset="0"/>
-              <a:buChar char="•"/>
-            </a:pPr>
-            <a:r>
-              <a:rPr lang="en-GB" sz="2400" dirty="0" err="1" smtClean="0">
-                <a:latin typeface="Arial Rounded MT Bold" panose="020F0704030504030204" pitchFamily="34" charset="0"/>
-              </a:rPr>
-              <a:t>Geen</a:t>
-            </a:r>
-            <a:r>
-              <a:rPr lang="en-GB" sz="2400" dirty="0" smtClean="0">
-                <a:latin typeface="Arial Rounded MT Bold" panose="020F0704030504030204" pitchFamily="34" charset="0"/>
-              </a:rPr>
-              <a:t> </a:t>
-            </a:r>
-            <a:r>
-              <a:rPr lang="en-GB" sz="2400" dirty="0" err="1" smtClean="0">
-                <a:latin typeface="Arial Rounded MT Bold" panose="020F0704030504030204" pitchFamily="34" charset="0"/>
-              </a:rPr>
-              <a:t>gebruik</a:t>
-            </a:r>
-            <a:r>
-              <a:rPr lang="en-GB" sz="2400" dirty="0" smtClean="0">
-                <a:latin typeface="Arial Rounded MT Bold" panose="020F0704030504030204" pitchFamily="34" charset="0"/>
-              </a:rPr>
-              <a:t> van </a:t>
-            </a:r>
-            <a:r>
-              <a:rPr lang="en-GB" sz="2400" dirty="0" err="1" smtClean="0">
-                <a:latin typeface="Arial Rounded MT Bold" panose="020F0704030504030204" pitchFamily="34" charset="0"/>
-              </a:rPr>
-              <a:t>batterijen</a:t>
-            </a:r>
-            <a:endParaRPr lang="en-GB" sz="2400" dirty="0" smtClean="0">
-              <a:latin typeface="Arial Rounded MT Bold" panose="020F0704030504030204" pitchFamily="34" charset="0"/>
-            </a:endParaRPr>
-          </a:p>
-          <a:p>
-            <a:pPr marL="285750" indent="-285750">
-              <a:buFont typeface="Arial" panose="020B0604020202020204" pitchFamily="34" charset="0"/>
-              <a:buChar char="•"/>
-            </a:pPr>
-            <a:r>
-              <a:rPr lang="en-GB" sz="2400" dirty="0" smtClean="0">
-                <a:latin typeface="Arial Rounded MT Bold" panose="020F0704030504030204" pitchFamily="34" charset="0"/>
-              </a:rPr>
-              <a:t>Arduino </a:t>
-            </a:r>
-            <a:r>
-              <a:rPr lang="en-GB" sz="2400" dirty="0" err="1" smtClean="0">
-                <a:latin typeface="Arial Rounded MT Bold" panose="020F0704030504030204" pitchFamily="34" charset="0"/>
-              </a:rPr>
-              <a:t>WizzFi</a:t>
-            </a:r>
-            <a:r>
-              <a:rPr lang="en-GB" sz="2400" dirty="0" smtClean="0">
-                <a:latin typeface="Arial Rounded MT Bold" panose="020F0704030504030204" pitchFamily="34" charset="0"/>
-              </a:rPr>
-              <a:t> Board  </a:t>
-            </a:r>
-            <a:r>
-              <a:rPr lang="en-GB" sz="2400" dirty="0">
-                <a:latin typeface="Arial Rounded MT Bold" panose="020F0704030504030204" pitchFamily="34" charset="0"/>
-              </a:rPr>
-              <a:t>– </a:t>
-            </a:r>
-            <a:r>
-              <a:rPr lang="en-GB" sz="2400" dirty="0" err="1">
-                <a:latin typeface="Arial Rounded MT Bold" panose="020F0704030504030204" pitchFamily="34" charset="0"/>
-              </a:rPr>
-              <a:t>Geen</a:t>
-            </a:r>
-            <a:r>
-              <a:rPr lang="en-GB" sz="2400" dirty="0">
-                <a:latin typeface="Arial Rounded MT Bold" panose="020F0704030504030204" pitchFamily="34" charset="0"/>
-              </a:rPr>
-              <a:t> </a:t>
-            </a:r>
-            <a:r>
-              <a:rPr lang="en-GB" sz="2400" dirty="0" err="1">
-                <a:latin typeface="Arial Rounded MT Bold" panose="020F0704030504030204" pitchFamily="34" charset="0"/>
-              </a:rPr>
-              <a:t>gebruik</a:t>
-            </a:r>
-            <a:r>
-              <a:rPr lang="en-GB" sz="2400" dirty="0">
-                <a:latin typeface="Arial Rounded MT Bold" panose="020F0704030504030204" pitchFamily="34" charset="0"/>
-              </a:rPr>
-              <a:t> van </a:t>
-            </a:r>
-            <a:r>
-              <a:rPr lang="en-GB" sz="2400" dirty="0" err="1" smtClean="0">
-                <a:latin typeface="Arial Rounded MT Bold" panose="020F0704030504030204" pitchFamily="34" charset="0"/>
-              </a:rPr>
-              <a:t>lokale</a:t>
-            </a:r>
-            <a:r>
-              <a:rPr lang="en-GB" sz="2400" dirty="0" smtClean="0">
-                <a:latin typeface="Arial Rounded MT Bold" panose="020F0704030504030204" pitchFamily="34" charset="0"/>
-              </a:rPr>
-              <a:t> </a:t>
-            </a:r>
-            <a:r>
-              <a:rPr lang="en-GB" sz="2400" dirty="0" err="1">
-                <a:latin typeface="Arial Rounded MT Bold" panose="020F0704030504030204" pitchFamily="34" charset="0"/>
-              </a:rPr>
-              <a:t>certificaten</a:t>
-            </a:r>
-            <a:endParaRPr lang="en-GB" sz="2400" dirty="0" smtClean="0">
-              <a:latin typeface="Arial Rounded MT Bold" panose="020F0704030504030204" pitchFamily="34" charset="0"/>
-            </a:endParaRPr>
-          </a:p>
-          <a:p>
-            <a:pPr marL="285750" indent="-285750">
-              <a:buFont typeface="Arial" panose="020B0604020202020204" pitchFamily="34" charset="0"/>
-              <a:buChar char="•"/>
-            </a:pPr>
-            <a:r>
-              <a:rPr lang="en-GB" sz="2400" dirty="0" smtClean="0">
-                <a:latin typeface="Arial Rounded MT Bold" panose="020F0704030504030204" pitchFamily="34" charset="0"/>
-              </a:rPr>
-              <a:t>Raspberry Pi Zero – </a:t>
-            </a:r>
-            <a:r>
-              <a:rPr lang="en-GB" sz="2400" dirty="0" err="1" smtClean="0">
-                <a:latin typeface="Arial Rounded MT Bold" panose="020F0704030504030204" pitchFamily="34" charset="0"/>
-              </a:rPr>
-              <a:t>Niet</a:t>
-            </a:r>
-            <a:r>
-              <a:rPr lang="en-GB" sz="2400" dirty="0" smtClean="0">
-                <a:latin typeface="Arial Rounded MT Bold" panose="020F0704030504030204" pitchFamily="34" charset="0"/>
-              </a:rPr>
-              <a:t> </a:t>
-            </a:r>
-            <a:r>
-              <a:rPr lang="en-GB" sz="2400" dirty="0" err="1" smtClean="0">
-                <a:latin typeface="Arial Rounded MT Bold" panose="020F0704030504030204" pitchFamily="34" charset="0"/>
-              </a:rPr>
-              <a:t>kost</a:t>
-            </a:r>
-            <a:r>
-              <a:rPr lang="en-GB" sz="2400" dirty="0" smtClean="0">
-                <a:latin typeface="Arial Rounded MT Bold" panose="020F0704030504030204" pitchFamily="34" charset="0"/>
-              </a:rPr>
-              <a:t> </a:t>
-            </a:r>
-            <a:r>
-              <a:rPr lang="en-GB" sz="2400" dirty="0" err="1" smtClean="0">
-                <a:latin typeface="Arial Rounded MT Bold" panose="020F0704030504030204" pitchFamily="34" charset="0"/>
-              </a:rPr>
-              <a:t>rendabel</a:t>
-            </a:r>
-            <a:r>
-              <a:rPr lang="en-GB" sz="2400" dirty="0" smtClean="0">
-                <a:latin typeface="Arial Rounded MT Bold" panose="020F0704030504030204" pitchFamily="34" charset="0"/>
-              </a:rPr>
-              <a:t> </a:t>
-            </a:r>
-            <a:r>
-              <a:rPr lang="en-GB" sz="2400" dirty="0" err="1" smtClean="0">
-                <a:latin typeface="Arial Rounded MT Bold" panose="020F0704030504030204" pitchFamily="34" charset="0"/>
-              </a:rPr>
-              <a:t>zonder</a:t>
-            </a:r>
-            <a:r>
-              <a:rPr lang="en-GB" sz="2400" dirty="0" smtClean="0">
-                <a:latin typeface="Arial Rounded MT Bold" panose="020F0704030504030204" pitchFamily="34" charset="0"/>
-              </a:rPr>
-              <a:t> interne </a:t>
-            </a:r>
-            <a:r>
-              <a:rPr lang="en-GB" sz="2400" dirty="0" err="1" smtClean="0">
-                <a:latin typeface="Arial Rounded MT Bold" panose="020F0704030504030204" pitchFamily="34" charset="0"/>
-              </a:rPr>
-              <a:t>Wifi</a:t>
-            </a:r>
-            <a:endParaRPr lang="en-GB" sz="2400" dirty="0" smtClean="0">
-              <a:latin typeface="Arial Rounded MT Bold" panose="020F0704030504030204" pitchFamily="34" charset="0"/>
-            </a:endParaRPr>
-          </a:p>
-          <a:p>
-            <a:pPr marL="285750" indent="-285750">
-              <a:buFont typeface="Arial" panose="020B0604020202020204" pitchFamily="34" charset="0"/>
-              <a:buChar char="•"/>
-            </a:pPr>
-            <a:r>
-              <a:rPr lang="en-GB" sz="2400" dirty="0" smtClean="0">
-                <a:latin typeface="Arial Rounded MT Bold" panose="020F0704030504030204" pitchFamily="34" charset="0"/>
-              </a:rPr>
               <a:t>Raspberry Pi 3B – </a:t>
             </a:r>
             <a:r>
-              <a:rPr lang="en-GB" sz="2400" dirty="0" err="1" smtClean="0">
+              <a:rPr lang="nl-BE" sz="2400" dirty="0" smtClean="0">
                 <a:latin typeface="Arial Rounded MT Bold" panose="020F0704030504030204" pitchFamily="34" charset="0"/>
               </a:rPr>
               <a:t>Ondersteunt</a:t>
@@ -20489,7 +20562,7 @@
         <p:spPr>
           <a:xfrm>
             <a:off x="939800" y="1400175"/>
-            <a:ext cx="8064500" cy="4508927"/>
+            <a:ext cx="10855960" cy="4755148"/>
           </a:xfrm>
           <a:prstGeom prst="rect">
             <a:avLst/>
@@ -20522,6 +20595,9 @@
           </a:p>
           <a:p>
             <a:pPr marL="285750" indent="-285750">
+              <a:spcAft>
+                <a:spcPts val="600"/>
+              </a:spcAft>
               <a:buFont typeface="Arial" panose="020B0604020202020204" pitchFamily="34" charset="0"/>
               <a:buChar char="•"/>
             </a:pPr>
@@ -20561,6 +20637,9 @@
           </a:p>
           <a:p>
             <a:pPr marL="742950" lvl="1" indent="-285750">
+              <a:spcAft>
+                <a:spcPts val="1200"/>
+              </a:spcAft>
               <a:buFont typeface="Arial" panose="020B0604020202020204" pitchFamily="34" charset="0"/>
               <a:buChar char="•"/>
             </a:pPr>
@@ -20580,31 +20659,31 @@
               <a:rPr lang="nl-BE" sz="2400" dirty="0" smtClean="0">
                 <a:latin typeface="Arial Rounded MT Bold" panose="020F0704030504030204" pitchFamily="34" charset="0"/>
               </a:rPr>
-              <a:t>beweren</a:t>
+              <a:t>bewaren </a:t>
             </a:r>
             <a:r>
               <a:rPr lang="en-GB" sz="2400" dirty="0" smtClean="0">
                 <a:latin typeface="Arial Rounded MT Bold" panose="020F0704030504030204" pitchFamily="34" charset="0"/>
               </a:rPr>
+              <a:t>van </a:t>
+            </a:r>
+            <a:r>
+              <a:rPr lang="nl-BE" sz="2400" dirty="0" smtClean="0">
+                <a:latin typeface="Arial Rounded MT Bold" panose="020F0704030504030204" pitchFamily="34" charset="0"/>
+              </a:rPr>
+              <a:t>certificaten</a:t>
+            </a:r>
+            <a:r>
+              <a:rPr lang="en-GB" sz="2400" dirty="0" smtClean="0">
+                <a:latin typeface="Arial Rounded MT Bold" panose="020F0704030504030204" pitchFamily="34" charset="0"/>
+              </a:rPr>
               <a:t> </a:t>
             </a:r>
             <a:r>
               <a:rPr lang="en-GB" sz="2400" dirty="0">
                 <a:latin typeface="Arial Rounded MT Bold" panose="020F0704030504030204" pitchFamily="34" charset="0"/>
               </a:rPr>
-              <a:t>van </a:t>
-            </a:r>
-            <a:r>
-              <a:rPr lang="en-GB" sz="2400" dirty="0" err="1">
-                <a:latin typeface="Arial Rounded MT Bold" panose="020F0704030504030204" pitchFamily="34" charset="0"/>
-              </a:rPr>
-              <a:t>certificaten</a:t>
-            </a:r>
-            <a:r>
-              <a:rPr lang="en-GB" sz="2400" dirty="0">
-                <a:latin typeface="Arial Rounded MT Bold" panose="020F0704030504030204" pitchFamily="34" charset="0"/>
-              </a:rPr>
-              <a:t> op Arduino’s </a:t>
+              <a:t>op Arduino’s </a:t>
             </a:r>
             <a:r>
               <a:rPr lang="en-GB" sz="2400" dirty="0" err="1">
@@ -20627,6 +20706,9 @@
           </a:p>
           <a:p>
             <a:pPr marL="285750" indent="-285750">
+              <a:spcAft>
+                <a:spcPts val="600"/>
+              </a:spcAft>
               <a:buFont typeface="Arial" panose="020B0604020202020204" pitchFamily="34" charset="0"/>
               <a:buChar char="•"/>
             </a:pPr>
@@ -20675,6 +20757,9 @@
           </a:p>
           <a:p>
             <a:pPr marL="742950" lvl="1" indent="-285750">
+              <a:spcAft>
+                <a:spcPts val="1200"/>
+              </a:spcAft>
               <a:buFont typeface="Arial" panose="020B0604020202020204" pitchFamily="34" charset="0"/>
               <a:buChar char="•"/>
             </a:pPr>
@@ -21159,7 +21244,19 @@
               <a:rPr lang="nl-BE" sz="2800" dirty="0">
                 <a:latin typeface="Arial Rounded MT Bold" panose="020F0704030504030204" pitchFamily="34" charset="0"/>
               </a:rPr>
-              <a:t>van de web service software</a:t>
+              <a:t>van de </a:t>
+            </a:r>
+            <a:r>
+              <a:rPr lang="nl-BE" sz="2800" dirty="0" smtClean="0">
+                <a:latin typeface="Arial Rounded MT Bold" panose="020F0704030504030204" pitchFamily="34" charset="0"/>
+              </a:rPr>
+              <a:t>web service </a:t>
+            </a:r>
+            <a:r>
+              <a:rPr lang="nl-BE" sz="2800" dirty="0">
+                <a:latin typeface="Arial Rounded MT Bold" panose="020F0704030504030204" pitchFamily="34" charset="0"/>
+              </a:rPr>
+              <a:t>software</a:t>
             </a:r>
           </a:p>
           <a:p>
@@ -21308,7 +21405,7 @@
               <a:rPr lang="en-GB" dirty="0" err="1" smtClean="0">
                 <a:latin typeface="Arial Rounded MT Bold" panose="020F0704030504030204" pitchFamily="34" charset="0"/>
               </a:rPr>
-              <a:t>voor</a:t>
+              <a:t>naar</a:t>
             </a:r>
             <a:r>
               <a:rPr lang="en-GB" dirty="0" smtClean="0">
@@ -21321,6 +21418,12 @@
                 <a:latin typeface="Arial Rounded MT Bold" panose="020F0704030504030204" pitchFamily="34" charset="0"/>
               </a:rPr>
               <a:t>toekomst</a:t>
+            </a:r>
+            <a:r>
+              <a:rPr lang="en-GB" dirty="0" smtClean="0">
+                <a:latin typeface="Arial Rounded MT Bold" panose="020F0704030504030204" pitchFamily="34" charset="0"/>
+              </a:rPr>
+              <a:t> toe</a:t>
             </a:r>
             <a:endParaRPr lang="nl-BE" dirty="0">
               <a:latin typeface="Arial Rounded MT Bold" panose="020F0704030504030204" pitchFamily="34" charset="0"/>
@@ -21428,6 +21531,12 @@
               </a:rPr>
               <a:t>toekomst</a:t>
             </a:r>
+            <a:r>
+              <a:rPr lang="en-GB" sz="2000" b="1" dirty="0" smtClean="0">
+                <a:latin typeface="Arial Rounded MT Bold" panose="020F0704030504030204" pitchFamily="34" charset="0"/>
+              </a:rPr>
+              <a:t> toe</a:t>
+            </a:r>
             <a:endParaRPr lang="nl-BE" sz="2000" b="1" dirty="0">
               <a:latin typeface="Arial Rounded MT Bold" panose="020F0704030504030204" pitchFamily="34" charset="0"/>
             </a:endParaRPr>
@@ -21471,7 +21580,7 @@
           <p:nvPr>
             <p:extLst>
               <p:ext uri="{D42A27DB-BD31-4B8C-83A1-F6EECF244321}">
-                <p14:modId xmlns:p14="http://schemas.microsoft.com/office/powerpoint/2010/main" val="395215259"/>
+                <p14:modId xmlns:p14="http://schemas.microsoft.com/office/powerpoint/2010/main" val="872997300"/>
               </p:ext>
             </p:extLst>
           </p:nvPr>

</xml_diff>